<commit_message>
add AP: plant disease classification report
</commit_message>
<xml_diff>
--- a/SUM_2025/Advanced_Programming/Kotlin_Java_Replacement_in_Android.pptx
+++ b/SUM_2025/Advanced_Programming/Kotlin_Java_Replacement_in_Android.pptx
@@ -5,20 +5,23 @@
     <p:sldMasterId id="2147483660" r:id="rId1"/>
   </p:sldMasterIdLst>
   <p:notesMasterIdLst>
-    <p:notesMasterId r:id="rId13"/>
+    <p:notesMasterId r:id="rId16"/>
   </p:notesMasterIdLst>
   <p:sldIdLst>
     <p:sldId id="256" r:id="rId2"/>
     <p:sldId id="257" r:id="rId3"/>
-    <p:sldId id="270" r:id="rId4"/>
-    <p:sldId id="268" r:id="rId5"/>
-    <p:sldId id="273" r:id="rId6"/>
+    <p:sldId id="274" r:id="rId4"/>
+    <p:sldId id="270" r:id="rId5"/>
+    <p:sldId id="268" r:id="rId6"/>
     <p:sldId id="271" r:id="rId7"/>
-    <p:sldId id="259" r:id="rId8"/>
-    <p:sldId id="265" r:id="rId9"/>
-    <p:sldId id="262" r:id="rId10"/>
-    <p:sldId id="272" r:id="rId11"/>
-    <p:sldId id="269" r:id="rId12"/>
+    <p:sldId id="273" r:id="rId8"/>
+    <p:sldId id="259" r:id="rId9"/>
+    <p:sldId id="265" r:id="rId10"/>
+    <p:sldId id="262" r:id="rId11"/>
+    <p:sldId id="275" r:id="rId12"/>
+    <p:sldId id="272" r:id="rId13"/>
+    <p:sldId id="269" r:id="rId14"/>
+    <p:sldId id="276" r:id="rId15"/>
   </p:sldIdLst>
   <p:sldSz cx="12192000" cy="6858000"/>
   <p:notesSz cx="6858000" cy="9144000"/>
@@ -218,7 +221,7 @@
           <a:p>
             <a:fld id="{E51F5952-E52B-414F-9F32-26FD709AD4D3}" type="datetimeFigureOut">
               <a:rPr lang="en-GB" smtClean="0"/>
-              <a:t>30/06/2025</a:t>
+              <a:t>07/07/2025</a:t>
             </a:fld>
             <a:endParaRPr lang="en-GB"/>
           </a:p>
@@ -769,7 +772,7 @@
           <a:p>
             <a:fld id="{97985F6A-0604-42C5-8A1D-FC4386E5394B}" type="datetime1">
               <a:rPr lang="en-US" smtClean="0"/>
-              <a:t>6/30/2025</a:t>
+              <a:t>7/7/2025</a:t>
             </a:fld>
             <a:endParaRPr lang="en-US"/>
           </a:p>
@@ -967,7 +970,7 @@
           <a:p>
             <a:fld id="{E9A4207E-5EE3-40E0-8DD8-03FA28FD1E18}" type="datetime1">
               <a:rPr lang="en-US" smtClean="0"/>
-              <a:t>6/30/2025</a:t>
+              <a:t>7/7/2025</a:t>
             </a:fld>
             <a:endParaRPr lang="en-US"/>
           </a:p>
@@ -1175,7 +1178,7 @@
           <a:p>
             <a:fld id="{5E0A013E-C18E-4F22-A00F-ED4D8F3B9280}" type="datetime1">
               <a:rPr lang="en-US" smtClean="0"/>
-              <a:t>6/30/2025</a:t>
+              <a:t>7/7/2025</a:t>
             </a:fld>
             <a:endParaRPr lang="en-US"/>
           </a:p>
@@ -1425,7 +1428,7 @@
           <a:p>
             <a:fld id="{8D3C6DE8-4076-44A7-B156-E04AD799C95C}" type="datetime1">
               <a:rPr lang="en-US" smtClean="0"/>
-              <a:t>6/30/2025</a:t>
+              <a:t>7/7/2025</a:t>
             </a:fld>
             <a:endParaRPr lang="en-US"/>
           </a:p>
@@ -1704,7 +1707,7 @@
           <a:p>
             <a:fld id="{2B4EA74D-22CC-44CA-AC59-F32FA31A32D3}" type="datetime1">
               <a:rPr lang="en-US" smtClean="0"/>
-              <a:t>6/30/2025</a:t>
+              <a:t>7/7/2025</a:t>
             </a:fld>
             <a:endParaRPr lang="en-US"/>
           </a:p>
@@ -2021,7 +2024,7 @@
           <a:p>
             <a:fld id="{1DA5AE9E-8D40-431D-A3AC-A9DC64F3AFE5}" type="datetime1">
               <a:rPr lang="en-US" smtClean="0"/>
-              <a:t>6/30/2025</a:t>
+              <a:t>7/7/2025</a:t>
             </a:fld>
             <a:endParaRPr lang="en-US"/>
           </a:p>
@@ -2437,7 +2440,7 @@
           <a:p>
             <a:fld id="{F997B53A-87FB-4B7D-9F7B-8DC14673B3A0}" type="datetime1">
               <a:rPr lang="en-US" smtClean="0"/>
-              <a:t>6/30/2025</a:t>
+              <a:t>7/7/2025</a:t>
             </a:fld>
             <a:endParaRPr lang="en-US"/>
           </a:p>
@@ -2578,7 +2581,7 @@
           <a:p>
             <a:fld id="{1AFE3435-6419-4226-A452-A880740CA08C}" type="datetime1">
               <a:rPr lang="en-US" smtClean="0"/>
-              <a:t>6/30/2025</a:t>
+              <a:t>7/7/2025</a:t>
             </a:fld>
             <a:endParaRPr lang="en-US"/>
           </a:p>
@@ -2691,7 +2694,7 @@
           <a:p>
             <a:fld id="{0B5BB58D-7AB6-4DE6-AD86-840AA0D189A8}" type="datetime1">
               <a:rPr lang="en-US" smtClean="0"/>
-              <a:t>6/30/2025</a:t>
+              <a:t>7/7/2025</a:t>
             </a:fld>
             <a:endParaRPr lang="en-US"/>
           </a:p>
@@ -3008,7 +3011,7 @@
           <a:p>
             <a:fld id="{43ACB97B-96B2-482E-883B-0A4F7FF5DA62}" type="datetime1">
               <a:rPr lang="en-US" smtClean="0"/>
-              <a:t>6/30/2025</a:t>
+              <a:t>7/7/2025</a:t>
             </a:fld>
             <a:endParaRPr lang="en-US"/>
           </a:p>
@@ -3300,7 +3303,7 @@
           <a:p>
             <a:fld id="{9B7BFAF9-6C9A-49C4-95A7-DD798BB2E257}" type="datetime1">
               <a:rPr lang="en-US" smtClean="0"/>
-              <a:t>6/30/2025</a:t>
+              <a:t>7/7/2025</a:t>
             </a:fld>
             <a:endParaRPr lang="en-US"/>
           </a:p>
@@ -3539,7 +3542,7 @@
           <a:p>
             <a:fld id="{7B9A7492-85BC-4532-A42C-026240155349}" type="datetime1">
               <a:rPr lang="en-US" smtClean="0"/>
-              <a:t>6/30/2025</a:t>
+              <a:t>7/7/2025</a:t>
             </a:fld>
             <a:endParaRPr lang="en-US"/>
           </a:p>
@@ -4264,8 +4267,8 @@
         </p:nvSpPr>
         <p:spPr>
           <a:xfrm>
-            <a:off x="517870" y="4482450"/>
-            <a:ext cx="7180788" cy="1724029"/>
+            <a:off x="6095998" y="5113328"/>
+            <a:ext cx="5849174" cy="899857"/>
           </a:xfrm>
         </p:spPr>
         <p:txBody>
@@ -4275,14 +4278,14 @@
           <a:lstStyle/>
           <a:p>
             <a:r>
-              <a:rPr lang="en-US" sz="5400" dirty="0">
+              <a:rPr lang="en-US" sz="4200" dirty="0">
                 <a:solidFill>
                   <a:srgbClr val="FFFFFF"/>
                 </a:solidFill>
               </a:rPr>
               <a:t>By: Ego Victor Chibueze</a:t>
             </a:r>
-            <a:endParaRPr lang="en-GB" sz="5400" dirty="0">
+            <a:endParaRPr lang="en-GB" sz="4200" dirty="0">
               <a:solidFill>
                 <a:srgbClr val="FFFFFF"/>
               </a:solidFill>
@@ -4403,7 +4406,7 @@
         <p:cNvPr id="1" name="">
           <a:extLst>
             <a:ext uri="{FF2B5EF4-FFF2-40B4-BE49-F238E27FC236}">
-              <a16:creationId xmlns:a16="http://schemas.microsoft.com/office/drawing/2014/main" id="{1B18C946-4801-7DDB-88CC-C7B1C544097F}"/>
+              <a16:creationId xmlns:a16="http://schemas.microsoft.com/office/drawing/2014/main" id="{FDD3CFDD-5139-FADE-B7CE-84A1F574B618}"/>
             </a:ext>
           </a:extLst>
         </p:cNvPr>
@@ -4423,7 +4426,432 @@
           <p:cNvPr id="4" name="Picture 3" descr="Triangular abstract background">
             <a:extLst>
               <a:ext uri="{FF2B5EF4-FFF2-40B4-BE49-F238E27FC236}">
-                <a16:creationId xmlns:a16="http://schemas.microsoft.com/office/drawing/2014/main" id="{D75670D0-D801-D48E-F4DA-88296E1924FF}"/>
+                <a16:creationId xmlns:a16="http://schemas.microsoft.com/office/drawing/2014/main" id="{B129E233-6273-D1CA-A0C0-903C19F4AE50}"/>
+              </a:ext>
+            </a:extLst>
+          </p:cNvPr>
+          <p:cNvPicPr>
+            <a:picLocks noChangeAspect="1"/>
+          </p:cNvPicPr>
+          <p:nvPr/>
+        </p:nvPicPr>
+        <p:blipFill>
+          <a:blip r:embed="rId2">
+            <a:alphaModFix amt="40000"/>
+          </a:blip>
+          <a:srcRect t="15730"/>
+          <a:stretch/>
+        </p:blipFill>
+        <p:spPr>
+          <a:xfrm>
+            <a:off x="-2" y="15496"/>
+            <a:ext cx="12192001" cy="6858001"/>
+          </a:xfrm>
+          <a:prstGeom prst="rect">
+            <a:avLst/>
+          </a:prstGeom>
+        </p:spPr>
+      </p:pic>
+      <p:sp>
+        <p:nvSpPr>
+          <p:cNvPr id="3" name="TextBox 2">
+            <a:extLst>
+              <a:ext uri="{FF2B5EF4-FFF2-40B4-BE49-F238E27FC236}">
+                <a16:creationId xmlns:a16="http://schemas.microsoft.com/office/drawing/2014/main" id="{50355116-F32A-6007-E5F6-42CFDFF95AE4}"/>
+              </a:ext>
+            </a:extLst>
+          </p:cNvPr>
+          <p:cNvSpPr txBox="1"/>
+          <p:nvPr/>
+        </p:nvSpPr>
+        <p:spPr>
+          <a:xfrm>
+            <a:off x="2138765" y="398630"/>
+            <a:ext cx="8152110" cy="523220"/>
+          </a:xfrm>
+          <a:prstGeom prst="rect">
+            <a:avLst/>
+          </a:prstGeom>
+          <a:noFill/>
+        </p:spPr>
+        <p:txBody>
+          <a:bodyPr wrap="square">
+            <a:spAutoFit/>
+          </a:bodyPr>
+          <a:lstStyle/>
+          <a:p>
+            <a:pPr algn="ctr"/>
+            <a:r>
+              <a:rPr lang="en-US" sz="2800" b="1" dirty="0"/>
+              <a:t>Popular Android Development Frameworks</a:t>
+            </a:r>
+          </a:p>
+        </p:txBody>
+      </p:sp>
+      <p:grpSp>
+        <p:nvGrpSpPr>
+          <p:cNvPr id="14" name="Group 13">
+            <a:extLst>
+              <a:ext uri="{FF2B5EF4-FFF2-40B4-BE49-F238E27FC236}">
+                <a16:creationId xmlns:a16="http://schemas.microsoft.com/office/drawing/2014/main" id="{B9E904E1-D8D1-C0D0-2071-A8BF9CF87C45}"/>
+              </a:ext>
+            </a:extLst>
+          </p:cNvPr>
+          <p:cNvGrpSpPr/>
+          <p:nvPr/>
+        </p:nvGrpSpPr>
+        <p:grpSpPr>
+          <a:xfrm>
+            <a:off x="760188" y="1372138"/>
+            <a:ext cx="3153158" cy="2324051"/>
+            <a:chOff x="760188" y="1372138"/>
+            <a:chExt cx="3153158" cy="2324051"/>
+          </a:xfrm>
+        </p:grpSpPr>
+        <p:sp>
+          <p:nvSpPr>
+            <p:cNvPr id="2" name="TextBox 1">
+              <a:extLst>
+                <a:ext uri="{FF2B5EF4-FFF2-40B4-BE49-F238E27FC236}">
+                  <a16:creationId xmlns:a16="http://schemas.microsoft.com/office/drawing/2014/main" id="{4D5A292A-65CF-F99C-04C9-CE915A61051E}"/>
+                </a:ext>
+              </a:extLst>
+            </p:cNvPr>
+            <p:cNvSpPr txBox="1"/>
+            <p:nvPr/>
+          </p:nvSpPr>
+          <p:spPr>
+            <a:xfrm>
+              <a:off x="760188" y="1372138"/>
+              <a:ext cx="3153158" cy="1077218"/>
+            </a:xfrm>
+            <a:prstGeom prst="rect">
+              <a:avLst/>
+            </a:prstGeom>
+            <a:noFill/>
+          </p:spPr>
+          <p:txBody>
+            <a:bodyPr wrap="square">
+              <a:spAutoFit/>
+            </a:bodyPr>
+            <a:lstStyle/>
+            <a:p>
+              <a:pPr algn="ctr"/>
+              <a:r>
+                <a:rPr lang="de-DE" sz="3200" dirty="0"/>
+                <a:t>React-Native	</a:t>
+              </a:r>
+            </a:p>
+            <a:p>
+              <a:pPr marL="514350" indent="-514350" algn="l">
+                <a:buFont typeface="+mj-lt"/>
+                <a:buAutoNum type="arabicPeriod"/>
+              </a:pPr>
+              <a:endParaRPr lang="en-GB" sz="3200" dirty="0"/>
+            </a:p>
+          </p:txBody>
+        </p:sp>
+        <p:pic>
+          <p:nvPicPr>
+            <p:cNvPr id="9" name="Graphic 8">
+              <a:extLst>
+                <a:ext uri="{FF2B5EF4-FFF2-40B4-BE49-F238E27FC236}">
+                  <a16:creationId xmlns:a16="http://schemas.microsoft.com/office/drawing/2014/main" id="{B58F8070-82E2-36D9-E84D-7A38CBCB577A}"/>
+                </a:ext>
+              </a:extLst>
+            </p:cNvPr>
+            <p:cNvPicPr>
+              <a:picLocks noChangeAspect="1"/>
+            </p:cNvPicPr>
+            <p:nvPr/>
+          </p:nvPicPr>
+          <p:blipFill>
+            <a:blip r:embed="rId3">
+              <a:extLst>
+                <a:ext uri="{96DAC541-7B7A-43D3-8B79-37D633B846F1}">
+                  <asvg:svgBlip xmlns:asvg="http://schemas.microsoft.com/office/drawing/2016/SVG/main" r:embed="rId4"/>
+                </a:ext>
+              </a:extLst>
+            </a:blip>
+            <a:stretch>
+              <a:fillRect/>
+            </a:stretch>
+          </p:blipFill>
+          <p:spPr>
+            <a:xfrm>
+              <a:off x="1220863" y="1956913"/>
+              <a:ext cx="1909794" cy="1739276"/>
+            </a:xfrm>
+            <a:prstGeom prst="rect">
+              <a:avLst/>
+            </a:prstGeom>
+          </p:spPr>
+        </p:pic>
+      </p:grpSp>
+      <p:grpSp>
+        <p:nvGrpSpPr>
+          <p:cNvPr id="13" name="Group 12">
+            <a:extLst>
+              <a:ext uri="{FF2B5EF4-FFF2-40B4-BE49-F238E27FC236}">
+                <a16:creationId xmlns:a16="http://schemas.microsoft.com/office/drawing/2014/main" id="{5FA01564-4286-DA32-4726-6E75905554FE}"/>
+              </a:ext>
+            </a:extLst>
+          </p:cNvPr>
+          <p:cNvGrpSpPr/>
+          <p:nvPr/>
+        </p:nvGrpSpPr>
+        <p:grpSpPr>
+          <a:xfrm>
+            <a:off x="8682243" y="1372138"/>
+            <a:ext cx="2419149" cy="2667185"/>
+            <a:chOff x="754302" y="3515534"/>
+            <a:chExt cx="2419149" cy="2667185"/>
+          </a:xfrm>
+        </p:grpSpPr>
+        <p:pic>
+          <p:nvPicPr>
+            <p:cNvPr id="11" name="Picture 10" descr="A blue and black logo&#10;&#10;AI-generated content may be incorrect.">
+              <a:extLst>
+                <a:ext uri="{FF2B5EF4-FFF2-40B4-BE49-F238E27FC236}">
+                  <a16:creationId xmlns:a16="http://schemas.microsoft.com/office/drawing/2014/main" id="{E9A3113B-984F-36FD-BE59-F972CC97358A}"/>
+                </a:ext>
+              </a:extLst>
+            </p:cNvPr>
+            <p:cNvPicPr>
+              <a:picLocks noChangeAspect="1"/>
+            </p:cNvPicPr>
+            <p:nvPr/>
+          </p:nvPicPr>
+          <p:blipFill>
+            <a:blip r:embed="rId5">
+              <a:extLst>
+                <a:ext uri="{28A0092B-C50C-407E-A947-70E740481C1C}">
+                  <a14:useLocalDpi xmlns:a14="http://schemas.microsoft.com/office/drawing/2010/main" val="0"/>
+                </a:ext>
+                <a:ext uri="{837473B0-CC2E-450A-ABE3-18F120FF3D39}">
+                  <a1611:picAttrSrcUrl xmlns:a1611="http://schemas.microsoft.com/office/drawing/2016/11/main" r:id="rId6"/>
+                </a:ext>
+              </a:extLst>
+            </a:blip>
+            <a:stretch>
+              <a:fillRect/>
+            </a:stretch>
+          </p:blipFill>
+          <p:spPr>
+            <a:xfrm>
+              <a:off x="754302" y="4150256"/>
+              <a:ext cx="2032463" cy="2032463"/>
+            </a:xfrm>
+            <a:prstGeom prst="rect">
+              <a:avLst/>
+            </a:prstGeom>
+          </p:spPr>
+        </p:pic>
+        <p:sp>
+          <p:nvSpPr>
+            <p:cNvPr id="12" name="TextBox 11">
+              <a:extLst>
+                <a:ext uri="{FF2B5EF4-FFF2-40B4-BE49-F238E27FC236}">
+                  <a16:creationId xmlns:a16="http://schemas.microsoft.com/office/drawing/2014/main" id="{9B173CF0-AFB0-E01A-66F4-FE29C3319499}"/>
+                </a:ext>
+              </a:extLst>
+            </p:cNvPr>
+            <p:cNvSpPr txBox="1"/>
+            <p:nvPr/>
+          </p:nvSpPr>
+          <p:spPr>
+            <a:xfrm>
+              <a:off x="1140988" y="3515534"/>
+              <a:ext cx="2032463" cy="584775"/>
+            </a:xfrm>
+            <a:prstGeom prst="rect">
+              <a:avLst/>
+            </a:prstGeom>
+            <a:noFill/>
+          </p:spPr>
+          <p:txBody>
+            <a:bodyPr wrap="square" rtlCol="0">
+              <a:spAutoFit/>
+            </a:bodyPr>
+            <a:lstStyle/>
+            <a:p>
+              <a:pPr algn="ctr"/>
+              <a:r>
+                <a:rPr lang="de-DE" sz="3200" dirty="0"/>
+                <a:t>Flutter</a:t>
+              </a:r>
+              <a:endParaRPr lang="en-GB" sz="3200" dirty="0"/>
+            </a:p>
+          </p:txBody>
+        </p:sp>
+      </p:grpSp>
+      <p:grpSp>
+        <p:nvGrpSpPr>
+          <p:cNvPr id="19" name="Group 18">
+            <a:extLst>
+              <a:ext uri="{FF2B5EF4-FFF2-40B4-BE49-F238E27FC236}">
+                <a16:creationId xmlns:a16="http://schemas.microsoft.com/office/drawing/2014/main" id="{62B12BAF-C3CE-3F02-9E87-C613A34BF7F2}"/>
+              </a:ext>
+            </a:extLst>
+          </p:cNvPr>
+          <p:cNvGrpSpPr/>
+          <p:nvPr/>
+        </p:nvGrpSpPr>
+        <p:grpSpPr>
+          <a:xfrm>
+            <a:off x="4943438" y="2912458"/>
+            <a:ext cx="2540579" cy="3125354"/>
+            <a:chOff x="6979974" y="2653386"/>
+            <a:chExt cx="2540579" cy="3125354"/>
+          </a:xfrm>
+        </p:grpSpPr>
+        <p:pic>
+          <p:nvPicPr>
+            <p:cNvPr id="16" name="Picture 15" descr="A colorful triangle with a black background&#10;&#10;AI-generated content may be incorrect.">
+              <a:extLst>
+                <a:ext uri="{FF2B5EF4-FFF2-40B4-BE49-F238E27FC236}">
+                  <a16:creationId xmlns:a16="http://schemas.microsoft.com/office/drawing/2014/main" id="{37B22496-D545-93D6-7C62-90F62E5186B7}"/>
+                </a:ext>
+              </a:extLst>
+            </p:cNvPr>
+            <p:cNvPicPr>
+              <a:picLocks noChangeAspect="1"/>
+            </p:cNvPicPr>
+            <p:nvPr/>
+          </p:nvPicPr>
+          <p:blipFill>
+            <a:blip r:embed="rId7">
+              <a:extLst>
+                <a:ext uri="{28A0092B-C50C-407E-A947-70E740481C1C}">
+                  <a14:useLocalDpi xmlns:a14="http://schemas.microsoft.com/office/drawing/2010/main" val="0"/>
+                </a:ext>
+                <a:ext uri="{837473B0-CC2E-450A-ABE3-18F120FF3D39}">
+                  <a1611:picAttrSrcUrl xmlns:a1611="http://schemas.microsoft.com/office/drawing/2016/11/main" r:id="rId8"/>
+                </a:ext>
+              </a:extLst>
+            </a:blip>
+            <a:stretch>
+              <a:fillRect/>
+            </a:stretch>
+          </p:blipFill>
+          <p:spPr>
+            <a:xfrm>
+              <a:off x="6979974" y="2653386"/>
+              <a:ext cx="2540579" cy="2540579"/>
+            </a:xfrm>
+            <a:prstGeom prst="rect">
+              <a:avLst/>
+            </a:prstGeom>
+          </p:spPr>
+        </p:pic>
+        <p:sp>
+          <p:nvSpPr>
+            <p:cNvPr id="17" name="TextBox 16">
+              <a:extLst>
+                <a:ext uri="{FF2B5EF4-FFF2-40B4-BE49-F238E27FC236}">
+                  <a16:creationId xmlns:a16="http://schemas.microsoft.com/office/drawing/2014/main" id="{4AEC2034-7FFC-C694-29FA-93FA2ADD45FF}"/>
+                </a:ext>
+              </a:extLst>
+            </p:cNvPr>
+            <p:cNvSpPr txBox="1"/>
+            <p:nvPr/>
+          </p:nvSpPr>
+          <p:spPr>
+            <a:xfrm>
+              <a:off x="6979974" y="5193965"/>
+              <a:ext cx="2540579" cy="584775"/>
+            </a:xfrm>
+            <a:prstGeom prst="rect">
+              <a:avLst/>
+            </a:prstGeom>
+            <a:noFill/>
+          </p:spPr>
+          <p:txBody>
+            <a:bodyPr wrap="square" rtlCol="0">
+              <a:spAutoFit/>
+            </a:bodyPr>
+            <a:lstStyle/>
+            <a:p>
+              <a:pPr algn="ctr"/>
+              <a:r>
+                <a:rPr lang="en-GB" sz="3200" dirty="0"/>
+                <a:t>Kotlin</a:t>
+              </a:r>
+            </a:p>
+          </p:txBody>
+        </p:sp>
+      </p:grpSp>
+      <p:sp>
+        <p:nvSpPr>
+          <p:cNvPr id="20" name="Slide Number Placeholder 19">
+            <a:extLst>
+              <a:ext uri="{FF2B5EF4-FFF2-40B4-BE49-F238E27FC236}">
+                <a16:creationId xmlns:a16="http://schemas.microsoft.com/office/drawing/2014/main" id="{0D88A898-F2E0-55EF-DDDF-65FF8617FDB5}"/>
+              </a:ext>
+            </a:extLst>
+          </p:cNvPr>
+          <p:cNvSpPr>
+            <a:spLocks noGrp="1"/>
+          </p:cNvSpPr>
+          <p:nvPr>
+            <p:ph type="sldNum" sz="quarter" idx="12"/>
+          </p:nvPr>
+        </p:nvSpPr>
+        <p:spPr/>
+        <p:txBody>
+          <a:bodyPr/>
+          <a:lstStyle/>
+          <a:p>
+            <a:fld id="{148CC95F-0247-41B6-91CF-DC97C76A7088}" type="slidenum">
+              <a:rPr lang="en-US" sz="1800" smtClean="0"/>
+              <a:t>10</a:t>
+            </a:fld>
+            <a:endParaRPr lang="en-US" sz="1800" dirty="0"/>
+          </a:p>
+        </p:txBody>
+      </p:sp>
+    </p:spTree>
+    <p:extLst>
+      <p:ext uri="{BB962C8B-B14F-4D97-AF65-F5344CB8AC3E}">
+        <p14:creationId xmlns:p14="http://schemas.microsoft.com/office/powerpoint/2010/main" val="3081173710"/>
+      </p:ext>
+    </p:extLst>
+  </p:cSld>
+  <p:clrMapOvr>
+    <a:masterClrMapping/>
+  </p:clrMapOvr>
+</p:sld>
+</file>
+
+<file path=ppt/slides/slide11.xml><?xml version="1.0" encoding="utf-8"?>
+<p:sld xmlns:a="http://schemas.openxmlformats.org/drawingml/2006/main" xmlns:r="http://schemas.openxmlformats.org/officeDocument/2006/relationships" xmlns:p="http://schemas.openxmlformats.org/presentationml/2006/main">
+  <p:cSld>
+    <p:spTree>
+      <p:nvGrpSpPr>
+        <p:cNvPr id="1" name="">
+          <a:extLst>
+            <a:ext uri="{FF2B5EF4-FFF2-40B4-BE49-F238E27FC236}">
+              <a16:creationId xmlns:a16="http://schemas.microsoft.com/office/drawing/2014/main" id="{3B651BB2-E477-BDA0-C70B-07F5F240F0B6}"/>
+            </a:ext>
+          </a:extLst>
+        </p:cNvPr>
+        <p:cNvGrpSpPr/>
+        <p:nvPr/>
+      </p:nvGrpSpPr>
+      <p:grpSpPr>
+        <a:xfrm>
+          <a:off x="0" y="0"/>
+          <a:ext cx="0" cy="0"/>
+          <a:chOff x="0" y="0"/>
+          <a:chExt cx="0" cy="0"/>
+        </a:xfrm>
+      </p:grpSpPr>
+      <p:pic>
+        <p:nvPicPr>
+          <p:cNvPr id="4" name="Picture 3" descr="Triangular abstract background">
+            <a:extLst>
+              <a:ext uri="{FF2B5EF4-FFF2-40B4-BE49-F238E27FC236}">
+                <a16:creationId xmlns:a16="http://schemas.microsoft.com/office/drawing/2014/main" id="{6C449066-A258-8514-F87B-95AC11C3A31C}"/>
               </a:ext>
             </a:extLst>
           </p:cNvPr>
@@ -4454,7 +4882,7 @@
           <p:cNvPr id="3" name="TextBox 2">
             <a:extLst>
               <a:ext uri="{FF2B5EF4-FFF2-40B4-BE49-F238E27FC236}">
-                <a16:creationId xmlns:a16="http://schemas.microsoft.com/office/drawing/2014/main" id="{C109BD0A-FF60-1E20-B067-5347BC1B4602}"/>
+                <a16:creationId xmlns:a16="http://schemas.microsoft.com/office/drawing/2014/main" id="{18783A17-83AD-E915-6EE4-0E80E4DB3C80}"/>
               </a:ext>
             </a:extLst>
           </p:cNvPr>
@@ -4480,6 +4908,188 @@
             <a:pPr algn="l"/>
             <a:r>
               <a:rPr lang="en-US" sz="2800" b="1" dirty="0"/>
+              <a:t>Conclusion</a:t>
+            </a:r>
+          </a:p>
+        </p:txBody>
+      </p:sp>
+      <p:sp>
+        <p:nvSpPr>
+          <p:cNvPr id="2" name="TextBox 1">
+            <a:extLst>
+              <a:ext uri="{FF2B5EF4-FFF2-40B4-BE49-F238E27FC236}">
+                <a16:creationId xmlns:a16="http://schemas.microsoft.com/office/drawing/2014/main" id="{2436803E-9E25-8064-A472-37B14A0797B4}"/>
+              </a:ext>
+            </a:extLst>
+          </p:cNvPr>
+          <p:cNvSpPr txBox="1"/>
+          <p:nvPr/>
+        </p:nvSpPr>
+        <p:spPr>
+          <a:xfrm>
+            <a:off x="292631" y="1320481"/>
+            <a:ext cx="11606735" cy="1815882"/>
+          </a:xfrm>
+          <a:prstGeom prst="rect">
+            <a:avLst/>
+          </a:prstGeom>
+          <a:noFill/>
+        </p:spPr>
+        <p:txBody>
+          <a:bodyPr wrap="square">
+            <a:spAutoFit/>
+          </a:bodyPr>
+          <a:lstStyle/>
+          <a:p>
+            <a:pPr marL="514350" indent="-514350" algn="l">
+              <a:buFont typeface="+mj-lt"/>
+              <a:buAutoNum type="arabicPeriod"/>
+            </a:pPr>
+            <a:r>
+              <a:rPr lang="en-US" sz="2800" dirty="0"/>
+              <a:t>Java was the foundational language for Android development and remains an important part of the ecosystem</a:t>
+            </a:r>
+          </a:p>
+          <a:p>
+            <a:pPr marL="514350" indent="-514350" algn="l">
+              <a:buFont typeface="+mj-lt"/>
+              <a:buAutoNum type="arabicPeriod"/>
+            </a:pPr>
+            <a:r>
+              <a:rPr lang="en-US" sz="2800" dirty="0"/>
+              <a:t>Android apps can still be written in Java today, though Kotlin is now favored for new development</a:t>
+            </a:r>
+            <a:endParaRPr lang="en-GB" sz="2800" dirty="0"/>
+          </a:p>
+        </p:txBody>
+      </p:sp>
+      <p:sp>
+        <p:nvSpPr>
+          <p:cNvPr id="5" name="Slide Number Placeholder 4">
+            <a:extLst>
+              <a:ext uri="{FF2B5EF4-FFF2-40B4-BE49-F238E27FC236}">
+                <a16:creationId xmlns:a16="http://schemas.microsoft.com/office/drawing/2014/main" id="{7D86EAB8-52D3-32A6-DC5D-15B021A25F57}"/>
+              </a:ext>
+            </a:extLst>
+          </p:cNvPr>
+          <p:cNvSpPr>
+            <a:spLocks noGrp="1"/>
+          </p:cNvSpPr>
+          <p:nvPr>
+            <p:ph type="sldNum" sz="quarter" idx="12"/>
+          </p:nvPr>
+        </p:nvSpPr>
+        <p:spPr/>
+        <p:txBody>
+          <a:bodyPr/>
+          <a:lstStyle/>
+          <a:p>
+            <a:fld id="{148CC95F-0247-41B6-91CF-DC97C76A7088}" type="slidenum">
+              <a:rPr lang="en-US" sz="1800" smtClean="0"/>
+              <a:t>11</a:t>
+            </a:fld>
+            <a:endParaRPr lang="en-US" dirty="0"/>
+          </a:p>
+        </p:txBody>
+      </p:sp>
+    </p:spTree>
+    <p:extLst>
+      <p:ext uri="{BB962C8B-B14F-4D97-AF65-F5344CB8AC3E}">
+        <p14:creationId xmlns:p14="http://schemas.microsoft.com/office/powerpoint/2010/main" val="1501890453"/>
+      </p:ext>
+    </p:extLst>
+  </p:cSld>
+  <p:clrMapOvr>
+    <a:masterClrMapping/>
+  </p:clrMapOvr>
+</p:sld>
+</file>
+
+<file path=ppt/slides/slide12.xml><?xml version="1.0" encoding="utf-8"?>
+<p:sld xmlns:a="http://schemas.openxmlformats.org/drawingml/2006/main" xmlns:r="http://schemas.openxmlformats.org/officeDocument/2006/relationships" xmlns:p="http://schemas.openxmlformats.org/presentationml/2006/main">
+  <p:cSld>
+    <p:spTree>
+      <p:nvGrpSpPr>
+        <p:cNvPr id="1" name="">
+          <a:extLst>
+            <a:ext uri="{FF2B5EF4-FFF2-40B4-BE49-F238E27FC236}">
+              <a16:creationId xmlns:a16="http://schemas.microsoft.com/office/drawing/2014/main" id="{1B18C946-4801-7DDB-88CC-C7B1C544097F}"/>
+            </a:ext>
+          </a:extLst>
+        </p:cNvPr>
+        <p:cNvGrpSpPr/>
+        <p:nvPr/>
+      </p:nvGrpSpPr>
+      <p:grpSpPr>
+        <a:xfrm>
+          <a:off x="0" y="0"/>
+          <a:ext cx="0" cy="0"/>
+          <a:chOff x="0" y="0"/>
+          <a:chExt cx="0" cy="0"/>
+        </a:xfrm>
+      </p:grpSpPr>
+      <p:pic>
+        <p:nvPicPr>
+          <p:cNvPr id="4" name="Picture 3" descr="Triangular abstract background">
+            <a:extLst>
+              <a:ext uri="{FF2B5EF4-FFF2-40B4-BE49-F238E27FC236}">
+                <a16:creationId xmlns:a16="http://schemas.microsoft.com/office/drawing/2014/main" id="{D75670D0-D801-D48E-F4DA-88296E1924FF}"/>
+              </a:ext>
+            </a:extLst>
+          </p:cNvPr>
+          <p:cNvPicPr>
+            <a:picLocks noChangeAspect="1"/>
+          </p:cNvPicPr>
+          <p:nvPr/>
+        </p:nvPicPr>
+        <p:blipFill>
+          <a:blip r:embed="rId2">
+            <a:alphaModFix amt="40000"/>
+          </a:blip>
+          <a:srcRect t="15730"/>
+          <a:stretch/>
+        </p:blipFill>
+        <p:spPr>
+          <a:xfrm>
+            <a:off x="-2" y="-2"/>
+            <a:ext cx="12192001" cy="6858001"/>
+          </a:xfrm>
+          <a:prstGeom prst="rect">
+            <a:avLst/>
+          </a:prstGeom>
+        </p:spPr>
+      </p:pic>
+      <p:sp>
+        <p:nvSpPr>
+          <p:cNvPr id="3" name="TextBox 2">
+            <a:extLst>
+              <a:ext uri="{FF2B5EF4-FFF2-40B4-BE49-F238E27FC236}">
+                <a16:creationId xmlns:a16="http://schemas.microsoft.com/office/drawing/2014/main" id="{C109BD0A-FF60-1E20-B067-5347BC1B4602}"/>
+              </a:ext>
+            </a:extLst>
+          </p:cNvPr>
+          <p:cNvSpPr txBox="1"/>
+          <p:nvPr/>
+        </p:nvSpPr>
+        <p:spPr>
+          <a:xfrm>
+            <a:off x="5011116" y="222685"/>
+            <a:ext cx="2169763" cy="523220"/>
+          </a:xfrm>
+          <a:prstGeom prst="rect">
+            <a:avLst/>
+          </a:prstGeom>
+          <a:noFill/>
+        </p:spPr>
+        <p:txBody>
+          <a:bodyPr wrap="square">
+            <a:spAutoFit/>
+          </a:bodyPr>
+          <a:lstStyle/>
+          <a:p>
+            <a:pPr algn="l"/>
+            <a:r>
+              <a:rPr lang="en-US" sz="2800" b="1" dirty="0"/>
               <a:t>References</a:t>
             </a:r>
           </a:p>
@@ -4559,10 +5169,10 @@
           <a:lstStyle/>
           <a:p>
             <a:fld id="{148CC95F-0247-41B6-91CF-DC97C76A7088}" type="slidenum">
-              <a:rPr lang="en-US" smtClean="0"/>
-              <a:t>10</a:t>
+              <a:rPr lang="en-US" sz="1800" smtClean="0"/>
+              <a:t>12</a:t>
             </a:fld>
-            <a:endParaRPr lang="en-US"/>
+            <a:endParaRPr lang="en-US" sz="1800" dirty="0"/>
           </a:p>
         </p:txBody>
       </p:sp>
@@ -4579,7 +5189,7 @@
 </p:sld>
 </file>
 
-<file path=ppt/slides/slide11.xml><?xml version="1.0" encoding="utf-8"?>
+<file path=ppt/slides/slide13.xml><?xml version="1.0" encoding="utf-8"?>
 <p:sld xmlns:a="http://schemas.openxmlformats.org/drawingml/2006/main" xmlns:r="http://schemas.openxmlformats.org/officeDocument/2006/relationships" xmlns:p="http://schemas.openxmlformats.org/presentationml/2006/main">
   <p:cSld>
     <p:spTree>
@@ -4664,6 +5274,175 @@
             <a:pPr algn="l"/>
             <a:r>
               <a:rPr lang="en-US" sz="2800" b="1" dirty="0"/>
+              <a:t>Thank You</a:t>
+            </a:r>
+          </a:p>
+        </p:txBody>
+      </p:sp>
+      <p:sp>
+        <p:nvSpPr>
+          <p:cNvPr id="2" name="TextBox 1">
+            <a:extLst>
+              <a:ext uri="{FF2B5EF4-FFF2-40B4-BE49-F238E27FC236}">
+                <a16:creationId xmlns:a16="http://schemas.microsoft.com/office/drawing/2014/main" id="{B9C6EC69-4082-1138-20D2-A8BEC8808888}"/>
+              </a:ext>
+            </a:extLst>
+          </p:cNvPr>
+          <p:cNvSpPr txBox="1"/>
+          <p:nvPr/>
+        </p:nvSpPr>
+        <p:spPr>
+          <a:xfrm>
+            <a:off x="292631" y="1320481"/>
+            <a:ext cx="11606735" cy="923330"/>
+          </a:xfrm>
+          <a:prstGeom prst="rect">
+            <a:avLst/>
+          </a:prstGeom>
+          <a:noFill/>
+        </p:spPr>
+        <p:txBody>
+          <a:bodyPr wrap="square">
+            <a:spAutoFit/>
+          </a:bodyPr>
+          <a:lstStyle/>
+          <a:p>
+            <a:pPr algn="ctr"/>
+            <a:r>
+              <a:rPr lang="en-US" sz="5400" dirty="0"/>
+              <a:t>Questions ?</a:t>
+            </a:r>
+            <a:endParaRPr lang="en-GB" sz="5400" dirty="0"/>
+          </a:p>
+        </p:txBody>
+      </p:sp>
+      <p:sp>
+        <p:nvSpPr>
+          <p:cNvPr id="5" name="Slide Number Placeholder 4">
+            <a:extLst>
+              <a:ext uri="{FF2B5EF4-FFF2-40B4-BE49-F238E27FC236}">
+                <a16:creationId xmlns:a16="http://schemas.microsoft.com/office/drawing/2014/main" id="{F232C573-400D-E06E-D5C5-9A96D465214C}"/>
+              </a:ext>
+            </a:extLst>
+          </p:cNvPr>
+          <p:cNvSpPr>
+            <a:spLocks noGrp="1"/>
+          </p:cNvSpPr>
+          <p:nvPr>
+            <p:ph type="sldNum" sz="quarter" idx="12"/>
+          </p:nvPr>
+        </p:nvSpPr>
+        <p:spPr/>
+        <p:txBody>
+          <a:bodyPr/>
+          <a:lstStyle/>
+          <a:p>
+            <a:fld id="{148CC95F-0247-41B6-91CF-DC97C76A7088}" type="slidenum">
+              <a:rPr lang="en-US" sz="1800" smtClean="0"/>
+              <a:t>13</a:t>
+            </a:fld>
+            <a:endParaRPr lang="en-US" dirty="0"/>
+          </a:p>
+        </p:txBody>
+      </p:sp>
+    </p:spTree>
+    <p:extLst>
+      <p:ext uri="{BB962C8B-B14F-4D97-AF65-F5344CB8AC3E}">
+        <p14:creationId xmlns:p14="http://schemas.microsoft.com/office/powerpoint/2010/main" val="533304966"/>
+      </p:ext>
+    </p:extLst>
+  </p:cSld>
+  <p:clrMapOvr>
+    <a:masterClrMapping/>
+  </p:clrMapOvr>
+</p:sld>
+</file>
+
+<file path=ppt/slides/slide14.xml><?xml version="1.0" encoding="utf-8"?>
+<p:sld xmlns:a="http://schemas.openxmlformats.org/drawingml/2006/main" xmlns:r="http://schemas.openxmlformats.org/officeDocument/2006/relationships" xmlns:p="http://schemas.openxmlformats.org/presentationml/2006/main">
+  <p:cSld>
+    <p:spTree>
+      <p:nvGrpSpPr>
+        <p:cNvPr id="1" name="">
+          <a:extLst>
+            <a:ext uri="{FF2B5EF4-FFF2-40B4-BE49-F238E27FC236}">
+              <a16:creationId xmlns:a16="http://schemas.microsoft.com/office/drawing/2014/main" id="{D0A5BBF8-9225-36D4-C0FB-71665FA44541}"/>
+            </a:ext>
+          </a:extLst>
+        </p:cNvPr>
+        <p:cNvGrpSpPr/>
+        <p:nvPr/>
+      </p:nvGrpSpPr>
+      <p:grpSpPr>
+        <a:xfrm>
+          <a:off x="0" y="0"/>
+          <a:ext cx="0" cy="0"/>
+          <a:chOff x="0" y="0"/>
+          <a:chExt cx="0" cy="0"/>
+        </a:xfrm>
+      </p:grpSpPr>
+      <p:pic>
+        <p:nvPicPr>
+          <p:cNvPr id="4" name="Picture 3" descr="Triangular abstract background">
+            <a:extLst>
+              <a:ext uri="{FF2B5EF4-FFF2-40B4-BE49-F238E27FC236}">
+                <a16:creationId xmlns:a16="http://schemas.microsoft.com/office/drawing/2014/main" id="{922D3E21-C561-EF1C-BC15-80DA6F469620}"/>
+              </a:ext>
+            </a:extLst>
+          </p:cNvPr>
+          <p:cNvPicPr>
+            <a:picLocks noChangeAspect="1"/>
+          </p:cNvPicPr>
+          <p:nvPr/>
+        </p:nvPicPr>
+        <p:blipFill>
+          <a:blip r:embed="rId2">
+            <a:alphaModFix amt="40000"/>
+          </a:blip>
+          <a:srcRect t="15730"/>
+          <a:stretch/>
+        </p:blipFill>
+        <p:spPr>
+          <a:xfrm>
+            <a:off x="-2" y="-2"/>
+            <a:ext cx="12192001" cy="6858001"/>
+          </a:xfrm>
+          <a:prstGeom prst="rect">
+            <a:avLst/>
+          </a:prstGeom>
+        </p:spPr>
+      </p:pic>
+      <p:sp>
+        <p:nvSpPr>
+          <p:cNvPr id="3" name="TextBox 2">
+            <a:extLst>
+              <a:ext uri="{FF2B5EF4-FFF2-40B4-BE49-F238E27FC236}">
+                <a16:creationId xmlns:a16="http://schemas.microsoft.com/office/drawing/2014/main" id="{FD234B83-70C0-E8FE-DFF6-3EF597C89C7A}"/>
+              </a:ext>
+            </a:extLst>
+          </p:cNvPr>
+          <p:cNvSpPr txBox="1"/>
+          <p:nvPr/>
+        </p:nvSpPr>
+        <p:spPr>
+          <a:xfrm>
+            <a:off x="5011116" y="222685"/>
+            <a:ext cx="2169763" cy="523220"/>
+          </a:xfrm>
+          <a:prstGeom prst="rect">
+            <a:avLst/>
+          </a:prstGeom>
+          <a:noFill/>
+        </p:spPr>
+        <p:txBody>
+          <a:bodyPr wrap="square">
+            <a:spAutoFit/>
+          </a:bodyPr>
+          <a:lstStyle/>
+          <a:p>
+            <a:pPr algn="l"/>
+            <a:r>
+              <a:rPr lang="en-US" sz="2800" b="1" dirty="0"/>
               <a:t>Extras</a:t>
             </a:r>
           </a:p>
@@ -4674,7 +5453,7 @@
           <p:cNvPr id="2" name="TextBox 1">
             <a:extLst>
               <a:ext uri="{FF2B5EF4-FFF2-40B4-BE49-F238E27FC236}">
-                <a16:creationId xmlns:a16="http://schemas.microsoft.com/office/drawing/2014/main" id="{B9C6EC69-4082-1138-20D2-A8BEC8808888}"/>
+                <a16:creationId xmlns:a16="http://schemas.microsoft.com/office/drawing/2014/main" id="{852EA6F4-77F5-3326-0DB3-3B46C52195A4}"/>
               </a:ext>
             </a:extLst>
           </p:cNvPr>
@@ -4740,7 +5519,7 @@
           <p:cNvPr id="5" name="Slide Number Placeholder 4">
             <a:extLst>
               <a:ext uri="{FF2B5EF4-FFF2-40B4-BE49-F238E27FC236}">
-                <a16:creationId xmlns:a16="http://schemas.microsoft.com/office/drawing/2014/main" id="{F232C573-400D-E06E-D5C5-9A96D465214C}"/>
+                <a16:creationId xmlns:a16="http://schemas.microsoft.com/office/drawing/2014/main" id="{147C23BA-2813-ED98-D0F7-C4713569AC33}"/>
               </a:ext>
             </a:extLst>
           </p:cNvPr>
@@ -4757,17 +5536,17 @@
           <a:lstStyle/>
           <a:p>
             <a:fld id="{148CC95F-0247-41B6-91CF-DC97C76A7088}" type="slidenum">
-              <a:rPr lang="en-US" smtClean="0"/>
-              <a:t>11</a:t>
+              <a:rPr lang="en-US" sz="1800" smtClean="0"/>
+              <a:t>14</a:t>
             </a:fld>
-            <a:endParaRPr lang="en-US"/>
+            <a:endParaRPr lang="en-US" dirty="0"/>
           </a:p>
         </p:txBody>
       </p:sp>
     </p:spTree>
     <p:extLst>
       <p:ext uri="{BB962C8B-B14F-4D97-AF65-F5344CB8AC3E}">
-        <p14:creationId xmlns:p14="http://schemas.microsoft.com/office/powerpoint/2010/main" val="533304966"/>
+        <p14:creationId xmlns:p14="http://schemas.microsoft.com/office/powerpoint/2010/main" val="3620585772"/>
       </p:ext>
     </p:extLst>
   </p:cSld>
@@ -4838,9 +5617,653 @@
           <p:nvPr/>
         </p:nvSpPr>
         <p:spPr>
-          <a:xfrm rot="307827">
-            <a:off x="8030487" y="97742"/>
-            <a:ext cx="4000398" cy="769441"/>
+          <a:xfrm>
+            <a:off x="1067855" y="-647"/>
+            <a:ext cx="9192024" cy="769441"/>
+          </a:xfrm>
+          <a:prstGeom prst="rect">
+            <a:avLst/>
+          </a:prstGeom>
+          <a:noFill/>
+        </p:spPr>
+        <p:txBody>
+          <a:bodyPr wrap="square" rtlCol="0">
+            <a:spAutoFit/>
+          </a:bodyPr>
+          <a:lstStyle/>
+          <a:p>
+            <a:r>
+              <a:rPr lang="en-GB" sz="4400" dirty="0"/>
+              <a:t>Android Initial Development</a:t>
+            </a:r>
+          </a:p>
+        </p:txBody>
+      </p:sp>
+      <p:sp>
+        <p:nvSpPr>
+          <p:cNvPr id="4" name="TextBox 3">
+            <a:extLst>
+              <a:ext uri="{FF2B5EF4-FFF2-40B4-BE49-F238E27FC236}">
+                <a16:creationId xmlns:a16="http://schemas.microsoft.com/office/drawing/2014/main" id="{9C0ED2CA-4E99-E6E2-81D5-BDBAC5CF5BDB}"/>
+              </a:ext>
+            </a:extLst>
+          </p:cNvPr>
+          <p:cNvSpPr txBox="1"/>
+          <p:nvPr/>
+        </p:nvSpPr>
+        <p:spPr>
+          <a:xfrm>
+            <a:off x="185146" y="658687"/>
+            <a:ext cx="11592326" cy="6863417"/>
+          </a:xfrm>
+          <a:prstGeom prst="rect">
+            <a:avLst/>
+          </a:prstGeom>
+          <a:noFill/>
+        </p:spPr>
+        <p:txBody>
+          <a:bodyPr wrap="square" rtlCol="0">
+            <a:spAutoFit/>
+          </a:bodyPr>
+          <a:lstStyle/>
+          <a:p>
+            <a:pPr marL="571500" indent="-571500" fontAlgn="base">
+              <a:spcBef>
+                <a:spcPts val="2400"/>
+              </a:spcBef>
+              <a:buFont typeface="Wingdings" panose="05000000000000000000" pitchFamily="2" charset="2"/>
+              <a:buChar char="q"/>
+            </a:pPr>
+            <a:r>
+              <a:rPr lang="en-US" sz="3400" b="1" dirty="0">
+                <a:solidFill>
+                  <a:srgbClr val="19191C"/>
+                </a:solidFill>
+                <a:latin typeface="JetBrains Sans"/>
+              </a:rPr>
+              <a:t>2003</a:t>
+            </a:r>
+            <a:r>
+              <a:rPr lang="en-US" sz="3400" dirty="0">
+                <a:solidFill>
+                  <a:srgbClr val="19191C"/>
+                </a:solidFill>
+                <a:latin typeface="JetBrains Sans"/>
+              </a:rPr>
+              <a:t>: </a:t>
+            </a:r>
+            <a:r>
+              <a:rPr lang="en-US" sz="3600" dirty="0"/>
+              <a:t>Android Inc. was founded by Andy Rubin, Rich Miner, Nick Sears, and Chris White with the aim to create a powerful operating system for mobile devices</a:t>
+            </a:r>
+            <a:endParaRPr lang="en-US" sz="3400" dirty="0">
+              <a:solidFill>
+                <a:srgbClr val="19191C"/>
+              </a:solidFill>
+              <a:latin typeface="JetBrains Sans"/>
+            </a:endParaRPr>
+          </a:p>
+          <a:p>
+            <a:pPr marL="571500" indent="-571500" fontAlgn="base">
+              <a:spcBef>
+                <a:spcPts val="2400"/>
+              </a:spcBef>
+              <a:buFont typeface="Wingdings" panose="05000000000000000000" pitchFamily="2" charset="2"/>
+              <a:buChar char="q"/>
+            </a:pPr>
+            <a:r>
+              <a:rPr lang="en-US" sz="3600" b="1" dirty="0"/>
+              <a:t>2005</a:t>
+            </a:r>
+            <a:r>
+              <a:rPr lang="en-US" sz="3600" dirty="0"/>
+              <a:t>: Google acquired Android Inc.</a:t>
+            </a:r>
+            <a:r>
+              <a:rPr lang="en-US" sz="3400" b="0" i="0" dirty="0">
+                <a:solidFill>
+                  <a:srgbClr val="19191C"/>
+                </a:solidFill>
+                <a:effectLst/>
+                <a:latin typeface="JetBrains Sans"/>
+              </a:rPr>
+              <a:t> </a:t>
+            </a:r>
+          </a:p>
+          <a:p>
+            <a:pPr marL="571500" indent="-571500" fontAlgn="base">
+              <a:spcBef>
+                <a:spcPts val="2400"/>
+              </a:spcBef>
+              <a:buFont typeface="Wingdings" panose="05000000000000000000" pitchFamily="2" charset="2"/>
+              <a:buChar char="q"/>
+            </a:pPr>
+            <a:r>
+              <a:rPr lang="en-US" sz="3600" dirty="0"/>
+              <a:t>During this period, Android was being developed as a mobile operating system based on </a:t>
+            </a:r>
+            <a:r>
+              <a:rPr lang="en-US" sz="3600" b="1" dirty="0"/>
+              <a:t>Linux</a:t>
+            </a:r>
+            <a:r>
+              <a:rPr lang="en-US" sz="3600" dirty="0"/>
+              <a:t>, with a </a:t>
+            </a:r>
+            <a:r>
+              <a:rPr lang="en-US" sz="3600" b="1" dirty="0"/>
+              <a:t>Java-based API</a:t>
+            </a:r>
+            <a:r>
+              <a:rPr lang="en-US" sz="3600" dirty="0"/>
+              <a:t> for application development.</a:t>
+            </a:r>
+          </a:p>
+          <a:p>
+            <a:pPr marL="571500" indent="-571500" fontAlgn="base">
+              <a:spcBef>
+                <a:spcPts val="2400"/>
+              </a:spcBef>
+              <a:buFont typeface="Wingdings" panose="05000000000000000000" pitchFamily="2" charset="2"/>
+              <a:buChar char="q"/>
+            </a:pPr>
+            <a:r>
+              <a:rPr lang="en-US" sz="3600" b="1" dirty="0"/>
+              <a:t>2008</a:t>
+            </a:r>
+            <a:r>
+              <a:rPr lang="en-US" sz="3600" dirty="0"/>
+              <a:t>: The </a:t>
+            </a:r>
+            <a:r>
+              <a:rPr lang="en-US" sz="3600" b="1" dirty="0"/>
+              <a:t>first Android device</a:t>
+            </a:r>
+            <a:r>
+              <a:rPr lang="en-US" sz="3600" dirty="0"/>
+              <a:t>, the HTC Dream (T-Mobile G1), was released.</a:t>
+            </a:r>
+          </a:p>
+          <a:p>
+            <a:pPr marL="571500" indent="-571500" fontAlgn="base">
+              <a:spcBef>
+                <a:spcPts val="2400"/>
+              </a:spcBef>
+              <a:buFont typeface="Wingdings" panose="05000000000000000000" pitchFamily="2" charset="2"/>
+              <a:buChar char="q"/>
+            </a:pPr>
+            <a:r>
+              <a:rPr lang="en-US" sz="3600" b="0" i="0" dirty="0">
+                <a:solidFill>
+                  <a:srgbClr val="19191C"/>
+                </a:solidFill>
+                <a:effectLst/>
+                <a:latin typeface="JetBrains Sans"/>
+              </a:rPr>
+              <a:t>Till 2014: </a:t>
+            </a:r>
+            <a:r>
+              <a:rPr lang="en-US" sz="3600" dirty="0"/>
+              <a:t>Java remained the </a:t>
+            </a:r>
+            <a:r>
+              <a:rPr lang="en-US" sz="3600" b="1" dirty="0"/>
+              <a:t>official lang</a:t>
+            </a:r>
+            <a:r>
+              <a:rPr lang="en-US" sz="3600" dirty="0"/>
+              <a:t> for Android </a:t>
+            </a:r>
+            <a:endParaRPr lang="en-US" sz="3400" b="0" i="0" dirty="0">
+              <a:solidFill>
+                <a:srgbClr val="19191C"/>
+              </a:solidFill>
+              <a:effectLst/>
+              <a:latin typeface="JetBrains Sans"/>
+            </a:endParaRPr>
+          </a:p>
+        </p:txBody>
+      </p:sp>
+      <p:sp>
+        <p:nvSpPr>
+          <p:cNvPr id="6" name="Slide Number Placeholder 5">
+            <a:extLst>
+              <a:ext uri="{FF2B5EF4-FFF2-40B4-BE49-F238E27FC236}">
+                <a16:creationId xmlns:a16="http://schemas.microsoft.com/office/drawing/2014/main" id="{743E1225-1782-ED23-9485-A7DDC240CFD1}"/>
+              </a:ext>
+            </a:extLst>
+          </p:cNvPr>
+          <p:cNvSpPr>
+            <a:spLocks noGrp="1"/>
+          </p:cNvSpPr>
+          <p:nvPr>
+            <p:ph type="sldNum" sz="quarter" idx="12"/>
+          </p:nvPr>
+        </p:nvSpPr>
+        <p:spPr/>
+        <p:txBody>
+          <a:bodyPr/>
+          <a:lstStyle/>
+          <a:p>
+            <a:fld id="{148CC95F-0247-41B6-91CF-DC97C76A7088}" type="slidenum">
+              <a:rPr lang="en-US" sz="1800" smtClean="0"/>
+              <a:t>2</a:t>
+            </a:fld>
+            <a:endParaRPr lang="en-US" sz="1800" dirty="0"/>
+          </a:p>
+        </p:txBody>
+      </p:sp>
+    </p:spTree>
+    <p:extLst>
+      <p:ext uri="{BB962C8B-B14F-4D97-AF65-F5344CB8AC3E}">
+        <p14:creationId xmlns:p14="http://schemas.microsoft.com/office/powerpoint/2010/main" val="993154858"/>
+      </p:ext>
+    </p:extLst>
+  </p:cSld>
+  <p:clrMapOvr>
+    <a:masterClrMapping/>
+  </p:clrMapOvr>
+  <p:timing>
+    <p:tnLst>
+      <p:par>
+        <p:cTn id="1" dur="indefinite" restart="never" nodeType="tmRoot">
+          <p:childTnLst>
+            <p:seq concurrent="1" nextAc="seek">
+              <p:cTn id="2" dur="indefinite" nodeType="mainSeq">
+                <p:childTnLst>
+                  <p:par>
+                    <p:cTn id="3" fill="hold">
+                      <p:stCondLst>
+                        <p:cond delay="indefinite"/>
+                      </p:stCondLst>
+                      <p:childTnLst>
+                        <p:par>
+                          <p:cTn id="4" fill="hold">
+                            <p:stCondLst>
+                              <p:cond delay="0"/>
+                            </p:stCondLst>
+                            <p:childTnLst>
+                              <p:par>
+                                <p:cTn id="5" presetID="10" presetClass="entr" presetSubtype="0" fill="hold" grpId="0" nodeType="clickEffect">
+                                  <p:stCondLst>
+                                    <p:cond delay="0"/>
+                                  </p:stCondLst>
+                                  <p:childTnLst>
+                                    <p:set>
+                                      <p:cBhvr>
+                                        <p:cTn id="6" dur="1" fill="hold">
+                                          <p:stCondLst>
+                                            <p:cond delay="0"/>
+                                          </p:stCondLst>
+                                        </p:cTn>
+                                        <p:tgtEl>
+                                          <p:spTgt spid="4">
+                                            <p:txEl>
+                                              <p:pRg st="0" end="0"/>
+                                            </p:txEl>
+                                          </p:spTgt>
+                                        </p:tgtEl>
+                                        <p:attrNameLst>
+                                          <p:attrName>style.visibility</p:attrName>
+                                        </p:attrNameLst>
+                                      </p:cBhvr>
+                                      <p:to>
+                                        <p:strVal val="visible"/>
+                                      </p:to>
+                                    </p:set>
+                                    <p:animEffect transition="in" filter="fade">
+                                      <p:cBhvr>
+                                        <p:cTn id="7" dur="500"/>
+                                        <p:tgtEl>
+                                          <p:spTgt spid="4">
+                                            <p:txEl>
+                                              <p:pRg st="0" end="0"/>
+                                            </p:txEl>
+                                          </p:spTgt>
+                                        </p:tgtEl>
+                                      </p:cBhvr>
+                                    </p:animEffect>
+                                  </p:childTnLst>
+                                </p:cTn>
+                              </p:par>
+                              <p:par>
+                                <p:cTn id="8" presetID="10" presetClass="entr" presetSubtype="0" fill="hold" grpId="0" nodeType="withEffect">
+                                  <p:stCondLst>
+                                    <p:cond delay="0"/>
+                                  </p:stCondLst>
+                                  <p:childTnLst>
+                                    <p:set>
+                                      <p:cBhvr>
+                                        <p:cTn id="9" dur="1" fill="hold">
+                                          <p:stCondLst>
+                                            <p:cond delay="0"/>
+                                          </p:stCondLst>
+                                        </p:cTn>
+                                        <p:tgtEl>
+                                          <p:spTgt spid="4">
+                                            <p:txEl>
+                                              <p:pRg st="1" end="1"/>
+                                            </p:txEl>
+                                          </p:spTgt>
+                                        </p:tgtEl>
+                                        <p:attrNameLst>
+                                          <p:attrName>style.visibility</p:attrName>
+                                        </p:attrNameLst>
+                                      </p:cBhvr>
+                                      <p:to>
+                                        <p:strVal val="visible"/>
+                                      </p:to>
+                                    </p:set>
+                                    <p:animEffect transition="in" filter="fade">
+                                      <p:cBhvr>
+                                        <p:cTn id="10" dur="500"/>
+                                        <p:tgtEl>
+                                          <p:spTgt spid="4">
+                                            <p:txEl>
+                                              <p:pRg st="1" end="1"/>
+                                            </p:txEl>
+                                          </p:spTgt>
+                                        </p:tgtEl>
+                                      </p:cBhvr>
+                                    </p:animEffect>
+                                  </p:childTnLst>
+                                </p:cTn>
+                              </p:par>
+                            </p:childTnLst>
+                          </p:cTn>
+                        </p:par>
+                      </p:childTnLst>
+                    </p:cTn>
+                  </p:par>
+                  <p:par>
+                    <p:cTn id="11" fill="hold">
+                      <p:stCondLst>
+                        <p:cond delay="indefinite"/>
+                      </p:stCondLst>
+                      <p:childTnLst>
+                        <p:par>
+                          <p:cTn id="12" fill="hold">
+                            <p:stCondLst>
+                              <p:cond delay="0"/>
+                            </p:stCondLst>
+                            <p:childTnLst>
+                              <p:par>
+                                <p:cTn id="13" presetID="10" presetClass="entr" presetSubtype="0" fill="hold" grpId="0" nodeType="clickEffect">
+                                  <p:stCondLst>
+                                    <p:cond delay="0"/>
+                                  </p:stCondLst>
+                                  <p:childTnLst>
+                                    <p:set>
+                                      <p:cBhvr>
+                                        <p:cTn id="14" dur="1" fill="hold">
+                                          <p:stCondLst>
+                                            <p:cond delay="0"/>
+                                          </p:stCondLst>
+                                        </p:cTn>
+                                        <p:tgtEl>
+                                          <p:spTgt spid="2">
+                                            <p:txEl>
+                                              <p:pRg st="0" end="0"/>
+                                            </p:txEl>
+                                          </p:spTgt>
+                                        </p:tgtEl>
+                                        <p:attrNameLst>
+                                          <p:attrName>style.visibility</p:attrName>
+                                        </p:attrNameLst>
+                                      </p:cBhvr>
+                                      <p:to>
+                                        <p:strVal val="visible"/>
+                                      </p:to>
+                                    </p:set>
+                                    <p:animEffect transition="in" filter="fade">
+                                      <p:cBhvr>
+                                        <p:cTn id="15" dur="500"/>
+                                        <p:tgtEl>
+                                          <p:spTgt spid="2">
+                                            <p:txEl>
+                                              <p:pRg st="0" end="0"/>
+                                            </p:txEl>
+                                          </p:spTgt>
+                                        </p:tgtEl>
+                                      </p:cBhvr>
+                                    </p:animEffect>
+                                  </p:childTnLst>
+                                </p:cTn>
+                              </p:par>
+                              <p:par>
+                                <p:cTn id="16" presetID="10" presetClass="entr" presetSubtype="0" fill="hold" grpId="0" nodeType="withEffect">
+                                  <p:stCondLst>
+                                    <p:cond delay="0"/>
+                                  </p:stCondLst>
+                                  <p:childTnLst>
+                                    <p:set>
+                                      <p:cBhvr>
+                                        <p:cTn id="17" dur="1" fill="hold">
+                                          <p:stCondLst>
+                                            <p:cond delay="0"/>
+                                          </p:stCondLst>
+                                        </p:cTn>
+                                        <p:tgtEl>
+                                          <p:spTgt spid="4">
+                                            <p:txEl>
+                                              <p:pRg st="2" end="2"/>
+                                            </p:txEl>
+                                          </p:spTgt>
+                                        </p:tgtEl>
+                                        <p:attrNameLst>
+                                          <p:attrName>style.visibility</p:attrName>
+                                        </p:attrNameLst>
+                                      </p:cBhvr>
+                                      <p:to>
+                                        <p:strVal val="visible"/>
+                                      </p:to>
+                                    </p:set>
+                                    <p:animEffect transition="in" filter="fade">
+                                      <p:cBhvr>
+                                        <p:cTn id="18" dur="500"/>
+                                        <p:tgtEl>
+                                          <p:spTgt spid="4">
+                                            <p:txEl>
+                                              <p:pRg st="2" end="2"/>
+                                            </p:txEl>
+                                          </p:spTgt>
+                                        </p:tgtEl>
+                                      </p:cBhvr>
+                                    </p:animEffect>
+                                  </p:childTnLst>
+                                </p:cTn>
+                              </p:par>
+                              <p:par>
+                                <p:cTn id="19" presetID="10" presetClass="entr" presetSubtype="0" fill="hold" grpId="0" nodeType="withEffect">
+                                  <p:stCondLst>
+                                    <p:cond delay="0"/>
+                                  </p:stCondLst>
+                                  <p:childTnLst>
+                                    <p:set>
+                                      <p:cBhvr>
+                                        <p:cTn id="20" dur="1" fill="hold">
+                                          <p:stCondLst>
+                                            <p:cond delay="0"/>
+                                          </p:stCondLst>
+                                        </p:cTn>
+                                        <p:tgtEl>
+                                          <p:spTgt spid="4">
+                                            <p:txEl>
+                                              <p:pRg st="3" end="3"/>
+                                            </p:txEl>
+                                          </p:spTgt>
+                                        </p:tgtEl>
+                                        <p:attrNameLst>
+                                          <p:attrName>style.visibility</p:attrName>
+                                        </p:attrNameLst>
+                                      </p:cBhvr>
+                                      <p:to>
+                                        <p:strVal val="visible"/>
+                                      </p:to>
+                                    </p:set>
+                                    <p:animEffect transition="in" filter="fade">
+                                      <p:cBhvr>
+                                        <p:cTn id="21" dur="500"/>
+                                        <p:tgtEl>
+                                          <p:spTgt spid="4">
+                                            <p:txEl>
+                                              <p:pRg st="3" end="3"/>
+                                            </p:txEl>
+                                          </p:spTgt>
+                                        </p:tgtEl>
+                                      </p:cBhvr>
+                                    </p:animEffect>
+                                  </p:childTnLst>
+                                </p:cTn>
+                              </p:par>
+                              <p:par>
+                                <p:cTn id="22" presetID="10" presetClass="entr" presetSubtype="0" fill="hold" grpId="0" nodeType="withEffect">
+                                  <p:stCondLst>
+                                    <p:cond delay="0"/>
+                                  </p:stCondLst>
+                                  <p:childTnLst>
+                                    <p:set>
+                                      <p:cBhvr>
+                                        <p:cTn id="23" dur="1" fill="hold">
+                                          <p:stCondLst>
+                                            <p:cond delay="0"/>
+                                          </p:stCondLst>
+                                        </p:cTn>
+                                        <p:tgtEl>
+                                          <p:spTgt spid="4">
+                                            <p:txEl>
+                                              <p:pRg st="4" end="4"/>
+                                            </p:txEl>
+                                          </p:spTgt>
+                                        </p:tgtEl>
+                                        <p:attrNameLst>
+                                          <p:attrName>style.visibility</p:attrName>
+                                        </p:attrNameLst>
+                                      </p:cBhvr>
+                                      <p:to>
+                                        <p:strVal val="visible"/>
+                                      </p:to>
+                                    </p:set>
+                                    <p:animEffect transition="in" filter="fade">
+                                      <p:cBhvr>
+                                        <p:cTn id="24" dur="500"/>
+                                        <p:tgtEl>
+                                          <p:spTgt spid="4">
+                                            <p:txEl>
+                                              <p:pRg st="4" end="4"/>
+                                            </p:txEl>
+                                          </p:spTgt>
+                                        </p:tgtEl>
+                                      </p:cBhvr>
+                                    </p:animEffect>
+                                  </p:childTnLst>
+                                </p:cTn>
+                              </p:par>
+                            </p:childTnLst>
+                          </p:cTn>
+                        </p:par>
+                      </p:childTnLst>
+                    </p:cTn>
+                  </p:par>
+                </p:childTnLst>
+              </p:cTn>
+              <p:prevCondLst>
+                <p:cond evt="onPrev" delay="0">
+                  <p:tgtEl>
+                    <p:sldTgt/>
+                  </p:tgtEl>
+                </p:cond>
+              </p:prevCondLst>
+              <p:nextCondLst>
+                <p:cond evt="onNext" delay="0">
+                  <p:tgtEl>
+                    <p:sldTgt/>
+                  </p:tgtEl>
+                </p:cond>
+              </p:nextCondLst>
+            </p:seq>
+          </p:childTnLst>
+        </p:cTn>
+      </p:par>
+    </p:tnLst>
+    <p:bldLst>
+      <p:bldP spid="2" grpId="0" build="allAtOnce"/>
+      <p:bldP spid="4" grpId="0" uiExpand="1" build="allAtOnce"/>
+    </p:bldLst>
+  </p:timing>
+</p:sld>
+</file>
+
+<file path=ppt/slides/slide3.xml><?xml version="1.0" encoding="utf-8"?>
+<p:sld xmlns:a="http://schemas.openxmlformats.org/drawingml/2006/main" xmlns:r="http://schemas.openxmlformats.org/officeDocument/2006/relationships" xmlns:p="http://schemas.openxmlformats.org/presentationml/2006/main">
+  <p:cSld>
+    <p:spTree>
+      <p:nvGrpSpPr>
+        <p:cNvPr id="1" name="">
+          <a:extLst>
+            <a:ext uri="{FF2B5EF4-FFF2-40B4-BE49-F238E27FC236}">
+              <a16:creationId xmlns:a16="http://schemas.microsoft.com/office/drawing/2014/main" id="{50516BCF-706B-D0ED-68D9-9574A3CD4FF2}"/>
+            </a:ext>
+          </a:extLst>
+        </p:cNvPr>
+        <p:cNvGrpSpPr/>
+        <p:nvPr/>
+      </p:nvGrpSpPr>
+      <p:grpSpPr>
+        <a:xfrm>
+          <a:off x="0" y="0"/>
+          <a:ext cx="0" cy="0"/>
+          <a:chOff x="0" y="0"/>
+          <a:chExt cx="0" cy="0"/>
+        </a:xfrm>
+      </p:grpSpPr>
+      <p:pic>
+        <p:nvPicPr>
+          <p:cNvPr id="5" name="Picture 4" descr="Triangular abstract background">
+            <a:extLst>
+              <a:ext uri="{FF2B5EF4-FFF2-40B4-BE49-F238E27FC236}">
+                <a16:creationId xmlns:a16="http://schemas.microsoft.com/office/drawing/2014/main" id="{509A3561-0393-7A78-DC2F-DCAAE3742217}"/>
+              </a:ext>
+            </a:extLst>
+          </p:cNvPr>
+          <p:cNvPicPr>
+            <a:picLocks noChangeAspect="1"/>
+          </p:cNvPicPr>
+          <p:nvPr/>
+        </p:nvPicPr>
+        <p:blipFill>
+          <a:blip r:embed="rId2">
+            <a:alphaModFix amt="40000"/>
+          </a:blip>
+          <a:srcRect t="15730"/>
+          <a:stretch/>
+        </p:blipFill>
+        <p:spPr>
+          <a:xfrm>
+            <a:off x="-2" y="15496"/>
+            <a:ext cx="12192001" cy="6858001"/>
+          </a:xfrm>
+          <a:prstGeom prst="rect">
+            <a:avLst/>
+          </a:prstGeom>
+        </p:spPr>
+      </p:pic>
+      <p:sp>
+        <p:nvSpPr>
+          <p:cNvPr id="2" name="TextBox 1">
+            <a:extLst>
+              <a:ext uri="{FF2B5EF4-FFF2-40B4-BE49-F238E27FC236}">
+                <a16:creationId xmlns:a16="http://schemas.microsoft.com/office/drawing/2014/main" id="{9C2CA212-CF9F-61EB-6EFA-5EB87732DDFD}"/>
+              </a:ext>
+            </a:extLst>
+          </p:cNvPr>
+          <p:cNvSpPr txBox="1"/>
+          <p:nvPr/>
+        </p:nvSpPr>
+        <p:spPr>
+          <a:xfrm>
+            <a:off x="2273238" y="133817"/>
+            <a:ext cx="7955644" cy="769441"/>
           </a:xfrm>
           <a:prstGeom prst="rect">
             <a:avLst/>
@@ -4861,7 +6284,7 @@
                 <a:effectLst/>
                 <a:latin typeface="JetBrains Sans"/>
               </a:rPr>
-              <a:t>Introduction</a:t>
+              <a:t>Motivation for Java Replacement</a:t>
             </a:r>
             <a:endParaRPr lang="en-GB" sz="4400" dirty="0"/>
           </a:p>
@@ -4869,10 +6292,10 @@
       </p:sp>
       <p:sp>
         <p:nvSpPr>
-          <p:cNvPr id="3" name="TextBox 2">
-            <a:extLst>
-              <a:ext uri="{FF2B5EF4-FFF2-40B4-BE49-F238E27FC236}">
-                <a16:creationId xmlns:a16="http://schemas.microsoft.com/office/drawing/2014/main" id="{709CA279-4F05-E31B-933A-C9C5E78DE58D}"/>
+          <p:cNvPr id="4" name="TextBox 3">
+            <a:extLst>
+              <a:ext uri="{FF2B5EF4-FFF2-40B4-BE49-F238E27FC236}">
+                <a16:creationId xmlns:a16="http://schemas.microsoft.com/office/drawing/2014/main" id="{CFE36F7F-6943-FA2C-EAB9-2FBCD7294286}"/>
               </a:ext>
             </a:extLst>
           </p:cNvPr>
@@ -4881,8 +6304,8 @@
         </p:nvSpPr>
         <p:spPr>
           <a:xfrm>
-            <a:off x="6096000" y="1068069"/>
-            <a:ext cx="6096000" cy="369332"/>
+            <a:off x="299837" y="1021579"/>
+            <a:ext cx="11592326" cy="6063198"/>
           </a:xfrm>
           <a:prstGeom prst="rect">
             <a:avLst/>
@@ -4895,47 +6318,7 @@
           </a:bodyPr>
           <a:lstStyle/>
           <a:p>
-            <a:r>
-              <a:rPr lang="en-US" dirty="0">
-                <a:solidFill>
-                  <a:srgbClr val="FFFFFF"/>
-                </a:solidFill>
-              </a:rPr>
-              <a:t>Kotlin: Java replacement in Android programming</a:t>
-            </a:r>
-            <a:endParaRPr lang="en-GB" dirty="0"/>
-          </a:p>
-        </p:txBody>
-      </p:sp>
-      <p:sp>
-        <p:nvSpPr>
-          <p:cNvPr id="4" name="TextBox 3">
-            <a:extLst>
-              <a:ext uri="{FF2B5EF4-FFF2-40B4-BE49-F238E27FC236}">
-                <a16:creationId xmlns:a16="http://schemas.microsoft.com/office/drawing/2014/main" id="{9C0ED2CA-4E99-E6E2-81D5-BDBAC5CF5BDB}"/>
-              </a:ext>
-            </a:extLst>
-          </p:cNvPr>
-          <p:cNvSpPr txBox="1"/>
-          <p:nvPr/>
-        </p:nvSpPr>
-        <p:spPr>
-          <a:xfrm>
-            <a:off x="464949" y="737156"/>
-            <a:ext cx="11592326" cy="5724644"/>
-          </a:xfrm>
-          <a:prstGeom prst="rect">
-            <a:avLst/>
-          </a:prstGeom>
-          <a:noFill/>
-        </p:spPr>
-        <p:txBody>
-          <a:bodyPr wrap="square" rtlCol="0">
-            <a:spAutoFit/>
-          </a:bodyPr>
-          <a:lstStyle/>
-          <a:p>
-            <a:pPr marL="571500" indent="-571500" algn="l" fontAlgn="base">
+            <a:pPr marL="571500" indent="-571500" fontAlgn="base">
               <a:spcBef>
                 <a:spcPts val="2400"/>
               </a:spcBef>
@@ -4943,25 +6326,11 @@
               <a:buChar char="q"/>
             </a:pPr>
             <a:r>
-              <a:rPr lang="en-US" sz="3400" dirty="0">
-                <a:solidFill>
-                  <a:srgbClr val="19191C"/>
-                </a:solidFill>
-                <a:latin typeface="JetBrains Sans"/>
-              </a:rPr>
-              <a:t>Java has been the traditional language for Android</a:t>
-            </a:r>
-          </a:p>
-          <a:p>
-            <a:pPr marL="571500" indent="-571500" algn="l" fontAlgn="base">
-              <a:spcBef>
-                <a:spcPts val="2400"/>
-              </a:spcBef>
-              <a:buFont typeface="Wingdings" panose="05000000000000000000" pitchFamily="2" charset="2"/>
-              <a:buChar char="q"/>
-            </a:pPr>
-            <a:r>
-              <a:rPr lang="en-US" sz="3400" b="0" i="0" dirty="0">
+              <a:rPr lang="en-US" sz="2800" b="1" dirty="0"/>
+              <a:t>Java is Verbose: </a:t>
+            </a:r>
+            <a:r>
+              <a:rPr lang="en-US" sz="2800" b="0" i="0" dirty="0">
                 <a:solidFill>
                   <a:srgbClr val="19191C"/>
                 </a:solidFill>
@@ -4980,24 +6349,12 @@
               <a:buChar char="q"/>
             </a:pPr>
             <a:r>
-              <a:rPr lang="en-US" sz="3400" dirty="0"/>
-              <a:t>Android Developers experimented with </a:t>
-            </a:r>
-            <a:r>
-              <a:rPr lang="en-US" sz="3400" b="1" dirty="0"/>
-              <a:t>Scala, C# (Xamarin), C++ (NDK), Groovy and JS-based frameworks (Clojure, </a:t>
-            </a:r>
-            <a:r>
-              <a:rPr lang="en-US" sz="3400" b="1" dirty="0" err="1"/>
-              <a:t>JRuby</a:t>
-            </a:r>
-            <a:r>
-              <a:rPr lang="en-US" sz="3400" b="1" dirty="0"/>
-              <a:t>)</a:t>
-            </a:r>
-            <a:r>
-              <a:rPr lang="en-US" sz="3400" dirty="0"/>
-              <a:t>, but none matched Java’s balance of performance and tooling. </a:t>
+              <a:rPr lang="en-US" sz="2800" b="1" dirty="0"/>
+              <a:t>Slow Evolution in Android</a:t>
+            </a:r>
+            <a:r>
+              <a:rPr lang="en-US" sz="2800" dirty="0"/>
+              <a:t>: a gap between modern Java capabilities and what Android developers could actually use.</a:t>
             </a:r>
           </a:p>
           <a:p>
@@ -5009,14 +6366,40 @@
               <a:buChar char="q"/>
             </a:pPr>
             <a:r>
-              <a:rPr lang="en-US" sz="3400" dirty="0"/>
-              <a:t>Kotlin succeeded by </a:t>
-            </a:r>
-            <a:r>
-              <a:rPr lang="en-US" sz="3400" b="1" dirty="0"/>
-              <a:t>improving Java without breaking compatibility</a:t>
-            </a:r>
-            <a:endParaRPr lang="en-US" sz="3400" b="0" i="0" dirty="0">
+              <a:rPr lang="en-US" sz="2800" b="1" dirty="0"/>
+              <a:t>Lack of Built-in Null Safety:</a:t>
+            </a:r>
+            <a:r>
+              <a:rPr lang="en-US" sz="2800" dirty="0"/>
+              <a:t> One of the most common cause of app crash (Null Pointer Exception)</a:t>
+            </a:r>
+          </a:p>
+          <a:p>
+            <a:pPr marL="571500" indent="-571500" fontAlgn="base">
+              <a:spcBef>
+                <a:spcPts val="2400"/>
+              </a:spcBef>
+              <a:buFont typeface="Wingdings" panose="05000000000000000000" pitchFamily="2" charset="2"/>
+              <a:buChar char="q"/>
+            </a:pPr>
+            <a:r>
+              <a:rPr lang="en-US" sz="2800" b="1" dirty="0"/>
+              <a:t>Outdated Language Features:</a:t>
+            </a:r>
+            <a:r>
+              <a:rPr lang="en-US" sz="2800" dirty="0"/>
+              <a:t> Java (especially versions 6 and 7, which were used in Android for years) lacked modern language features such as: Lambda expressions, Type inference, Extension functions, Smart casting</a:t>
+            </a:r>
+          </a:p>
+          <a:p>
+            <a:pPr marL="571500" indent="-571500" fontAlgn="base">
+              <a:spcBef>
+                <a:spcPts val="2400"/>
+              </a:spcBef>
+              <a:buFont typeface="Wingdings" panose="05000000000000000000" pitchFamily="2" charset="2"/>
+              <a:buChar char="q"/>
+            </a:pPr>
+            <a:endParaRPr lang="en-US" sz="2800" b="0" i="0" dirty="0">
               <a:solidFill>
                 <a:srgbClr val="19191C"/>
               </a:solidFill>
@@ -5031,7 +6414,7 @@
           <p:cNvPr id="6" name="Slide Number Placeholder 5">
             <a:extLst>
               <a:ext uri="{FF2B5EF4-FFF2-40B4-BE49-F238E27FC236}">
-                <a16:creationId xmlns:a16="http://schemas.microsoft.com/office/drawing/2014/main" id="{743E1225-1782-ED23-9485-A7DDC240CFD1}"/>
+                <a16:creationId xmlns:a16="http://schemas.microsoft.com/office/drawing/2014/main" id="{B14D8B3B-8CE1-122E-DDD7-15E6B9349186}"/>
               </a:ext>
             </a:extLst>
           </p:cNvPr>
@@ -5049,7 +6432,7 @@
           <a:p>
             <a:fld id="{148CC95F-0247-41B6-91CF-DC97C76A7088}" type="slidenum">
               <a:rPr lang="en-US" sz="1800" smtClean="0"/>
-              <a:t>2</a:t>
+              <a:t>3</a:t>
             </a:fld>
             <a:endParaRPr lang="en-US" sz="1800" dirty="0"/>
           </a:p>
@@ -5058,7 +6441,7 @@
     </p:spTree>
     <p:extLst>
       <p:ext uri="{BB962C8B-B14F-4D97-AF65-F5344CB8AC3E}">
-        <p14:creationId xmlns:p14="http://schemas.microsoft.com/office/powerpoint/2010/main" val="993154858"/>
+        <p14:creationId xmlns:p14="http://schemas.microsoft.com/office/powerpoint/2010/main" val="1287619882"/>
       </p:ext>
     </p:extLst>
   </p:cSld>
@@ -5457,7 +6840,7 @@
 </p:sld>
 </file>
 
-<file path=ppt/slides/slide3.xml><?xml version="1.0" encoding="utf-8"?>
+<file path=ppt/slides/slide4.xml><?xml version="1.0" encoding="utf-8"?>
 <p:sld xmlns:a="http://schemas.openxmlformats.org/drawingml/2006/main" xmlns:r="http://schemas.openxmlformats.org/officeDocument/2006/relationships" xmlns:p="http://schemas.openxmlformats.org/presentationml/2006/main">
   <p:cSld>
     <p:spTree>
@@ -5524,9 +6907,9 @@
           <p:nvPr/>
         </p:nvSpPr>
         <p:spPr>
-          <a:xfrm rot="307827">
-            <a:off x="8030487" y="252722"/>
-            <a:ext cx="4000398" cy="769441"/>
+          <a:xfrm>
+            <a:off x="1109915" y="-2"/>
+            <a:ext cx="10218106" cy="769441"/>
           </a:xfrm>
           <a:prstGeom prst="rect">
             <a:avLst/>
@@ -5547,7 +6930,7 @@
                 <a:effectLst/>
                 <a:latin typeface="JetBrains Sans"/>
               </a:rPr>
-              <a:t>What is Kotlin?</a:t>
+              <a:t>Features for Java Replacement in Android</a:t>
             </a:r>
             <a:endParaRPr lang="en-GB" sz="4400" dirty="0"/>
           </a:p>
@@ -5567,8 +6950,8 @@
         </p:nvSpPr>
         <p:spPr>
           <a:xfrm>
-            <a:off x="282082" y="1028471"/>
-            <a:ext cx="11045939" cy="4401205"/>
+            <a:off x="249846" y="769439"/>
+            <a:ext cx="11527626" cy="5693866"/>
           </a:xfrm>
           <a:prstGeom prst="rect">
             <a:avLst/>
@@ -5580,6 +6963,55 @@
             <a:spAutoFit/>
           </a:bodyPr>
           <a:lstStyle/>
+          <a:p>
+            <a:pPr marL="571500" indent="-571500" fontAlgn="base">
+              <a:spcBef>
+                <a:spcPts val="2400"/>
+              </a:spcBef>
+              <a:buFont typeface="Wingdings" panose="05000000000000000000" pitchFamily="2" charset="2"/>
+              <a:buChar char="q"/>
+            </a:pPr>
+            <a:r>
+              <a:rPr lang="en-US" sz="4400" dirty="0"/>
+              <a:t>Improve Java without breaking compatibility</a:t>
+            </a:r>
+          </a:p>
+          <a:p>
+            <a:pPr marL="571500" indent="-571500" fontAlgn="base">
+              <a:spcBef>
+                <a:spcPts val="2400"/>
+              </a:spcBef>
+              <a:buFont typeface="Wingdings" panose="05000000000000000000" pitchFamily="2" charset="2"/>
+              <a:buChar char="q"/>
+            </a:pPr>
+            <a:r>
+              <a:rPr lang="en-US" sz="4400" dirty="0">
+                <a:solidFill>
+                  <a:srgbClr val="19191C"/>
+                </a:solidFill>
+                <a:latin typeface="JetBrains Sans"/>
+              </a:rPr>
+              <a:t>Modern Features</a:t>
+            </a:r>
+          </a:p>
+          <a:p>
+            <a:pPr marL="571500" indent="-571500" fontAlgn="base">
+              <a:spcBef>
+                <a:spcPts val="2400"/>
+              </a:spcBef>
+              <a:buFont typeface="Wingdings" panose="05000000000000000000" pitchFamily="2" charset="2"/>
+              <a:buChar char="q"/>
+            </a:pPr>
+            <a:r>
+              <a:rPr lang="en-US" sz="4400" dirty="0">
+                <a:solidFill>
+                  <a:srgbClr val="19191C"/>
+                </a:solidFill>
+                <a:latin typeface="JetBrains Sans"/>
+              </a:rPr>
+              <a:t>Shallow Learning curve</a:t>
+            </a:r>
+          </a:p>
           <a:p>
             <a:pPr marL="571500" indent="-571500" algn="l" fontAlgn="base">
               <a:spcBef>
@@ -5595,7 +7027,7 @@
                 </a:solidFill>
                 <a:latin typeface="JetBrains Sans"/>
               </a:rPr>
-              <a:t>A</a:t>
+              <a:t>O</a:t>
             </a:r>
             <a:r>
               <a:rPr lang="en-US" sz="4400" b="0" i="0" dirty="0">
@@ -5605,7 +7037,7 @@
                 <a:effectLst/>
                 <a:latin typeface="JetBrains Sans"/>
               </a:rPr>
-              <a:t>n open-source </a:t>
+              <a:t>pen-source </a:t>
             </a:r>
           </a:p>
           <a:p>
@@ -5643,17 +7075,25 @@
                 <a:effectLst/>
                 <a:latin typeface="JetBrains Sans"/>
               </a:rPr>
-              <a:t>Targets the JVM, Android, JavaScript, </a:t>
-            </a:r>
-            <a:r>
-              <a:rPr lang="en-US" sz="4400" b="0" i="0" dirty="0" err="1">
+              <a:t>Targets the JVM, Android</a:t>
+            </a:r>
+            <a:r>
+              <a:rPr lang="en-US" sz="4400" dirty="0">
                 <a:solidFill>
                   <a:srgbClr val="19191C"/>
                 </a:solidFill>
-                <a:effectLst/>
                 <a:latin typeface="JetBrains Sans"/>
               </a:rPr>
-              <a:t>Wasm</a:t>
+              <a:t> </a:t>
+            </a:r>
+            <a:r>
+              <a:rPr lang="en-US" sz="4400" dirty="0" err="1">
+                <a:solidFill>
+                  <a:srgbClr val="19191C"/>
+                </a:solidFill>
+                <a:latin typeface="JetBrains Sans"/>
+              </a:rPr>
+              <a:t>etc</a:t>
             </a:r>
             <a:r>
               <a:rPr lang="en-US" sz="4400" b="0" i="0" dirty="0">
@@ -5663,44 +7103,8 @@
                 <a:effectLst/>
                 <a:latin typeface="JetBrains Sans"/>
               </a:rPr>
-              <a:t>, and Native. </a:t>
-            </a:r>
-          </a:p>
-          <a:p>
-            <a:pPr marL="571500" indent="-571500" algn="l" fontAlgn="base">
-              <a:spcBef>
-                <a:spcPts val="2400"/>
-              </a:spcBef>
-              <a:buFont typeface="Wingdings" panose="05000000000000000000" pitchFamily="2" charset="2"/>
-              <a:buChar char="q"/>
-            </a:pPr>
-            <a:r>
-              <a:rPr lang="en-US" sz="4400" b="0" i="0" dirty="0">
-                <a:solidFill>
-                  <a:srgbClr val="19191C"/>
-                </a:solidFill>
-                <a:effectLst/>
-                <a:latin typeface="JetBrains Sans"/>
-              </a:rPr>
-              <a:t>Kotlin was developed by </a:t>
-            </a:r>
-            <a:r>
-              <a:rPr lang="en-US" sz="4400" b="0" i="0" dirty="0" err="1">
-                <a:solidFill>
-                  <a:srgbClr val="19191C"/>
-                </a:solidFill>
-                <a:effectLst/>
-                <a:latin typeface="JetBrains Sans"/>
-              </a:rPr>
-              <a:t>Jetbrains</a:t>
-            </a:r>
-            <a:endParaRPr lang="en-US" sz="4400" b="0" i="0" dirty="0">
-              <a:solidFill>
-                <a:srgbClr val="19191C"/>
-              </a:solidFill>
-              <a:effectLst/>
-              <a:latin typeface="JetBrains Sans"/>
-            </a:endParaRPr>
+              <a:t> </a:t>
+            </a:r>
           </a:p>
         </p:txBody>
       </p:sp>
@@ -5727,7 +7131,7 @@
           <a:p>
             <a:fld id="{148CC95F-0247-41B6-91CF-DC97C76A7088}" type="slidenum">
               <a:rPr lang="en-US" sz="1800" smtClean="0"/>
-              <a:t>3</a:t>
+              <a:t>4</a:t>
             </a:fld>
             <a:endParaRPr lang="en-US" sz="1800" dirty="0"/>
           </a:p>
@@ -5840,7 +7244,7 @@
                                         <p:tgtEl>
                                           <p:spTgt spid="4">
                                             <p:txEl>
-                                              <p:pRg st="1" end="1"/>
+                                              <p:pRg st="3" end="3"/>
                                             </p:txEl>
                                           </p:spTgt>
                                         </p:tgtEl>
@@ -5858,7 +7262,7 @@
                                         <p:tgtEl>
                                           <p:spTgt spid="4">
                                             <p:txEl>
-                                              <p:pRg st="1" end="1"/>
+                                              <p:pRg st="3" end="3"/>
                                             </p:txEl>
                                           </p:spTgt>
                                         </p:tgtEl>
@@ -5901,7 +7305,7 @@
                                         <p:tgtEl>
                                           <p:spTgt spid="4">
                                             <p:txEl>
-                                              <p:pRg st="2" end="2"/>
+                                              <p:pRg st="1" end="1"/>
                                             </p:txEl>
                                           </p:spTgt>
                                         </p:tgtEl>
@@ -5919,7 +7323,7 @@
                                         <p:tgtEl>
                                           <p:spTgt spid="4">
                                             <p:txEl>
-                                              <p:pRg st="2" end="2"/>
+                                              <p:pRg st="1" end="1"/>
                                             </p:txEl>
                                           </p:spTgt>
                                         </p:tgtEl>
@@ -5947,7 +7351,7 @@
                             </p:stCondLst>
                             <p:childTnLst>
                               <p:par>
-                                <p:cTn id="20" presetID="22" presetClass="entr" presetSubtype="4" fill="hold" nodeType="clickEffect">
+                                <p:cTn id="20" presetID="10" presetClass="entr" presetSubtype="0" fill="hold" nodeType="clickEffect">
                                   <p:stCondLst>
                                     <p:cond delay="0"/>
                                   </p:stCondLst>
@@ -5962,7 +7366,7 @@
                                         <p:tgtEl>
                                           <p:spTgt spid="4">
                                             <p:txEl>
-                                              <p:pRg st="3" end="3"/>
+                                              <p:pRg st="2" end="2"/>
                                             </p:txEl>
                                           </p:spTgt>
                                         </p:tgtEl>
@@ -5974,13 +7378,13 @@
                                         <p:strVal val="visible"/>
                                       </p:to>
                                     </p:set>
-                                    <p:animEffect transition="in" filter="wipe(down)">
+                                    <p:animEffect transition="in" filter="fade">
                                       <p:cBhvr>
                                         <p:cTn id="22" dur="500"/>
                                         <p:tgtEl>
                                           <p:spTgt spid="4">
                                             <p:txEl>
-                                              <p:pRg st="3" end="3"/>
+                                              <p:pRg st="2" end="2"/>
                                             </p:txEl>
                                           </p:spTgt>
                                         </p:tgtEl>
@@ -6008,7 +7412,7 @@
                             </p:stCondLst>
                             <p:childTnLst>
                               <p:par>
-                                <p:cTn id="25" presetID="42" presetClass="entr" presetSubtype="0" fill="hold" nodeType="clickEffect">
+                                <p:cTn id="25" presetID="10" presetClass="entr" presetSubtype="0" fill="hold" nodeType="clickEffect">
                                   <p:stCondLst>
                                     <p:cond delay="0"/>
                                   </p:stCondLst>
@@ -6016,6 +7420,128 @@
                                     <p:set>
                                       <p:cBhvr>
                                         <p:cTn id="26" dur="1" fill="hold">
+                                          <p:stCondLst>
+                                            <p:cond delay="0"/>
+                                          </p:stCondLst>
+                                        </p:cTn>
+                                        <p:tgtEl>
+                                          <p:spTgt spid="4">
+                                            <p:txEl>
+                                              <p:pRg st="4" end="4"/>
+                                            </p:txEl>
+                                          </p:spTgt>
+                                        </p:tgtEl>
+                                        <p:attrNameLst>
+                                          <p:attrName>style.visibility</p:attrName>
+                                        </p:attrNameLst>
+                                      </p:cBhvr>
+                                      <p:to>
+                                        <p:strVal val="visible"/>
+                                      </p:to>
+                                    </p:set>
+                                    <p:animEffect transition="in" filter="fade">
+                                      <p:cBhvr>
+                                        <p:cTn id="27" dur="500"/>
+                                        <p:tgtEl>
+                                          <p:spTgt spid="4">
+                                            <p:txEl>
+                                              <p:pRg st="4" end="4"/>
+                                            </p:txEl>
+                                          </p:spTgt>
+                                        </p:tgtEl>
+                                      </p:cBhvr>
+                                    </p:animEffect>
+                                  </p:childTnLst>
+                                </p:cTn>
+                              </p:par>
+                            </p:childTnLst>
+                          </p:cTn>
+                        </p:par>
+                      </p:childTnLst>
+                    </p:cTn>
+                  </p:par>
+                  <p:par>
+                    <p:cTn id="28" fill="hold">
+                      <p:stCondLst>
+                        <p:cond delay="indefinite"/>
+                      </p:stCondLst>
+                      <p:childTnLst>
+                        <p:par>
+                          <p:cTn id="29" fill="hold">
+                            <p:stCondLst>
+                              <p:cond delay="0"/>
+                            </p:stCondLst>
+                            <p:childTnLst>
+                              <p:par>
+                                <p:cTn id="30" presetID="10" presetClass="entr" presetSubtype="0" fill="hold" nodeType="clickEffect">
+                                  <p:stCondLst>
+                                    <p:cond delay="0"/>
+                                  </p:stCondLst>
+                                  <p:childTnLst>
+                                    <p:set>
+                                      <p:cBhvr>
+                                        <p:cTn id="31" dur="1" fill="hold">
+                                          <p:stCondLst>
+                                            <p:cond delay="0"/>
+                                          </p:stCondLst>
+                                        </p:cTn>
+                                        <p:tgtEl>
+                                          <p:spTgt spid="4">
+                                            <p:txEl>
+                                              <p:pRg st="5" end="5"/>
+                                            </p:txEl>
+                                          </p:spTgt>
+                                        </p:tgtEl>
+                                        <p:attrNameLst>
+                                          <p:attrName>style.visibility</p:attrName>
+                                        </p:attrNameLst>
+                                      </p:cBhvr>
+                                      <p:to>
+                                        <p:strVal val="visible"/>
+                                      </p:to>
+                                    </p:set>
+                                    <p:animEffect transition="in" filter="fade">
+                                      <p:cBhvr>
+                                        <p:cTn id="32" dur="500"/>
+                                        <p:tgtEl>
+                                          <p:spTgt spid="4">
+                                            <p:txEl>
+                                              <p:pRg st="5" end="5"/>
+                                            </p:txEl>
+                                          </p:spTgt>
+                                        </p:tgtEl>
+                                      </p:cBhvr>
+                                    </p:animEffect>
+                                  </p:childTnLst>
+                                </p:cTn>
+                              </p:par>
+                            </p:childTnLst>
+                          </p:cTn>
+                        </p:par>
+                      </p:childTnLst>
+                    </p:cTn>
+                  </p:par>
+                  <p:par>
+                    <p:cTn id="33" fill="hold">
+                      <p:stCondLst>
+                        <p:cond delay="indefinite"/>
+                      </p:stCondLst>
+                      <p:childTnLst>
+                        <p:par>
+                          <p:cTn id="34" fill="hold">
+                            <p:stCondLst>
+                              <p:cond delay="0"/>
+                            </p:stCondLst>
+                            <p:childTnLst>
+                              <p:par>
+                                <p:cTn id="35" presetID="42" presetClass="entr" presetSubtype="0" fill="hold" nodeType="clickEffect">
+                                  <p:stCondLst>
+                                    <p:cond delay="0"/>
+                                  </p:stCondLst>
+                                  <p:childTnLst>
+                                    <p:set>
+                                      <p:cBhvr>
+                                        <p:cTn id="36" dur="1" fill="hold">
                                           <p:stCondLst>
                                             <p:cond delay="0"/>
                                           </p:stCondLst>
@@ -6037,7 +7563,7 @@
                                     </p:set>
                                     <p:animEffect transition="in" filter="fade">
                                       <p:cBhvr>
-                                        <p:cTn id="27" dur="1000"/>
+                                        <p:cTn id="37" dur="1000"/>
                                         <p:tgtEl>
                                           <p:spTgt spid="2">
                                             <p:txEl>
@@ -6049,7 +7575,7 @@
                                     </p:animEffect>
                                     <p:anim calcmode="lin" valueType="num">
                                       <p:cBhvr>
-                                        <p:cTn id="28" dur="1000" fill="hold"/>
+                                        <p:cTn id="38" dur="1000" fill="hold"/>
                                         <p:tgtEl>
                                           <p:spTgt spid="2">
                                             <p:txEl>
@@ -6076,7 +7602,7 @@
                                     </p:anim>
                                     <p:anim calcmode="lin" valueType="num">
                                       <p:cBhvr>
-                                        <p:cTn id="29" dur="1000" fill="hold"/>
+                                        <p:cTn id="39" dur="1000" fill="hold"/>
                                         <p:tgtEl>
                                           <p:spTgt spid="2">
                                             <p:txEl>
@@ -6135,7 +7661,7 @@
 </p:sld>
 </file>
 
-<file path=ppt/slides/slide4.xml><?xml version="1.0" encoding="utf-8"?>
+<file path=ppt/slides/slide5.xml><?xml version="1.0" encoding="utf-8"?>
 <p:sld xmlns:a="http://schemas.openxmlformats.org/drawingml/2006/main" xmlns:r="http://schemas.openxmlformats.org/officeDocument/2006/relationships" xmlns:p="http://schemas.openxmlformats.org/presentationml/2006/main">
   <p:cSld>
     <p:spTree>
@@ -6202,9 +7728,9 @@
           <p:nvPr/>
         </p:nvSpPr>
         <p:spPr>
-          <a:xfrm rot="307827">
-            <a:off x="8030487" y="252722"/>
-            <a:ext cx="4000398" cy="769441"/>
+          <a:xfrm>
+            <a:off x="2045777" y="285666"/>
+            <a:ext cx="7877339" cy="769441"/>
           </a:xfrm>
           <a:prstGeom prst="rect">
             <a:avLst/>
@@ -6225,7 +7751,27 @@
                 <a:effectLst/>
                 <a:latin typeface="JetBrains Sans"/>
               </a:rPr>
-              <a:t>Why Kotlin?</a:t>
+              <a:t>Why </a:t>
+            </a:r>
+            <a:r>
+              <a:rPr lang="en-US" sz="4400" b="1" i="0" dirty="0" err="1">
+                <a:solidFill>
+                  <a:srgbClr val="19191C"/>
+                </a:solidFill>
+                <a:effectLst/>
+                <a:latin typeface="JetBrains Sans"/>
+              </a:rPr>
+              <a:t>Jetbrains</a:t>
+            </a:r>
+            <a:r>
+              <a:rPr lang="en-US" sz="4400" b="1" i="0" dirty="0">
+                <a:solidFill>
+                  <a:srgbClr val="19191C"/>
+                </a:solidFill>
+                <a:effectLst/>
+                <a:latin typeface="JetBrains Sans"/>
+              </a:rPr>
+              <a:t> developed Kotlin?</a:t>
             </a:r>
             <a:endParaRPr lang="en-GB" sz="4400" dirty="0"/>
           </a:p>
@@ -6301,7 +7847,26 @@
                 <a:effectLst/>
                 <a:latin typeface="Inter"/>
               </a:rPr>
-              <a:t> products were developed in Java, they decided to build </a:t>
+              <a:t> products were </a:t>
+            </a:r>
+            <a:r>
+              <a:rPr lang="en-US" sz="4400" dirty="0">
+                <a:solidFill>
+                  <a:srgbClr val="000000"/>
+                </a:solidFill>
+                <a:latin typeface="Inter"/>
+              </a:rPr>
+              <a:t>based on JVM and</a:t>
+            </a:r>
+            <a:r>
+              <a:rPr lang="en-US" sz="4400" b="0" i="0" dirty="0">
+                <a:solidFill>
+                  <a:srgbClr val="000000"/>
+                </a:solidFill>
+                <a:effectLst/>
+                <a:latin typeface="Inter"/>
+              </a:rPr>
+              <a:t> Java, they decided to build </a:t>
             </a:r>
           </a:p>
           <a:p>
@@ -6394,6 +7959,15 @@
               </a:rPr>
               <a:t>New constructs such as high-order functions, Null Safety, Smart cast</a:t>
             </a:r>
+            <a:r>
+              <a:rPr lang="en-US" sz="4400" dirty="0">
+                <a:solidFill>
+                  <a:srgbClr val="000000"/>
+                </a:solidFill>
+                <a:latin typeface="Inter"/>
+              </a:rPr>
+              <a:t>, Extension functions</a:t>
+            </a:r>
             <a:endParaRPr lang="en-US" sz="4400" b="0" i="0" dirty="0">
               <a:solidFill>
                 <a:srgbClr val="19191C"/>
@@ -6427,7 +8001,7 @@
           <a:p>
             <a:fld id="{148CC95F-0247-41B6-91CF-DC97C76A7088}" type="slidenum">
               <a:rPr lang="en-US" sz="1800" smtClean="0"/>
-              <a:t>4</a:t>
+              <a:t>5</a:t>
             </a:fld>
             <a:endParaRPr lang="en-US" sz="1800" dirty="0"/>
           </a:p>
@@ -6659,982 +8233,6 @@
 </p:sld>
 </file>
 
-<file path=ppt/slides/slide5.xml><?xml version="1.0" encoding="utf-8"?>
-<p:sld xmlns:a="http://schemas.openxmlformats.org/drawingml/2006/main" xmlns:r="http://schemas.openxmlformats.org/officeDocument/2006/relationships" xmlns:p="http://schemas.openxmlformats.org/presentationml/2006/main">
-  <p:cSld>
-    <p:spTree>
-      <p:nvGrpSpPr>
-        <p:cNvPr id="1" name="">
-          <a:extLst>
-            <a:ext uri="{FF2B5EF4-FFF2-40B4-BE49-F238E27FC236}">
-              <a16:creationId xmlns:a16="http://schemas.microsoft.com/office/drawing/2014/main" id="{1A650373-5E04-E1E6-FBCC-9574C0FB37F9}"/>
-            </a:ext>
-          </a:extLst>
-        </p:cNvPr>
-        <p:cNvGrpSpPr/>
-        <p:nvPr/>
-      </p:nvGrpSpPr>
-      <p:grpSpPr>
-        <a:xfrm>
-          <a:off x="0" y="0"/>
-          <a:ext cx="0" cy="0"/>
-          <a:chOff x="0" y="0"/>
-          <a:chExt cx="0" cy="0"/>
-        </a:xfrm>
-      </p:grpSpPr>
-      <p:pic>
-        <p:nvPicPr>
-          <p:cNvPr id="5" name="Picture 4" descr="Triangular abstract background">
-            <a:extLst>
-              <a:ext uri="{FF2B5EF4-FFF2-40B4-BE49-F238E27FC236}">
-                <a16:creationId xmlns:a16="http://schemas.microsoft.com/office/drawing/2014/main" id="{D3A751A1-9CB4-E1E4-163E-3F431AC47F09}"/>
-              </a:ext>
-            </a:extLst>
-          </p:cNvPr>
-          <p:cNvPicPr>
-            <a:picLocks noChangeAspect="1"/>
-          </p:cNvPicPr>
-          <p:nvPr/>
-        </p:nvPicPr>
-        <p:blipFill>
-          <a:blip r:embed="rId2">
-            <a:alphaModFix amt="40000"/>
-          </a:blip>
-          <a:srcRect t="15730"/>
-          <a:stretch/>
-        </p:blipFill>
-        <p:spPr>
-          <a:xfrm>
-            <a:off x="0" y="0"/>
-            <a:ext cx="12192001" cy="6858001"/>
-          </a:xfrm>
-          <a:prstGeom prst="rect">
-            <a:avLst/>
-          </a:prstGeom>
-        </p:spPr>
-      </p:pic>
-      <p:sp>
-        <p:nvSpPr>
-          <p:cNvPr id="2" name="TextBox 1">
-            <a:extLst>
-              <a:ext uri="{FF2B5EF4-FFF2-40B4-BE49-F238E27FC236}">
-                <a16:creationId xmlns:a16="http://schemas.microsoft.com/office/drawing/2014/main" id="{EC8ED991-B5D2-101F-8A05-028CF9C176B1}"/>
-              </a:ext>
-            </a:extLst>
-          </p:cNvPr>
-          <p:cNvSpPr txBox="1"/>
-          <p:nvPr/>
-        </p:nvSpPr>
-        <p:spPr>
-          <a:xfrm rot="307827">
-            <a:off x="8030487" y="252722"/>
-            <a:ext cx="4000398" cy="769441"/>
-          </a:xfrm>
-          <a:prstGeom prst="rect">
-            <a:avLst/>
-          </a:prstGeom>
-          <a:noFill/>
-        </p:spPr>
-        <p:txBody>
-          <a:bodyPr wrap="square" rtlCol="0">
-            <a:spAutoFit/>
-          </a:bodyPr>
-          <a:lstStyle/>
-          <a:p>
-            <a:r>
-              <a:rPr lang="en-US" sz="4400" b="1" i="0" dirty="0">
-                <a:solidFill>
-                  <a:srgbClr val="19191C"/>
-                </a:solidFill>
-                <a:effectLst/>
-                <a:latin typeface="JetBrains Sans"/>
-              </a:rPr>
-              <a:t>Why Kotlin?</a:t>
-            </a:r>
-            <a:endParaRPr lang="en-GB" sz="4400" dirty="0"/>
-          </a:p>
-        </p:txBody>
-      </p:sp>
-      <p:sp>
-        <p:nvSpPr>
-          <p:cNvPr id="4" name="TextBox 3">
-            <a:extLst>
-              <a:ext uri="{FF2B5EF4-FFF2-40B4-BE49-F238E27FC236}">
-                <a16:creationId xmlns:a16="http://schemas.microsoft.com/office/drawing/2014/main" id="{B33AFF1B-CB69-4A16-96FC-87377AE55C9F}"/>
-              </a:ext>
-            </a:extLst>
-          </p:cNvPr>
-          <p:cNvSpPr txBox="1"/>
-          <p:nvPr/>
-        </p:nvSpPr>
-        <p:spPr>
-          <a:xfrm>
-            <a:off x="251857" y="678575"/>
-            <a:ext cx="5844143" cy="769441"/>
-          </a:xfrm>
-          <a:prstGeom prst="rect">
-            <a:avLst/>
-          </a:prstGeom>
-          <a:noFill/>
-        </p:spPr>
-        <p:txBody>
-          <a:bodyPr wrap="square" rtlCol="0">
-            <a:spAutoFit/>
-          </a:bodyPr>
-          <a:lstStyle/>
-          <a:p>
-            <a:pPr marL="571500" indent="-571500" algn="l" fontAlgn="base">
-              <a:spcBef>
-                <a:spcPts val="2400"/>
-              </a:spcBef>
-              <a:buFont typeface="Wingdings" panose="05000000000000000000" pitchFamily="2" charset="2"/>
-              <a:buChar char="q"/>
-            </a:pPr>
-            <a:r>
-              <a:rPr lang="en-US" sz="4400" b="0" i="0" dirty="0" err="1">
-                <a:solidFill>
-                  <a:srgbClr val="19191C"/>
-                </a:solidFill>
-                <a:effectLst/>
-                <a:latin typeface="JetBrains Sans"/>
-              </a:rPr>
-              <a:t>Intellij</a:t>
-            </a:r>
-            <a:r>
-              <a:rPr lang="en-US" sz="4400" b="0" i="0" dirty="0">
-                <a:solidFill>
-                  <a:srgbClr val="19191C"/>
-                </a:solidFill>
-                <a:effectLst/>
-                <a:latin typeface="JetBrains Sans"/>
-              </a:rPr>
-              <a:t> </a:t>
-            </a:r>
-            <a:r>
-              <a:rPr lang="en-US" sz="3200" b="0" i="0" dirty="0">
-                <a:solidFill>
-                  <a:srgbClr val="19191C"/>
-                </a:solidFill>
-                <a:effectLst/>
-                <a:latin typeface="JetBrains Sans"/>
-              </a:rPr>
-              <a:t>(Java developers)</a:t>
-            </a:r>
-            <a:endParaRPr lang="en-US" sz="4400" b="0" i="0" dirty="0">
-              <a:solidFill>
-                <a:srgbClr val="19191C"/>
-              </a:solidFill>
-              <a:effectLst/>
-              <a:latin typeface="JetBrains Sans"/>
-            </a:endParaRPr>
-          </a:p>
-        </p:txBody>
-      </p:sp>
-      <p:sp>
-        <p:nvSpPr>
-          <p:cNvPr id="6" name="Slide Number Placeholder 5">
-            <a:extLst>
-              <a:ext uri="{FF2B5EF4-FFF2-40B4-BE49-F238E27FC236}">
-                <a16:creationId xmlns:a16="http://schemas.microsoft.com/office/drawing/2014/main" id="{3EEC7D8C-452F-C389-ED8D-DA28F042CAE8}"/>
-              </a:ext>
-            </a:extLst>
-          </p:cNvPr>
-          <p:cNvSpPr>
-            <a:spLocks noGrp="1"/>
-          </p:cNvSpPr>
-          <p:nvPr>
-            <p:ph type="sldNum" sz="quarter" idx="12"/>
-          </p:nvPr>
-        </p:nvSpPr>
-        <p:spPr/>
-        <p:txBody>
-          <a:bodyPr/>
-          <a:lstStyle/>
-          <a:p>
-            <a:fld id="{148CC95F-0247-41B6-91CF-DC97C76A7088}" type="slidenum">
-              <a:rPr lang="en-US" sz="1800" smtClean="0"/>
-              <a:t>5</a:t>
-            </a:fld>
-            <a:endParaRPr lang="en-US" sz="1800" dirty="0"/>
-          </a:p>
-        </p:txBody>
-      </p:sp>
-      <p:sp>
-        <p:nvSpPr>
-          <p:cNvPr id="10" name="TextBox 9">
-            <a:extLst>
-              <a:ext uri="{FF2B5EF4-FFF2-40B4-BE49-F238E27FC236}">
-                <a16:creationId xmlns:a16="http://schemas.microsoft.com/office/drawing/2014/main" id="{D26A66F8-EC82-908B-D9D0-9BD3BF469585}"/>
-              </a:ext>
-            </a:extLst>
-          </p:cNvPr>
-          <p:cNvSpPr txBox="1"/>
-          <p:nvPr/>
-        </p:nvSpPr>
-        <p:spPr>
-          <a:xfrm>
-            <a:off x="251853" y="1644221"/>
-            <a:ext cx="5844143" cy="769441"/>
-          </a:xfrm>
-          <a:prstGeom prst="rect">
-            <a:avLst/>
-          </a:prstGeom>
-          <a:noFill/>
-        </p:spPr>
-        <p:txBody>
-          <a:bodyPr wrap="square" rtlCol="0">
-            <a:spAutoFit/>
-          </a:bodyPr>
-          <a:lstStyle/>
-          <a:p>
-            <a:pPr marL="571500" indent="-571500" algn="l" fontAlgn="base">
-              <a:spcBef>
-                <a:spcPts val="2400"/>
-              </a:spcBef>
-              <a:buFont typeface="Wingdings" panose="05000000000000000000" pitchFamily="2" charset="2"/>
-              <a:buChar char="q"/>
-            </a:pPr>
-            <a:r>
-              <a:rPr lang="en-US" sz="4400" b="0" i="0" dirty="0" err="1">
-                <a:solidFill>
-                  <a:srgbClr val="19191C"/>
-                </a:solidFill>
-                <a:effectLst/>
-                <a:latin typeface="JetBrains Sans"/>
-              </a:rPr>
-              <a:t>Pycharm</a:t>
-            </a:r>
-            <a:r>
-              <a:rPr lang="en-US" sz="4400" b="0" i="0" dirty="0">
-                <a:solidFill>
-                  <a:srgbClr val="19191C"/>
-                </a:solidFill>
-                <a:effectLst/>
-                <a:latin typeface="JetBrains Sans"/>
-              </a:rPr>
-              <a:t> </a:t>
-            </a:r>
-            <a:r>
-              <a:rPr lang="en-US" sz="3200" b="0" i="0" dirty="0">
-                <a:solidFill>
-                  <a:srgbClr val="19191C"/>
-                </a:solidFill>
-                <a:effectLst/>
-                <a:latin typeface="JetBrains Sans"/>
-              </a:rPr>
-              <a:t>(Python)</a:t>
-            </a:r>
-            <a:endParaRPr lang="en-US" sz="4400" b="0" i="0" dirty="0">
-              <a:solidFill>
-                <a:srgbClr val="19191C"/>
-              </a:solidFill>
-              <a:effectLst/>
-              <a:latin typeface="JetBrains Sans"/>
-            </a:endParaRPr>
-          </a:p>
-        </p:txBody>
-      </p:sp>
-      <p:sp>
-        <p:nvSpPr>
-          <p:cNvPr id="11" name="TextBox 10">
-            <a:extLst>
-              <a:ext uri="{FF2B5EF4-FFF2-40B4-BE49-F238E27FC236}">
-                <a16:creationId xmlns:a16="http://schemas.microsoft.com/office/drawing/2014/main" id="{7856DBD4-9422-C10C-C7E9-658325C9AB6B}"/>
-              </a:ext>
-            </a:extLst>
-          </p:cNvPr>
-          <p:cNvSpPr txBox="1"/>
-          <p:nvPr/>
-        </p:nvSpPr>
-        <p:spPr>
-          <a:xfrm>
-            <a:off x="251853" y="2466994"/>
-            <a:ext cx="6721223" cy="769441"/>
-          </a:xfrm>
-          <a:prstGeom prst="rect">
-            <a:avLst/>
-          </a:prstGeom>
-          <a:noFill/>
-        </p:spPr>
-        <p:txBody>
-          <a:bodyPr wrap="square" rtlCol="0">
-            <a:spAutoFit/>
-          </a:bodyPr>
-          <a:lstStyle/>
-          <a:p>
-            <a:pPr marL="571500" indent="-571500" algn="l" fontAlgn="base">
-              <a:spcBef>
-                <a:spcPts val="2400"/>
-              </a:spcBef>
-              <a:buFont typeface="Wingdings" panose="05000000000000000000" pitchFamily="2" charset="2"/>
-              <a:buChar char="q"/>
-            </a:pPr>
-            <a:r>
-              <a:rPr lang="en-US" sz="4400" b="0" i="0" dirty="0" err="1">
-                <a:solidFill>
-                  <a:srgbClr val="19191C"/>
-                </a:solidFill>
-                <a:effectLst/>
-                <a:latin typeface="JetBrains Sans"/>
-              </a:rPr>
-              <a:t>YouTrack</a:t>
-            </a:r>
-            <a:r>
-              <a:rPr lang="en-US" sz="4400" b="0" i="0" dirty="0">
-                <a:solidFill>
-                  <a:srgbClr val="19191C"/>
-                </a:solidFill>
-                <a:effectLst/>
-                <a:latin typeface="JetBrains Sans"/>
-              </a:rPr>
-              <a:t> </a:t>
-            </a:r>
-            <a:r>
-              <a:rPr lang="en-US" sz="3200" b="0" i="0" dirty="0">
-                <a:solidFill>
-                  <a:srgbClr val="19191C"/>
-                </a:solidFill>
-                <a:effectLst/>
-                <a:latin typeface="JetBrains Sans"/>
-              </a:rPr>
-              <a:t>(Project Management)</a:t>
-            </a:r>
-            <a:endParaRPr lang="en-US" sz="4400" b="0" i="0" dirty="0">
-              <a:solidFill>
-                <a:srgbClr val="19191C"/>
-              </a:solidFill>
-              <a:effectLst/>
-              <a:latin typeface="JetBrains Sans"/>
-            </a:endParaRPr>
-          </a:p>
-        </p:txBody>
-      </p:sp>
-      <p:sp>
-        <p:nvSpPr>
-          <p:cNvPr id="12" name="TextBox 11">
-            <a:extLst>
-              <a:ext uri="{FF2B5EF4-FFF2-40B4-BE49-F238E27FC236}">
-                <a16:creationId xmlns:a16="http://schemas.microsoft.com/office/drawing/2014/main" id="{012D7B7D-5563-FA7B-AC5D-8A0BE9BC598B}"/>
-              </a:ext>
-            </a:extLst>
-          </p:cNvPr>
-          <p:cNvSpPr txBox="1"/>
-          <p:nvPr/>
-        </p:nvSpPr>
-        <p:spPr>
-          <a:xfrm>
-            <a:off x="251853" y="3321613"/>
-            <a:ext cx="6721223" cy="769441"/>
-          </a:xfrm>
-          <a:prstGeom prst="rect">
-            <a:avLst/>
-          </a:prstGeom>
-          <a:noFill/>
-        </p:spPr>
-        <p:txBody>
-          <a:bodyPr wrap="square" rtlCol="0">
-            <a:spAutoFit/>
-          </a:bodyPr>
-          <a:lstStyle/>
-          <a:p>
-            <a:pPr marL="571500" indent="-571500" algn="l" fontAlgn="base">
-              <a:spcBef>
-                <a:spcPts val="2400"/>
-              </a:spcBef>
-              <a:buFont typeface="Wingdings" panose="05000000000000000000" pitchFamily="2" charset="2"/>
-              <a:buChar char="q"/>
-            </a:pPr>
-            <a:r>
-              <a:rPr lang="en-US" sz="4400" b="0" i="0" dirty="0" err="1">
-                <a:solidFill>
-                  <a:srgbClr val="19191C"/>
-                </a:solidFill>
-                <a:effectLst/>
-                <a:latin typeface="JetBrains Sans"/>
-              </a:rPr>
-              <a:t>Webstorm</a:t>
-            </a:r>
-            <a:r>
-              <a:rPr lang="en-US" sz="4400" b="0" i="0" dirty="0">
-                <a:solidFill>
-                  <a:srgbClr val="19191C"/>
-                </a:solidFill>
-                <a:effectLst/>
-                <a:latin typeface="JetBrains Sans"/>
-              </a:rPr>
-              <a:t> </a:t>
-            </a:r>
-            <a:r>
-              <a:rPr lang="en-US" sz="3200" b="0" i="0" dirty="0">
-                <a:solidFill>
-                  <a:srgbClr val="19191C"/>
-                </a:solidFill>
-                <a:effectLst/>
-                <a:latin typeface="JetBrains Sans"/>
-              </a:rPr>
-              <a:t>(Web)</a:t>
-            </a:r>
-            <a:endParaRPr lang="en-US" sz="4400" b="0" i="0" dirty="0">
-              <a:solidFill>
-                <a:srgbClr val="19191C"/>
-              </a:solidFill>
-              <a:effectLst/>
-              <a:latin typeface="JetBrains Sans"/>
-            </a:endParaRPr>
-          </a:p>
-        </p:txBody>
-      </p:sp>
-      <p:sp>
-        <p:nvSpPr>
-          <p:cNvPr id="13" name="TextBox 12">
-            <a:extLst>
-              <a:ext uri="{FF2B5EF4-FFF2-40B4-BE49-F238E27FC236}">
-                <a16:creationId xmlns:a16="http://schemas.microsoft.com/office/drawing/2014/main" id="{64A66354-EA92-B6A6-C3CB-83978769DD5D}"/>
-              </a:ext>
-            </a:extLst>
-          </p:cNvPr>
-          <p:cNvSpPr txBox="1"/>
-          <p:nvPr/>
-        </p:nvSpPr>
-        <p:spPr>
-          <a:xfrm>
-            <a:off x="251855" y="5020490"/>
-            <a:ext cx="6721223" cy="769441"/>
-          </a:xfrm>
-          <a:prstGeom prst="rect">
-            <a:avLst/>
-          </a:prstGeom>
-          <a:noFill/>
-        </p:spPr>
-        <p:txBody>
-          <a:bodyPr wrap="square" rtlCol="0">
-            <a:spAutoFit/>
-          </a:bodyPr>
-          <a:lstStyle/>
-          <a:p>
-            <a:pPr marL="571500" indent="-571500" algn="l" fontAlgn="base">
-              <a:spcBef>
-                <a:spcPts val="2400"/>
-              </a:spcBef>
-              <a:buFont typeface="Wingdings" panose="05000000000000000000" pitchFamily="2" charset="2"/>
-              <a:buChar char="q"/>
-            </a:pPr>
-            <a:r>
-              <a:rPr lang="en-US" sz="4400" b="0" i="0" dirty="0" err="1">
-                <a:solidFill>
-                  <a:srgbClr val="19191C"/>
-                </a:solidFill>
-                <a:effectLst/>
-                <a:latin typeface="JetBrains Sans"/>
-              </a:rPr>
-              <a:t>CLion</a:t>
-            </a:r>
-            <a:r>
-              <a:rPr lang="en-US" sz="4400" b="0" i="0" dirty="0">
-                <a:solidFill>
-                  <a:srgbClr val="19191C"/>
-                </a:solidFill>
-                <a:effectLst/>
-                <a:latin typeface="JetBrains Sans"/>
-              </a:rPr>
-              <a:t> </a:t>
-            </a:r>
-            <a:r>
-              <a:rPr lang="en-US" sz="3200" b="0" i="0" dirty="0">
-                <a:solidFill>
-                  <a:srgbClr val="19191C"/>
-                </a:solidFill>
-                <a:effectLst/>
-                <a:latin typeface="JetBrains Sans"/>
-              </a:rPr>
-              <a:t>(C/ C++ </a:t>
-            </a:r>
-            <a:r>
-              <a:rPr lang="en-US" sz="3200" b="0" i="0" dirty="0" err="1">
-                <a:solidFill>
-                  <a:srgbClr val="19191C"/>
-                </a:solidFill>
-                <a:effectLst/>
-                <a:latin typeface="JetBrains Sans"/>
-              </a:rPr>
-              <a:t>devs</a:t>
-            </a:r>
-            <a:r>
-              <a:rPr lang="en-US" sz="3200" b="0" i="0" dirty="0">
-                <a:solidFill>
-                  <a:srgbClr val="19191C"/>
-                </a:solidFill>
-                <a:effectLst/>
-                <a:latin typeface="JetBrains Sans"/>
-              </a:rPr>
-              <a:t>)</a:t>
-            </a:r>
-            <a:endParaRPr lang="en-US" sz="4400" b="0" i="0" dirty="0">
-              <a:solidFill>
-                <a:srgbClr val="19191C"/>
-              </a:solidFill>
-              <a:effectLst/>
-              <a:latin typeface="JetBrains Sans"/>
-            </a:endParaRPr>
-          </a:p>
-        </p:txBody>
-      </p:sp>
-      <p:sp>
-        <p:nvSpPr>
-          <p:cNvPr id="14" name="TextBox 13">
-            <a:extLst>
-              <a:ext uri="{FF2B5EF4-FFF2-40B4-BE49-F238E27FC236}">
-                <a16:creationId xmlns:a16="http://schemas.microsoft.com/office/drawing/2014/main" id="{574284D4-AA22-2977-42E2-FF1EB30D71A4}"/>
-              </a:ext>
-            </a:extLst>
-          </p:cNvPr>
-          <p:cNvSpPr txBox="1"/>
-          <p:nvPr/>
-        </p:nvSpPr>
-        <p:spPr>
-          <a:xfrm>
-            <a:off x="251854" y="4144386"/>
-            <a:ext cx="6721223" cy="769441"/>
-          </a:xfrm>
-          <a:prstGeom prst="rect">
-            <a:avLst/>
-          </a:prstGeom>
-          <a:noFill/>
-        </p:spPr>
-        <p:txBody>
-          <a:bodyPr wrap="square" rtlCol="0">
-            <a:spAutoFit/>
-          </a:bodyPr>
-          <a:lstStyle/>
-          <a:p>
-            <a:pPr marL="571500" indent="-571500" algn="l" fontAlgn="base">
-              <a:spcBef>
-                <a:spcPts val="2400"/>
-              </a:spcBef>
-              <a:buFont typeface="Wingdings" panose="05000000000000000000" pitchFamily="2" charset="2"/>
-              <a:buChar char="q"/>
-            </a:pPr>
-            <a:r>
-              <a:rPr lang="en-US" sz="4400" b="0" i="0" dirty="0" err="1">
-                <a:solidFill>
-                  <a:srgbClr val="19191C"/>
-                </a:solidFill>
-                <a:effectLst/>
-                <a:latin typeface="JetBrains Sans"/>
-              </a:rPr>
-              <a:t>PHPStorm</a:t>
-            </a:r>
-            <a:r>
-              <a:rPr lang="en-US" sz="4400" b="0" i="0" dirty="0">
-                <a:solidFill>
-                  <a:srgbClr val="19191C"/>
-                </a:solidFill>
-                <a:effectLst/>
-                <a:latin typeface="JetBrains Sans"/>
-              </a:rPr>
-              <a:t> </a:t>
-            </a:r>
-            <a:r>
-              <a:rPr lang="en-US" sz="3200" b="0" i="0" dirty="0">
-                <a:solidFill>
-                  <a:srgbClr val="19191C"/>
-                </a:solidFill>
-                <a:effectLst/>
-                <a:latin typeface="JetBrains Sans"/>
-              </a:rPr>
-              <a:t>(PHP </a:t>
-            </a:r>
-            <a:r>
-              <a:rPr lang="en-US" sz="3200" b="0" i="0" dirty="0" err="1">
-                <a:solidFill>
-                  <a:srgbClr val="19191C"/>
-                </a:solidFill>
-                <a:effectLst/>
-                <a:latin typeface="JetBrains Sans"/>
-              </a:rPr>
-              <a:t>devs</a:t>
-            </a:r>
-            <a:r>
-              <a:rPr lang="en-US" sz="3200" b="0" i="0" dirty="0">
-                <a:solidFill>
-                  <a:srgbClr val="19191C"/>
-                </a:solidFill>
-                <a:effectLst/>
-                <a:latin typeface="JetBrains Sans"/>
-              </a:rPr>
-              <a:t>)</a:t>
-            </a:r>
-            <a:endParaRPr lang="en-US" sz="4400" b="0" i="0" dirty="0">
-              <a:solidFill>
-                <a:srgbClr val="19191C"/>
-              </a:solidFill>
-              <a:effectLst/>
-              <a:latin typeface="JetBrains Sans"/>
-            </a:endParaRPr>
-          </a:p>
-        </p:txBody>
-      </p:sp>
-    </p:spTree>
-    <p:extLst>
-      <p:ext uri="{BB962C8B-B14F-4D97-AF65-F5344CB8AC3E}">
-        <p14:creationId xmlns:p14="http://schemas.microsoft.com/office/powerpoint/2010/main" val="1978744398"/>
-      </p:ext>
-    </p:extLst>
-  </p:cSld>
-  <p:clrMapOvr>
-    <a:masterClrMapping/>
-  </p:clrMapOvr>
-  <p:timing>
-    <p:tnLst>
-      <p:par>
-        <p:cTn id="1" dur="indefinite" restart="never" nodeType="tmRoot">
-          <p:childTnLst>
-            <p:seq concurrent="1" nextAc="seek">
-              <p:cTn id="2" dur="indefinite" nodeType="mainSeq">
-                <p:childTnLst>
-                  <p:par>
-                    <p:cTn id="3" fill="hold">
-                      <p:stCondLst>
-                        <p:cond delay="indefinite"/>
-                      </p:stCondLst>
-                      <p:childTnLst>
-                        <p:par>
-                          <p:cTn id="4" fill="hold">
-                            <p:stCondLst>
-                              <p:cond delay="0"/>
-                            </p:stCondLst>
-                            <p:childTnLst>
-                              <p:par>
-                                <p:cTn id="5" presetID="1" presetClass="entr" presetSubtype="0" fill="hold" grpId="0" nodeType="clickEffect">
-                                  <p:stCondLst>
-                                    <p:cond delay="0"/>
-                                  </p:stCondLst>
-                                  <p:childTnLst>
-                                    <p:set>
-                                      <p:cBhvr>
-                                        <p:cTn id="6" dur="1" fill="hold">
-                                          <p:stCondLst>
-                                            <p:cond delay="0"/>
-                                          </p:stCondLst>
-                                        </p:cTn>
-                                        <p:tgtEl>
-                                          <p:spTgt spid="4"/>
-                                        </p:tgtEl>
-                                        <p:attrNameLst>
-                                          <p:attrName>style.visibility</p:attrName>
-                                        </p:attrNameLst>
-                                      </p:cBhvr>
-                                      <p:to>
-                                        <p:strVal val="visible"/>
-                                      </p:to>
-                                    </p:set>
-                                  </p:childTnLst>
-                                </p:cTn>
-                              </p:par>
-                            </p:childTnLst>
-                          </p:cTn>
-                        </p:par>
-                      </p:childTnLst>
-                    </p:cTn>
-                  </p:par>
-                  <p:par>
-                    <p:cTn id="7" fill="hold">
-                      <p:stCondLst>
-                        <p:cond delay="indefinite"/>
-                      </p:stCondLst>
-                      <p:childTnLst>
-                        <p:par>
-                          <p:cTn id="8" fill="hold">
-                            <p:stCondLst>
-                              <p:cond delay="0"/>
-                            </p:stCondLst>
-                            <p:childTnLst>
-                              <p:par>
-                                <p:cTn id="9" presetID="10" presetClass="entr" presetSubtype="0" fill="hold" grpId="0" nodeType="clickEffect">
-                                  <p:stCondLst>
-                                    <p:cond delay="0"/>
-                                  </p:stCondLst>
-                                  <p:childTnLst>
-                                    <p:set>
-                                      <p:cBhvr>
-                                        <p:cTn id="10" dur="1" fill="hold">
-                                          <p:stCondLst>
-                                            <p:cond delay="0"/>
-                                          </p:stCondLst>
-                                        </p:cTn>
-                                        <p:tgtEl>
-                                          <p:spTgt spid="10"/>
-                                        </p:tgtEl>
-                                        <p:attrNameLst>
-                                          <p:attrName>style.visibility</p:attrName>
-                                        </p:attrNameLst>
-                                      </p:cBhvr>
-                                      <p:to>
-                                        <p:strVal val="visible"/>
-                                      </p:to>
-                                    </p:set>
-                                    <p:animEffect transition="in" filter="fade">
-                                      <p:cBhvr>
-                                        <p:cTn id="11" dur="500"/>
-                                        <p:tgtEl>
-                                          <p:spTgt spid="10"/>
-                                        </p:tgtEl>
-                                      </p:cBhvr>
-                                    </p:animEffect>
-                                  </p:childTnLst>
-                                </p:cTn>
-                              </p:par>
-                            </p:childTnLst>
-                          </p:cTn>
-                        </p:par>
-                      </p:childTnLst>
-                    </p:cTn>
-                  </p:par>
-                  <p:par>
-                    <p:cTn id="12" fill="hold">
-                      <p:stCondLst>
-                        <p:cond delay="indefinite"/>
-                      </p:stCondLst>
-                      <p:childTnLst>
-                        <p:par>
-                          <p:cTn id="13" fill="hold">
-                            <p:stCondLst>
-                              <p:cond delay="0"/>
-                            </p:stCondLst>
-                            <p:childTnLst>
-                              <p:par>
-                                <p:cTn id="14" presetID="10" presetClass="entr" presetSubtype="0" fill="hold" grpId="0" nodeType="clickEffect">
-                                  <p:stCondLst>
-                                    <p:cond delay="0"/>
-                                  </p:stCondLst>
-                                  <p:childTnLst>
-                                    <p:set>
-                                      <p:cBhvr>
-                                        <p:cTn id="15" dur="1" fill="hold">
-                                          <p:stCondLst>
-                                            <p:cond delay="0"/>
-                                          </p:stCondLst>
-                                        </p:cTn>
-                                        <p:tgtEl>
-                                          <p:spTgt spid="11"/>
-                                        </p:tgtEl>
-                                        <p:attrNameLst>
-                                          <p:attrName>style.visibility</p:attrName>
-                                        </p:attrNameLst>
-                                      </p:cBhvr>
-                                      <p:to>
-                                        <p:strVal val="visible"/>
-                                      </p:to>
-                                    </p:set>
-                                    <p:animEffect transition="in" filter="fade">
-                                      <p:cBhvr>
-                                        <p:cTn id="16" dur="500"/>
-                                        <p:tgtEl>
-                                          <p:spTgt spid="11"/>
-                                        </p:tgtEl>
-                                      </p:cBhvr>
-                                    </p:animEffect>
-                                  </p:childTnLst>
-                                </p:cTn>
-                              </p:par>
-                            </p:childTnLst>
-                          </p:cTn>
-                        </p:par>
-                      </p:childTnLst>
-                    </p:cTn>
-                  </p:par>
-                  <p:par>
-                    <p:cTn id="17" fill="hold">
-                      <p:stCondLst>
-                        <p:cond delay="indefinite"/>
-                      </p:stCondLst>
-                      <p:childTnLst>
-                        <p:par>
-                          <p:cTn id="18" fill="hold">
-                            <p:stCondLst>
-                              <p:cond delay="0"/>
-                            </p:stCondLst>
-                            <p:childTnLst>
-                              <p:par>
-                                <p:cTn id="19" presetID="10" presetClass="entr" presetSubtype="0" fill="hold" grpId="0" nodeType="clickEffect">
-                                  <p:stCondLst>
-                                    <p:cond delay="0"/>
-                                  </p:stCondLst>
-                                  <p:childTnLst>
-                                    <p:set>
-                                      <p:cBhvr>
-                                        <p:cTn id="20" dur="1" fill="hold">
-                                          <p:stCondLst>
-                                            <p:cond delay="0"/>
-                                          </p:stCondLst>
-                                        </p:cTn>
-                                        <p:tgtEl>
-                                          <p:spTgt spid="12"/>
-                                        </p:tgtEl>
-                                        <p:attrNameLst>
-                                          <p:attrName>style.visibility</p:attrName>
-                                        </p:attrNameLst>
-                                      </p:cBhvr>
-                                      <p:to>
-                                        <p:strVal val="visible"/>
-                                      </p:to>
-                                    </p:set>
-                                    <p:animEffect transition="in" filter="fade">
-                                      <p:cBhvr>
-                                        <p:cTn id="21" dur="500"/>
-                                        <p:tgtEl>
-                                          <p:spTgt spid="12"/>
-                                        </p:tgtEl>
-                                      </p:cBhvr>
-                                    </p:animEffect>
-                                  </p:childTnLst>
-                                </p:cTn>
-                              </p:par>
-                            </p:childTnLst>
-                          </p:cTn>
-                        </p:par>
-                      </p:childTnLst>
-                    </p:cTn>
-                  </p:par>
-                  <p:par>
-                    <p:cTn id="22" fill="hold">
-                      <p:stCondLst>
-                        <p:cond delay="indefinite"/>
-                      </p:stCondLst>
-                      <p:childTnLst>
-                        <p:par>
-                          <p:cTn id="23" fill="hold">
-                            <p:stCondLst>
-                              <p:cond delay="0"/>
-                            </p:stCondLst>
-                            <p:childTnLst>
-                              <p:par>
-                                <p:cTn id="24" presetID="10" presetClass="entr" presetSubtype="0" fill="hold" grpId="0" nodeType="clickEffect">
-                                  <p:stCondLst>
-                                    <p:cond delay="0"/>
-                                  </p:stCondLst>
-                                  <p:childTnLst>
-                                    <p:set>
-                                      <p:cBhvr>
-                                        <p:cTn id="25" dur="1" fill="hold">
-                                          <p:stCondLst>
-                                            <p:cond delay="0"/>
-                                          </p:stCondLst>
-                                        </p:cTn>
-                                        <p:tgtEl>
-                                          <p:spTgt spid="14"/>
-                                        </p:tgtEl>
-                                        <p:attrNameLst>
-                                          <p:attrName>style.visibility</p:attrName>
-                                        </p:attrNameLst>
-                                      </p:cBhvr>
-                                      <p:to>
-                                        <p:strVal val="visible"/>
-                                      </p:to>
-                                    </p:set>
-                                    <p:animEffect transition="in" filter="fade">
-                                      <p:cBhvr>
-                                        <p:cTn id="26" dur="500"/>
-                                        <p:tgtEl>
-                                          <p:spTgt spid="14"/>
-                                        </p:tgtEl>
-                                      </p:cBhvr>
-                                    </p:animEffect>
-                                  </p:childTnLst>
-                                </p:cTn>
-                              </p:par>
-                            </p:childTnLst>
-                          </p:cTn>
-                        </p:par>
-                      </p:childTnLst>
-                    </p:cTn>
-                  </p:par>
-                  <p:par>
-                    <p:cTn id="27" fill="hold">
-                      <p:stCondLst>
-                        <p:cond delay="indefinite"/>
-                      </p:stCondLst>
-                      <p:childTnLst>
-                        <p:par>
-                          <p:cTn id="28" fill="hold">
-                            <p:stCondLst>
-                              <p:cond delay="0"/>
-                            </p:stCondLst>
-                            <p:childTnLst>
-                              <p:par>
-                                <p:cTn id="29" presetID="10" presetClass="entr" presetSubtype="0" fill="hold" grpId="0" nodeType="clickEffect">
-                                  <p:stCondLst>
-                                    <p:cond delay="0"/>
-                                  </p:stCondLst>
-                                  <p:childTnLst>
-                                    <p:set>
-                                      <p:cBhvr>
-                                        <p:cTn id="30" dur="1" fill="hold">
-                                          <p:stCondLst>
-                                            <p:cond delay="0"/>
-                                          </p:stCondLst>
-                                        </p:cTn>
-                                        <p:tgtEl>
-                                          <p:spTgt spid="13"/>
-                                        </p:tgtEl>
-                                        <p:attrNameLst>
-                                          <p:attrName>style.visibility</p:attrName>
-                                        </p:attrNameLst>
-                                      </p:cBhvr>
-                                      <p:to>
-                                        <p:strVal val="visible"/>
-                                      </p:to>
-                                    </p:set>
-                                    <p:animEffect transition="in" filter="fade">
-                                      <p:cBhvr>
-                                        <p:cTn id="31" dur="500"/>
-                                        <p:tgtEl>
-                                          <p:spTgt spid="13"/>
-                                        </p:tgtEl>
-                                      </p:cBhvr>
-                                    </p:animEffect>
-                                  </p:childTnLst>
-                                </p:cTn>
-                              </p:par>
-                            </p:childTnLst>
-                          </p:cTn>
-                        </p:par>
-                      </p:childTnLst>
-                    </p:cTn>
-                  </p:par>
-                </p:childTnLst>
-              </p:cTn>
-              <p:prevCondLst>
-                <p:cond evt="onPrev" delay="0">
-                  <p:tgtEl>
-                    <p:sldTgt/>
-                  </p:tgtEl>
-                </p:cond>
-              </p:prevCondLst>
-              <p:nextCondLst>
-                <p:cond evt="onNext" delay="0">
-                  <p:tgtEl>
-                    <p:sldTgt/>
-                  </p:tgtEl>
-                </p:cond>
-              </p:nextCondLst>
-            </p:seq>
-          </p:childTnLst>
-        </p:cTn>
-      </p:par>
-    </p:tnLst>
-    <p:bldLst>
-      <p:bldP spid="4" grpId="0"/>
-      <p:bldP spid="10" grpId="0"/>
-      <p:bldP spid="11" grpId="0"/>
-      <p:bldP spid="12" grpId="0"/>
-      <p:bldP spid="13" grpId="0"/>
-      <p:bldP spid="14" grpId="0"/>
-    </p:bldLst>
-  </p:timing>
-</p:sld>
-</file>
-
 <file path=ppt/slides/slide6.xml><?xml version="1.0" encoding="utf-8"?>
 <p:sld xmlns:a="http://schemas.openxmlformats.org/drawingml/2006/main" xmlns:r="http://schemas.openxmlformats.org/officeDocument/2006/relationships" xmlns:p="http://schemas.openxmlformats.org/presentationml/2006/main">
   <p:cSld>
@@ -7704,7 +8302,7 @@
         <p:spPr>
           <a:xfrm>
             <a:off x="832526" y="825808"/>
-            <a:ext cx="9706323" cy="5124480"/>
+            <a:ext cx="10775705" cy="5124480"/>
           </a:xfrm>
           <a:prstGeom prst="rect">
             <a:avLst/>
@@ -7766,7 +8364,28 @@
                 <a:latin typeface="Times New Roman" panose="02020603050405020304" pitchFamily="18" charset="0"/>
                 <a:cs typeface="Times New Roman" panose="02020603050405020304" pitchFamily="18" charset="0"/>
               </a:rPr>
-              <a:t> in 2010 and was open source from very early on. T</a:t>
+              <a:t> in 2010 and was open source from its </a:t>
+            </a:r>
+            <a:r>
+              <a:rPr lang="en-US" sz="2800" dirty="0">
+                <a:solidFill>
+                  <a:srgbClr val="19191C"/>
+                </a:solidFill>
+                <a:latin typeface="Times New Roman" panose="02020603050405020304" pitchFamily="18" charset="0"/>
+                <a:cs typeface="Times New Roman" panose="02020603050405020304" pitchFamily="18" charset="0"/>
+              </a:rPr>
+              <a:t>early days</a:t>
+            </a:r>
+            <a:r>
+              <a:rPr lang="en-US" sz="2800" b="0" i="0" dirty="0">
+                <a:solidFill>
+                  <a:srgbClr val="19191C"/>
+                </a:solidFill>
+                <a:effectLst/>
+                <a:latin typeface="Times New Roman" panose="02020603050405020304" pitchFamily="18" charset="0"/>
+                <a:cs typeface="Times New Roman" panose="02020603050405020304" pitchFamily="18" charset="0"/>
+              </a:rPr>
+              <a:t>. T</a:t>
             </a:r>
             <a:r>
               <a:rPr lang="en-US" sz="2800" dirty="0">
@@ -7943,7 +8562,7 @@
                 <a:latin typeface="Times New Roman" panose="02020603050405020304" pitchFamily="18" charset="0"/>
                 <a:cs typeface="Times New Roman" panose="02020603050405020304" pitchFamily="18" charset="0"/>
               </a:rPr>
-              <a:t>The currently released LTS version is 2.1.21, published on May 13, 2025. </a:t>
+              <a:t>The currently released LTS version is 2.2.0, published on June 23, 2025. </a:t>
             </a:r>
           </a:p>
         </p:txBody>
@@ -7962,8 +8581,8 @@
         </p:nvSpPr>
         <p:spPr>
           <a:xfrm>
-            <a:off x="2831438" y="122235"/>
-            <a:ext cx="6312562" cy="523220"/>
+            <a:off x="2187480" y="122235"/>
+            <a:ext cx="7600479" cy="523220"/>
           </a:xfrm>
           <a:prstGeom prst="rect">
             <a:avLst/>
@@ -7979,7 +8598,7 @@
             <a:pPr algn="ctr"/>
             <a:r>
               <a:rPr lang="en-US" sz="2800" b="1" dirty="0"/>
-              <a:t>HISTORICAL OVERVIEW / EVOLUTION</a:t>
+              <a:t>KOTLIN HISTORICAL OVERVIEW / EVOLUTION</a:t>
             </a:r>
             <a:endParaRPr lang="en-GB" sz="2800" b="1" dirty="0"/>
           </a:p>
@@ -8476,6 +9095,992 @@
         <p:cNvPr id="1" name="">
           <a:extLst>
             <a:ext uri="{FF2B5EF4-FFF2-40B4-BE49-F238E27FC236}">
+              <a16:creationId xmlns:a16="http://schemas.microsoft.com/office/drawing/2014/main" id="{1A650373-5E04-E1E6-FBCC-9574C0FB37F9}"/>
+            </a:ext>
+          </a:extLst>
+        </p:cNvPr>
+        <p:cNvGrpSpPr/>
+        <p:nvPr/>
+      </p:nvGrpSpPr>
+      <p:grpSpPr>
+        <a:xfrm>
+          <a:off x="0" y="0"/>
+          <a:ext cx="0" cy="0"/>
+          <a:chOff x="0" y="0"/>
+          <a:chExt cx="0" cy="0"/>
+        </a:xfrm>
+      </p:grpSpPr>
+      <p:pic>
+        <p:nvPicPr>
+          <p:cNvPr id="5" name="Picture 4" descr="Triangular abstract background">
+            <a:extLst>
+              <a:ext uri="{FF2B5EF4-FFF2-40B4-BE49-F238E27FC236}">
+                <a16:creationId xmlns:a16="http://schemas.microsoft.com/office/drawing/2014/main" id="{D3A751A1-9CB4-E1E4-163E-3F431AC47F09}"/>
+              </a:ext>
+            </a:extLst>
+          </p:cNvPr>
+          <p:cNvPicPr>
+            <a:picLocks noChangeAspect="1"/>
+          </p:cNvPicPr>
+          <p:nvPr/>
+        </p:nvPicPr>
+        <p:blipFill>
+          <a:blip r:embed="rId2">
+            <a:alphaModFix amt="40000"/>
+          </a:blip>
+          <a:srcRect t="15730"/>
+          <a:stretch/>
+        </p:blipFill>
+        <p:spPr>
+          <a:xfrm>
+            <a:off x="0" y="0"/>
+            <a:ext cx="12192001" cy="6858001"/>
+          </a:xfrm>
+          <a:prstGeom prst="rect">
+            <a:avLst/>
+          </a:prstGeom>
+        </p:spPr>
+      </p:pic>
+      <p:sp>
+        <p:nvSpPr>
+          <p:cNvPr id="2" name="TextBox 1">
+            <a:extLst>
+              <a:ext uri="{FF2B5EF4-FFF2-40B4-BE49-F238E27FC236}">
+                <a16:creationId xmlns:a16="http://schemas.microsoft.com/office/drawing/2014/main" id="{EC8ED991-B5D2-101F-8A05-028CF9C176B1}"/>
+              </a:ext>
+            </a:extLst>
+          </p:cNvPr>
+          <p:cNvSpPr txBox="1"/>
+          <p:nvPr/>
+        </p:nvSpPr>
+        <p:spPr>
+          <a:xfrm>
+            <a:off x="3612464" y="52669"/>
+            <a:ext cx="4741122" cy="769441"/>
+          </a:xfrm>
+          <a:prstGeom prst="rect">
+            <a:avLst/>
+          </a:prstGeom>
+          <a:noFill/>
+        </p:spPr>
+        <p:txBody>
+          <a:bodyPr wrap="square" rtlCol="0">
+            <a:spAutoFit/>
+          </a:bodyPr>
+          <a:lstStyle/>
+          <a:p>
+            <a:r>
+              <a:rPr lang="en-US" sz="4400" b="1" i="0" dirty="0" err="1">
+                <a:solidFill>
+                  <a:srgbClr val="19191C"/>
+                </a:solidFill>
+                <a:effectLst/>
+                <a:latin typeface="JetBrains Sans"/>
+              </a:rPr>
+              <a:t>Jetbrain</a:t>
+            </a:r>
+            <a:r>
+              <a:rPr lang="en-US" sz="4400" b="1" i="0" dirty="0">
+                <a:solidFill>
+                  <a:srgbClr val="19191C"/>
+                </a:solidFill>
+                <a:effectLst/>
+                <a:latin typeface="JetBrains Sans"/>
+              </a:rPr>
+              <a:t> Products</a:t>
+            </a:r>
+            <a:endParaRPr lang="en-GB" sz="4400" dirty="0"/>
+          </a:p>
+        </p:txBody>
+      </p:sp>
+      <p:sp>
+        <p:nvSpPr>
+          <p:cNvPr id="4" name="TextBox 3">
+            <a:extLst>
+              <a:ext uri="{FF2B5EF4-FFF2-40B4-BE49-F238E27FC236}">
+                <a16:creationId xmlns:a16="http://schemas.microsoft.com/office/drawing/2014/main" id="{B33AFF1B-CB69-4A16-96FC-87377AE55C9F}"/>
+              </a:ext>
+            </a:extLst>
+          </p:cNvPr>
+          <p:cNvSpPr txBox="1"/>
+          <p:nvPr/>
+        </p:nvSpPr>
+        <p:spPr>
+          <a:xfrm>
+            <a:off x="251857" y="678575"/>
+            <a:ext cx="5844143" cy="769441"/>
+          </a:xfrm>
+          <a:prstGeom prst="rect">
+            <a:avLst/>
+          </a:prstGeom>
+          <a:noFill/>
+        </p:spPr>
+        <p:txBody>
+          <a:bodyPr wrap="square" rtlCol="0">
+            <a:spAutoFit/>
+          </a:bodyPr>
+          <a:lstStyle/>
+          <a:p>
+            <a:pPr marL="571500" indent="-571500" algn="l" fontAlgn="base">
+              <a:spcBef>
+                <a:spcPts val="2400"/>
+              </a:spcBef>
+              <a:buFont typeface="Wingdings" panose="05000000000000000000" pitchFamily="2" charset="2"/>
+              <a:buChar char="q"/>
+            </a:pPr>
+            <a:r>
+              <a:rPr lang="en-US" sz="4400" b="0" i="0" dirty="0" err="1">
+                <a:solidFill>
+                  <a:srgbClr val="19191C"/>
+                </a:solidFill>
+                <a:effectLst/>
+                <a:latin typeface="JetBrains Sans"/>
+              </a:rPr>
+              <a:t>Intellij</a:t>
+            </a:r>
+            <a:r>
+              <a:rPr lang="en-US" sz="4400" b="0" i="0" dirty="0">
+                <a:solidFill>
+                  <a:srgbClr val="19191C"/>
+                </a:solidFill>
+                <a:effectLst/>
+                <a:latin typeface="JetBrains Sans"/>
+              </a:rPr>
+              <a:t> </a:t>
+            </a:r>
+            <a:r>
+              <a:rPr lang="en-US" sz="3200" b="0" i="0" dirty="0">
+                <a:solidFill>
+                  <a:srgbClr val="19191C"/>
+                </a:solidFill>
+                <a:effectLst/>
+                <a:latin typeface="JetBrains Sans"/>
+              </a:rPr>
+              <a:t>(Java developers)</a:t>
+            </a:r>
+            <a:endParaRPr lang="en-US" sz="4400" b="0" i="0" dirty="0">
+              <a:solidFill>
+                <a:srgbClr val="19191C"/>
+              </a:solidFill>
+              <a:effectLst/>
+              <a:latin typeface="JetBrains Sans"/>
+            </a:endParaRPr>
+          </a:p>
+        </p:txBody>
+      </p:sp>
+      <p:sp>
+        <p:nvSpPr>
+          <p:cNvPr id="6" name="Slide Number Placeholder 5">
+            <a:extLst>
+              <a:ext uri="{FF2B5EF4-FFF2-40B4-BE49-F238E27FC236}">
+                <a16:creationId xmlns:a16="http://schemas.microsoft.com/office/drawing/2014/main" id="{3EEC7D8C-452F-C389-ED8D-DA28F042CAE8}"/>
+              </a:ext>
+            </a:extLst>
+          </p:cNvPr>
+          <p:cNvSpPr>
+            <a:spLocks noGrp="1"/>
+          </p:cNvSpPr>
+          <p:nvPr>
+            <p:ph type="sldNum" sz="quarter" idx="12"/>
+          </p:nvPr>
+        </p:nvSpPr>
+        <p:spPr/>
+        <p:txBody>
+          <a:bodyPr/>
+          <a:lstStyle/>
+          <a:p>
+            <a:fld id="{148CC95F-0247-41B6-91CF-DC97C76A7088}" type="slidenum">
+              <a:rPr lang="en-US" sz="1800" smtClean="0"/>
+              <a:t>7</a:t>
+            </a:fld>
+            <a:endParaRPr lang="en-US" sz="1800" dirty="0"/>
+          </a:p>
+        </p:txBody>
+      </p:sp>
+      <p:sp>
+        <p:nvSpPr>
+          <p:cNvPr id="10" name="TextBox 9">
+            <a:extLst>
+              <a:ext uri="{FF2B5EF4-FFF2-40B4-BE49-F238E27FC236}">
+                <a16:creationId xmlns:a16="http://schemas.microsoft.com/office/drawing/2014/main" id="{D26A66F8-EC82-908B-D9D0-9BD3BF469585}"/>
+              </a:ext>
+            </a:extLst>
+          </p:cNvPr>
+          <p:cNvSpPr txBox="1"/>
+          <p:nvPr/>
+        </p:nvSpPr>
+        <p:spPr>
+          <a:xfrm>
+            <a:off x="251853" y="1644221"/>
+            <a:ext cx="5844143" cy="769441"/>
+          </a:xfrm>
+          <a:prstGeom prst="rect">
+            <a:avLst/>
+          </a:prstGeom>
+          <a:noFill/>
+        </p:spPr>
+        <p:txBody>
+          <a:bodyPr wrap="square" rtlCol="0">
+            <a:spAutoFit/>
+          </a:bodyPr>
+          <a:lstStyle/>
+          <a:p>
+            <a:pPr marL="571500" indent="-571500" algn="l" fontAlgn="base">
+              <a:spcBef>
+                <a:spcPts val="2400"/>
+              </a:spcBef>
+              <a:buFont typeface="Wingdings" panose="05000000000000000000" pitchFamily="2" charset="2"/>
+              <a:buChar char="q"/>
+            </a:pPr>
+            <a:r>
+              <a:rPr lang="en-US" sz="4400" b="0" i="0" dirty="0" err="1">
+                <a:solidFill>
+                  <a:srgbClr val="19191C"/>
+                </a:solidFill>
+                <a:effectLst/>
+                <a:latin typeface="JetBrains Sans"/>
+              </a:rPr>
+              <a:t>Pycharm</a:t>
+            </a:r>
+            <a:r>
+              <a:rPr lang="en-US" sz="4400" b="0" i="0" dirty="0">
+                <a:solidFill>
+                  <a:srgbClr val="19191C"/>
+                </a:solidFill>
+                <a:effectLst/>
+                <a:latin typeface="JetBrains Sans"/>
+              </a:rPr>
+              <a:t> </a:t>
+            </a:r>
+            <a:r>
+              <a:rPr lang="en-US" sz="3200" b="0" i="0" dirty="0">
+                <a:solidFill>
+                  <a:srgbClr val="19191C"/>
+                </a:solidFill>
+                <a:effectLst/>
+                <a:latin typeface="JetBrains Sans"/>
+              </a:rPr>
+              <a:t>(Python)</a:t>
+            </a:r>
+            <a:endParaRPr lang="en-US" sz="4400" b="0" i="0" dirty="0">
+              <a:solidFill>
+                <a:srgbClr val="19191C"/>
+              </a:solidFill>
+              <a:effectLst/>
+              <a:latin typeface="JetBrains Sans"/>
+            </a:endParaRPr>
+          </a:p>
+        </p:txBody>
+      </p:sp>
+      <p:sp>
+        <p:nvSpPr>
+          <p:cNvPr id="11" name="TextBox 10">
+            <a:extLst>
+              <a:ext uri="{FF2B5EF4-FFF2-40B4-BE49-F238E27FC236}">
+                <a16:creationId xmlns:a16="http://schemas.microsoft.com/office/drawing/2014/main" id="{7856DBD4-9422-C10C-C7E9-658325C9AB6B}"/>
+              </a:ext>
+            </a:extLst>
+          </p:cNvPr>
+          <p:cNvSpPr txBox="1"/>
+          <p:nvPr/>
+        </p:nvSpPr>
+        <p:spPr>
+          <a:xfrm>
+            <a:off x="251853" y="2466994"/>
+            <a:ext cx="6721223" cy="769441"/>
+          </a:xfrm>
+          <a:prstGeom prst="rect">
+            <a:avLst/>
+          </a:prstGeom>
+          <a:noFill/>
+        </p:spPr>
+        <p:txBody>
+          <a:bodyPr wrap="square" rtlCol="0">
+            <a:spAutoFit/>
+          </a:bodyPr>
+          <a:lstStyle/>
+          <a:p>
+            <a:pPr marL="571500" indent="-571500" algn="l" fontAlgn="base">
+              <a:spcBef>
+                <a:spcPts val="2400"/>
+              </a:spcBef>
+              <a:buFont typeface="Wingdings" panose="05000000000000000000" pitchFamily="2" charset="2"/>
+              <a:buChar char="q"/>
+            </a:pPr>
+            <a:r>
+              <a:rPr lang="en-US" sz="4400" b="0" i="0" dirty="0" err="1">
+                <a:solidFill>
+                  <a:srgbClr val="19191C"/>
+                </a:solidFill>
+                <a:effectLst/>
+                <a:latin typeface="JetBrains Sans"/>
+              </a:rPr>
+              <a:t>YouTrack</a:t>
+            </a:r>
+            <a:r>
+              <a:rPr lang="en-US" sz="4400" b="0" i="0" dirty="0">
+                <a:solidFill>
+                  <a:srgbClr val="19191C"/>
+                </a:solidFill>
+                <a:effectLst/>
+                <a:latin typeface="JetBrains Sans"/>
+              </a:rPr>
+              <a:t> </a:t>
+            </a:r>
+            <a:r>
+              <a:rPr lang="en-US" sz="3200" b="0" i="0" dirty="0">
+                <a:solidFill>
+                  <a:srgbClr val="19191C"/>
+                </a:solidFill>
+                <a:effectLst/>
+                <a:latin typeface="JetBrains Sans"/>
+              </a:rPr>
+              <a:t>(Project Management)</a:t>
+            </a:r>
+            <a:endParaRPr lang="en-US" sz="4400" b="0" i="0" dirty="0">
+              <a:solidFill>
+                <a:srgbClr val="19191C"/>
+              </a:solidFill>
+              <a:effectLst/>
+              <a:latin typeface="JetBrains Sans"/>
+            </a:endParaRPr>
+          </a:p>
+        </p:txBody>
+      </p:sp>
+      <p:sp>
+        <p:nvSpPr>
+          <p:cNvPr id="12" name="TextBox 11">
+            <a:extLst>
+              <a:ext uri="{FF2B5EF4-FFF2-40B4-BE49-F238E27FC236}">
+                <a16:creationId xmlns:a16="http://schemas.microsoft.com/office/drawing/2014/main" id="{012D7B7D-5563-FA7B-AC5D-8A0BE9BC598B}"/>
+              </a:ext>
+            </a:extLst>
+          </p:cNvPr>
+          <p:cNvSpPr txBox="1"/>
+          <p:nvPr/>
+        </p:nvSpPr>
+        <p:spPr>
+          <a:xfrm>
+            <a:off x="251853" y="3321613"/>
+            <a:ext cx="6721223" cy="769441"/>
+          </a:xfrm>
+          <a:prstGeom prst="rect">
+            <a:avLst/>
+          </a:prstGeom>
+          <a:noFill/>
+        </p:spPr>
+        <p:txBody>
+          <a:bodyPr wrap="square" rtlCol="0">
+            <a:spAutoFit/>
+          </a:bodyPr>
+          <a:lstStyle/>
+          <a:p>
+            <a:pPr marL="571500" indent="-571500" algn="l" fontAlgn="base">
+              <a:spcBef>
+                <a:spcPts val="2400"/>
+              </a:spcBef>
+              <a:buFont typeface="Wingdings" panose="05000000000000000000" pitchFamily="2" charset="2"/>
+              <a:buChar char="q"/>
+            </a:pPr>
+            <a:r>
+              <a:rPr lang="en-US" sz="4400" b="0" i="0" dirty="0" err="1">
+                <a:solidFill>
+                  <a:srgbClr val="19191C"/>
+                </a:solidFill>
+                <a:effectLst/>
+                <a:latin typeface="JetBrains Sans"/>
+              </a:rPr>
+              <a:t>Webstorm</a:t>
+            </a:r>
+            <a:r>
+              <a:rPr lang="en-US" sz="4400" b="0" i="0" dirty="0">
+                <a:solidFill>
+                  <a:srgbClr val="19191C"/>
+                </a:solidFill>
+                <a:effectLst/>
+                <a:latin typeface="JetBrains Sans"/>
+              </a:rPr>
+              <a:t> </a:t>
+            </a:r>
+            <a:r>
+              <a:rPr lang="en-US" sz="3200" b="0" i="0" dirty="0">
+                <a:solidFill>
+                  <a:srgbClr val="19191C"/>
+                </a:solidFill>
+                <a:effectLst/>
+                <a:latin typeface="JetBrains Sans"/>
+              </a:rPr>
+              <a:t>(Web)</a:t>
+            </a:r>
+            <a:endParaRPr lang="en-US" sz="4400" b="0" i="0" dirty="0">
+              <a:solidFill>
+                <a:srgbClr val="19191C"/>
+              </a:solidFill>
+              <a:effectLst/>
+              <a:latin typeface="JetBrains Sans"/>
+            </a:endParaRPr>
+          </a:p>
+        </p:txBody>
+      </p:sp>
+      <p:sp>
+        <p:nvSpPr>
+          <p:cNvPr id="13" name="TextBox 12">
+            <a:extLst>
+              <a:ext uri="{FF2B5EF4-FFF2-40B4-BE49-F238E27FC236}">
+                <a16:creationId xmlns:a16="http://schemas.microsoft.com/office/drawing/2014/main" id="{64A66354-EA92-B6A6-C3CB-83978769DD5D}"/>
+              </a:ext>
+            </a:extLst>
+          </p:cNvPr>
+          <p:cNvSpPr txBox="1"/>
+          <p:nvPr/>
+        </p:nvSpPr>
+        <p:spPr>
+          <a:xfrm>
+            <a:off x="251855" y="5020490"/>
+            <a:ext cx="6721223" cy="769441"/>
+          </a:xfrm>
+          <a:prstGeom prst="rect">
+            <a:avLst/>
+          </a:prstGeom>
+          <a:noFill/>
+        </p:spPr>
+        <p:txBody>
+          <a:bodyPr wrap="square" rtlCol="0">
+            <a:spAutoFit/>
+          </a:bodyPr>
+          <a:lstStyle/>
+          <a:p>
+            <a:pPr marL="571500" indent="-571500" algn="l" fontAlgn="base">
+              <a:spcBef>
+                <a:spcPts val="2400"/>
+              </a:spcBef>
+              <a:buFont typeface="Wingdings" panose="05000000000000000000" pitchFamily="2" charset="2"/>
+              <a:buChar char="q"/>
+            </a:pPr>
+            <a:r>
+              <a:rPr lang="en-US" sz="4400" b="0" i="0" dirty="0" err="1">
+                <a:solidFill>
+                  <a:srgbClr val="19191C"/>
+                </a:solidFill>
+                <a:effectLst/>
+                <a:latin typeface="JetBrains Sans"/>
+              </a:rPr>
+              <a:t>CLion</a:t>
+            </a:r>
+            <a:r>
+              <a:rPr lang="en-US" sz="4400" b="0" i="0" dirty="0">
+                <a:solidFill>
+                  <a:srgbClr val="19191C"/>
+                </a:solidFill>
+                <a:effectLst/>
+                <a:latin typeface="JetBrains Sans"/>
+              </a:rPr>
+              <a:t> </a:t>
+            </a:r>
+            <a:r>
+              <a:rPr lang="en-US" sz="3200" b="0" i="0" dirty="0">
+                <a:solidFill>
+                  <a:srgbClr val="19191C"/>
+                </a:solidFill>
+                <a:effectLst/>
+                <a:latin typeface="JetBrains Sans"/>
+              </a:rPr>
+              <a:t>(C/ C++ </a:t>
+            </a:r>
+            <a:r>
+              <a:rPr lang="en-US" sz="3200" b="0" i="0" dirty="0" err="1">
+                <a:solidFill>
+                  <a:srgbClr val="19191C"/>
+                </a:solidFill>
+                <a:effectLst/>
+                <a:latin typeface="JetBrains Sans"/>
+              </a:rPr>
+              <a:t>devs</a:t>
+            </a:r>
+            <a:r>
+              <a:rPr lang="en-US" sz="3200" b="0" i="0" dirty="0">
+                <a:solidFill>
+                  <a:srgbClr val="19191C"/>
+                </a:solidFill>
+                <a:effectLst/>
+                <a:latin typeface="JetBrains Sans"/>
+              </a:rPr>
+              <a:t>)</a:t>
+            </a:r>
+            <a:endParaRPr lang="en-US" sz="4400" b="0" i="0" dirty="0">
+              <a:solidFill>
+                <a:srgbClr val="19191C"/>
+              </a:solidFill>
+              <a:effectLst/>
+              <a:latin typeface="JetBrains Sans"/>
+            </a:endParaRPr>
+          </a:p>
+        </p:txBody>
+      </p:sp>
+      <p:sp>
+        <p:nvSpPr>
+          <p:cNvPr id="14" name="TextBox 13">
+            <a:extLst>
+              <a:ext uri="{FF2B5EF4-FFF2-40B4-BE49-F238E27FC236}">
+                <a16:creationId xmlns:a16="http://schemas.microsoft.com/office/drawing/2014/main" id="{574284D4-AA22-2977-42E2-FF1EB30D71A4}"/>
+              </a:ext>
+            </a:extLst>
+          </p:cNvPr>
+          <p:cNvSpPr txBox="1"/>
+          <p:nvPr/>
+        </p:nvSpPr>
+        <p:spPr>
+          <a:xfrm>
+            <a:off x="251854" y="4144386"/>
+            <a:ext cx="6721223" cy="769441"/>
+          </a:xfrm>
+          <a:prstGeom prst="rect">
+            <a:avLst/>
+          </a:prstGeom>
+          <a:noFill/>
+        </p:spPr>
+        <p:txBody>
+          <a:bodyPr wrap="square" rtlCol="0">
+            <a:spAutoFit/>
+          </a:bodyPr>
+          <a:lstStyle/>
+          <a:p>
+            <a:pPr marL="571500" indent="-571500" algn="l" fontAlgn="base">
+              <a:spcBef>
+                <a:spcPts val="2400"/>
+              </a:spcBef>
+              <a:buFont typeface="Wingdings" panose="05000000000000000000" pitchFamily="2" charset="2"/>
+              <a:buChar char="q"/>
+            </a:pPr>
+            <a:r>
+              <a:rPr lang="en-US" sz="4400" b="0" i="0" dirty="0" err="1">
+                <a:solidFill>
+                  <a:srgbClr val="19191C"/>
+                </a:solidFill>
+                <a:effectLst/>
+                <a:latin typeface="JetBrains Sans"/>
+              </a:rPr>
+              <a:t>PHPStorm</a:t>
+            </a:r>
+            <a:r>
+              <a:rPr lang="en-US" sz="4400" b="0" i="0" dirty="0">
+                <a:solidFill>
+                  <a:srgbClr val="19191C"/>
+                </a:solidFill>
+                <a:effectLst/>
+                <a:latin typeface="JetBrains Sans"/>
+              </a:rPr>
+              <a:t> </a:t>
+            </a:r>
+            <a:r>
+              <a:rPr lang="en-US" sz="3200" b="0" i="0" dirty="0">
+                <a:solidFill>
+                  <a:srgbClr val="19191C"/>
+                </a:solidFill>
+                <a:effectLst/>
+                <a:latin typeface="JetBrains Sans"/>
+              </a:rPr>
+              <a:t>(PHP </a:t>
+            </a:r>
+            <a:r>
+              <a:rPr lang="en-US" sz="3200" b="0" i="0" dirty="0" err="1">
+                <a:solidFill>
+                  <a:srgbClr val="19191C"/>
+                </a:solidFill>
+                <a:effectLst/>
+                <a:latin typeface="JetBrains Sans"/>
+              </a:rPr>
+              <a:t>devs</a:t>
+            </a:r>
+            <a:r>
+              <a:rPr lang="en-US" sz="3200" b="0" i="0" dirty="0">
+                <a:solidFill>
+                  <a:srgbClr val="19191C"/>
+                </a:solidFill>
+                <a:effectLst/>
+                <a:latin typeface="JetBrains Sans"/>
+              </a:rPr>
+              <a:t>)</a:t>
+            </a:r>
+            <a:endParaRPr lang="en-US" sz="4400" b="0" i="0" dirty="0">
+              <a:solidFill>
+                <a:srgbClr val="19191C"/>
+              </a:solidFill>
+              <a:effectLst/>
+              <a:latin typeface="JetBrains Sans"/>
+            </a:endParaRPr>
+          </a:p>
+        </p:txBody>
+      </p:sp>
+    </p:spTree>
+    <p:extLst>
+      <p:ext uri="{BB962C8B-B14F-4D97-AF65-F5344CB8AC3E}">
+        <p14:creationId xmlns:p14="http://schemas.microsoft.com/office/powerpoint/2010/main" val="1978744398"/>
+      </p:ext>
+    </p:extLst>
+  </p:cSld>
+  <p:clrMapOvr>
+    <a:masterClrMapping/>
+  </p:clrMapOvr>
+  <p:timing>
+    <p:tnLst>
+      <p:par>
+        <p:cTn id="1" dur="indefinite" restart="never" nodeType="tmRoot">
+          <p:childTnLst>
+            <p:seq concurrent="1" nextAc="seek">
+              <p:cTn id="2" dur="indefinite" nodeType="mainSeq">
+                <p:childTnLst>
+                  <p:par>
+                    <p:cTn id="3" fill="hold">
+                      <p:stCondLst>
+                        <p:cond delay="indefinite"/>
+                      </p:stCondLst>
+                      <p:childTnLst>
+                        <p:par>
+                          <p:cTn id="4" fill="hold">
+                            <p:stCondLst>
+                              <p:cond delay="0"/>
+                            </p:stCondLst>
+                            <p:childTnLst>
+                              <p:par>
+                                <p:cTn id="5" presetID="1" presetClass="entr" presetSubtype="0" fill="hold" grpId="0" nodeType="clickEffect">
+                                  <p:stCondLst>
+                                    <p:cond delay="0"/>
+                                  </p:stCondLst>
+                                  <p:childTnLst>
+                                    <p:set>
+                                      <p:cBhvr>
+                                        <p:cTn id="6" dur="1" fill="hold">
+                                          <p:stCondLst>
+                                            <p:cond delay="0"/>
+                                          </p:stCondLst>
+                                        </p:cTn>
+                                        <p:tgtEl>
+                                          <p:spTgt spid="4"/>
+                                        </p:tgtEl>
+                                        <p:attrNameLst>
+                                          <p:attrName>style.visibility</p:attrName>
+                                        </p:attrNameLst>
+                                      </p:cBhvr>
+                                      <p:to>
+                                        <p:strVal val="visible"/>
+                                      </p:to>
+                                    </p:set>
+                                  </p:childTnLst>
+                                </p:cTn>
+                              </p:par>
+                            </p:childTnLst>
+                          </p:cTn>
+                        </p:par>
+                      </p:childTnLst>
+                    </p:cTn>
+                  </p:par>
+                  <p:par>
+                    <p:cTn id="7" fill="hold">
+                      <p:stCondLst>
+                        <p:cond delay="indefinite"/>
+                      </p:stCondLst>
+                      <p:childTnLst>
+                        <p:par>
+                          <p:cTn id="8" fill="hold">
+                            <p:stCondLst>
+                              <p:cond delay="0"/>
+                            </p:stCondLst>
+                            <p:childTnLst>
+                              <p:par>
+                                <p:cTn id="9" presetID="10" presetClass="entr" presetSubtype="0" fill="hold" grpId="0" nodeType="clickEffect">
+                                  <p:stCondLst>
+                                    <p:cond delay="0"/>
+                                  </p:stCondLst>
+                                  <p:childTnLst>
+                                    <p:set>
+                                      <p:cBhvr>
+                                        <p:cTn id="10" dur="1" fill="hold">
+                                          <p:stCondLst>
+                                            <p:cond delay="0"/>
+                                          </p:stCondLst>
+                                        </p:cTn>
+                                        <p:tgtEl>
+                                          <p:spTgt spid="10"/>
+                                        </p:tgtEl>
+                                        <p:attrNameLst>
+                                          <p:attrName>style.visibility</p:attrName>
+                                        </p:attrNameLst>
+                                      </p:cBhvr>
+                                      <p:to>
+                                        <p:strVal val="visible"/>
+                                      </p:to>
+                                    </p:set>
+                                    <p:animEffect transition="in" filter="fade">
+                                      <p:cBhvr>
+                                        <p:cTn id="11" dur="500"/>
+                                        <p:tgtEl>
+                                          <p:spTgt spid="10"/>
+                                        </p:tgtEl>
+                                      </p:cBhvr>
+                                    </p:animEffect>
+                                  </p:childTnLst>
+                                </p:cTn>
+                              </p:par>
+                            </p:childTnLst>
+                          </p:cTn>
+                        </p:par>
+                      </p:childTnLst>
+                    </p:cTn>
+                  </p:par>
+                  <p:par>
+                    <p:cTn id="12" fill="hold">
+                      <p:stCondLst>
+                        <p:cond delay="indefinite"/>
+                      </p:stCondLst>
+                      <p:childTnLst>
+                        <p:par>
+                          <p:cTn id="13" fill="hold">
+                            <p:stCondLst>
+                              <p:cond delay="0"/>
+                            </p:stCondLst>
+                            <p:childTnLst>
+                              <p:par>
+                                <p:cTn id="14" presetID="10" presetClass="entr" presetSubtype="0" fill="hold" grpId="0" nodeType="clickEffect">
+                                  <p:stCondLst>
+                                    <p:cond delay="0"/>
+                                  </p:stCondLst>
+                                  <p:childTnLst>
+                                    <p:set>
+                                      <p:cBhvr>
+                                        <p:cTn id="15" dur="1" fill="hold">
+                                          <p:stCondLst>
+                                            <p:cond delay="0"/>
+                                          </p:stCondLst>
+                                        </p:cTn>
+                                        <p:tgtEl>
+                                          <p:spTgt spid="11"/>
+                                        </p:tgtEl>
+                                        <p:attrNameLst>
+                                          <p:attrName>style.visibility</p:attrName>
+                                        </p:attrNameLst>
+                                      </p:cBhvr>
+                                      <p:to>
+                                        <p:strVal val="visible"/>
+                                      </p:to>
+                                    </p:set>
+                                    <p:animEffect transition="in" filter="fade">
+                                      <p:cBhvr>
+                                        <p:cTn id="16" dur="500"/>
+                                        <p:tgtEl>
+                                          <p:spTgt spid="11"/>
+                                        </p:tgtEl>
+                                      </p:cBhvr>
+                                    </p:animEffect>
+                                  </p:childTnLst>
+                                </p:cTn>
+                              </p:par>
+                            </p:childTnLst>
+                          </p:cTn>
+                        </p:par>
+                      </p:childTnLst>
+                    </p:cTn>
+                  </p:par>
+                  <p:par>
+                    <p:cTn id="17" fill="hold">
+                      <p:stCondLst>
+                        <p:cond delay="indefinite"/>
+                      </p:stCondLst>
+                      <p:childTnLst>
+                        <p:par>
+                          <p:cTn id="18" fill="hold">
+                            <p:stCondLst>
+                              <p:cond delay="0"/>
+                            </p:stCondLst>
+                            <p:childTnLst>
+                              <p:par>
+                                <p:cTn id="19" presetID="10" presetClass="entr" presetSubtype="0" fill="hold" grpId="0" nodeType="clickEffect">
+                                  <p:stCondLst>
+                                    <p:cond delay="0"/>
+                                  </p:stCondLst>
+                                  <p:childTnLst>
+                                    <p:set>
+                                      <p:cBhvr>
+                                        <p:cTn id="20" dur="1" fill="hold">
+                                          <p:stCondLst>
+                                            <p:cond delay="0"/>
+                                          </p:stCondLst>
+                                        </p:cTn>
+                                        <p:tgtEl>
+                                          <p:spTgt spid="12"/>
+                                        </p:tgtEl>
+                                        <p:attrNameLst>
+                                          <p:attrName>style.visibility</p:attrName>
+                                        </p:attrNameLst>
+                                      </p:cBhvr>
+                                      <p:to>
+                                        <p:strVal val="visible"/>
+                                      </p:to>
+                                    </p:set>
+                                    <p:animEffect transition="in" filter="fade">
+                                      <p:cBhvr>
+                                        <p:cTn id="21" dur="500"/>
+                                        <p:tgtEl>
+                                          <p:spTgt spid="12"/>
+                                        </p:tgtEl>
+                                      </p:cBhvr>
+                                    </p:animEffect>
+                                  </p:childTnLst>
+                                </p:cTn>
+                              </p:par>
+                            </p:childTnLst>
+                          </p:cTn>
+                        </p:par>
+                      </p:childTnLst>
+                    </p:cTn>
+                  </p:par>
+                  <p:par>
+                    <p:cTn id="22" fill="hold">
+                      <p:stCondLst>
+                        <p:cond delay="indefinite"/>
+                      </p:stCondLst>
+                      <p:childTnLst>
+                        <p:par>
+                          <p:cTn id="23" fill="hold">
+                            <p:stCondLst>
+                              <p:cond delay="0"/>
+                            </p:stCondLst>
+                            <p:childTnLst>
+                              <p:par>
+                                <p:cTn id="24" presetID="10" presetClass="entr" presetSubtype="0" fill="hold" grpId="0" nodeType="clickEffect">
+                                  <p:stCondLst>
+                                    <p:cond delay="0"/>
+                                  </p:stCondLst>
+                                  <p:childTnLst>
+                                    <p:set>
+                                      <p:cBhvr>
+                                        <p:cTn id="25" dur="1" fill="hold">
+                                          <p:stCondLst>
+                                            <p:cond delay="0"/>
+                                          </p:stCondLst>
+                                        </p:cTn>
+                                        <p:tgtEl>
+                                          <p:spTgt spid="14"/>
+                                        </p:tgtEl>
+                                        <p:attrNameLst>
+                                          <p:attrName>style.visibility</p:attrName>
+                                        </p:attrNameLst>
+                                      </p:cBhvr>
+                                      <p:to>
+                                        <p:strVal val="visible"/>
+                                      </p:to>
+                                    </p:set>
+                                    <p:animEffect transition="in" filter="fade">
+                                      <p:cBhvr>
+                                        <p:cTn id="26" dur="500"/>
+                                        <p:tgtEl>
+                                          <p:spTgt spid="14"/>
+                                        </p:tgtEl>
+                                      </p:cBhvr>
+                                    </p:animEffect>
+                                  </p:childTnLst>
+                                </p:cTn>
+                              </p:par>
+                            </p:childTnLst>
+                          </p:cTn>
+                        </p:par>
+                      </p:childTnLst>
+                    </p:cTn>
+                  </p:par>
+                  <p:par>
+                    <p:cTn id="27" fill="hold">
+                      <p:stCondLst>
+                        <p:cond delay="indefinite"/>
+                      </p:stCondLst>
+                      <p:childTnLst>
+                        <p:par>
+                          <p:cTn id="28" fill="hold">
+                            <p:stCondLst>
+                              <p:cond delay="0"/>
+                            </p:stCondLst>
+                            <p:childTnLst>
+                              <p:par>
+                                <p:cTn id="29" presetID="10" presetClass="entr" presetSubtype="0" fill="hold" grpId="0" nodeType="clickEffect">
+                                  <p:stCondLst>
+                                    <p:cond delay="0"/>
+                                  </p:stCondLst>
+                                  <p:childTnLst>
+                                    <p:set>
+                                      <p:cBhvr>
+                                        <p:cTn id="30" dur="1" fill="hold">
+                                          <p:stCondLst>
+                                            <p:cond delay="0"/>
+                                          </p:stCondLst>
+                                        </p:cTn>
+                                        <p:tgtEl>
+                                          <p:spTgt spid="13"/>
+                                        </p:tgtEl>
+                                        <p:attrNameLst>
+                                          <p:attrName>style.visibility</p:attrName>
+                                        </p:attrNameLst>
+                                      </p:cBhvr>
+                                      <p:to>
+                                        <p:strVal val="visible"/>
+                                      </p:to>
+                                    </p:set>
+                                    <p:animEffect transition="in" filter="fade">
+                                      <p:cBhvr>
+                                        <p:cTn id="31" dur="500"/>
+                                        <p:tgtEl>
+                                          <p:spTgt spid="13"/>
+                                        </p:tgtEl>
+                                      </p:cBhvr>
+                                    </p:animEffect>
+                                  </p:childTnLst>
+                                </p:cTn>
+                              </p:par>
+                            </p:childTnLst>
+                          </p:cTn>
+                        </p:par>
+                      </p:childTnLst>
+                    </p:cTn>
+                  </p:par>
+                </p:childTnLst>
+              </p:cTn>
+              <p:prevCondLst>
+                <p:cond evt="onPrev" delay="0">
+                  <p:tgtEl>
+                    <p:sldTgt/>
+                  </p:tgtEl>
+                </p:cond>
+              </p:prevCondLst>
+              <p:nextCondLst>
+                <p:cond evt="onNext" delay="0">
+                  <p:tgtEl>
+                    <p:sldTgt/>
+                  </p:tgtEl>
+                </p:cond>
+              </p:nextCondLst>
+            </p:seq>
+          </p:childTnLst>
+        </p:cTn>
+      </p:par>
+    </p:tnLst>
+    <p:bldLst>
+      <p:bldP spid="4" grpId="0"/>
+      <p:bldP spid="10" grpId="0"/>
+      <p:bldP spid="11" grpId="0"/>
+      <p:bldP spid="12" grpId="0"/>
+      <p:bldP spid="13" grpId="0"/>
+      <p:bldP spid="14" grpId="0"/>
+    </p:bldLst>
+  </p:timing>
+</p:sld>
+</file>
+
+<file path=ppt/slides/slide8.xml><?xml version="1.0" encoding="utf-8"?>
+<p:sld xmlns:a="http://schemas.openxmlformats.org/drawingml/2006/main" xmlns:r="http://schemas.openxmlformats.org/officeDocument/2006/relationships" xmlns:p="http://schemas.openxmlformats.org/presentationml/2006/main">
+  <p:cSld>
+    <p:spTree>
+      <p:nvGrpSpPr>
+        <p:cNvPr id="1" name="">
+          <a:extLst>
+            <a:ext uri="{FF2B5EF4-FFF2-40B4-BE49-F238E27FC236}">
               <a16:creationId xmlns:a16="http://schemas.microsoft.com/office/drawing/2014/main" id="{DD1B54D4-B0B4-01B0-004A-7E6EB2299680}"/>
             </a:ext>
           </a:extLst>
@@ -8690,7 +10295,7 @@
           <a:p>
             <a:fld id="{148CC95F-0247-41B6-91CF-DC97C76A7088}" type="slidenum">
               <a:rPr lang="en-US" sz="1800" smtClean="0"/>
-              <a:t>7</a:t>
+              <a:t>8</a:t>
             </a:fld>
             <a:endParaRPr lang="en-US" sz="1800" dirty="0"/>
           </a:p>
@@ -9044,7 +10649,7 @@
 </p:sld>
 </file>
 
-<file path=ppt/slides/slide8.xml><?xml version="1.0" encoding="utf-8"?>
+<file path=ppt/slides/slide9.xml><?xml version="1.0" encoding="utf-8"?>
 <p:sld xmlns:a="http://schemas.openxmlformats.org/drawingml/2006/main" xmlns:r="http://schemas.openxmlformats.org/officeDocument/2006/relationships" xmlns:p="http://schemas.openxmlformats.org/presentationml/2006/main">
   <p:cSld>
     <p:spTree>
@@ -9529,7 +11134,7 @@
           <a:p>
             <a:fld id="{148CC95F-0247-41B6-91CF-DC97C76A7088}" type="slidenum">
               <a:rPr lang="en-US" sz="1800" smtClean="0"/>
-              <a:t>8</a:t>
+              <a:t>9</a:t>
             </a:fld>
             <a:endParaRPr lang="en-US" sz="1800" dirty="0"/>
           </a:p>
@@ -9539,431 +11144,6 @@
     <p:extLst>
       <p:ext uri="{BB962C8B-B14F-4D97-AF65-F5344CB8AC3E}">
         <p14:creationId xmlns:p14="http://schemas.microsoft.com/office/powerpoint/2010/main" val="3355837901"/>
-      </p:ext>
-    </p:extLst>
-  </p:cSld>
-  <p:clrMapOvr>
-    <a:masterClrMapping/>
-  </p:clrMapOvr>
-</p:sld>
-</file>
-
-<file path=ppt/slides/slide9.xml><?xml version="1.0" encoding="utf-8"?>
-<p:sld xmlns:a="http://schemas.openxmlformats.org/drawingml/2006/main" xmlns:r="http://schemas.openxmlformats.org/officeDocument/2006/relationships" xmlns:p="http://schemas.openxmlformats.org/presentationml/2006/main">
-  <p:cSld>
-    <p:spTree>
-      <p:nvGrpSpPr>
-        <p:cNvPr id="1" name="">
-          <a:extLst>
-            <a:ext uri="{FF2B5EF4-FFF2-40B4-BE49-F238E27FC236}">
-              <a16:creationId xmlns:a16="http://schemas.microsoft.com/office/drawing/2014/main" id="{FDD3CFDD-5139-FADE-B7CE-84A1F574B618}"/>
-            </a:ext>
-          </a:extLst>
-        </p:cNvPr>
-        <p:cNvGrpSpPr/>
-        <p:nvPr/>
-      </p:nvGrpSpPr>
-      <p:grpSpPr>
-        <a:xfrm>
-          <a:off x="0" y="0"/>
-          <a:ext cx="0" cy="0"/>
-          <a:chOff x="0" y="0"/>
-          <a:chExt cx="0" cy="0"/>
-        </a:xfrm>
-      </p:grpSpPr>
-      <p:pic>
-        <p:nvPicPr>
-          <p:cNvPr id="4" name="Picture 3" descr="Triangular abstract background">
-            <a:extLst>
-              <a:ext uri="{FF2B5EF4-FFF2-40B4-BE49-F238E27FC236}">
-                <a16:creationId xmlns:a16="http://schemas.microsoft.com/office/drawing/2014/main" id="{B129E233-6273-D1CA-A0C0-903C19F4AE50}"/>
-              </a:ext>
-            </a:extLst>
-          </p:cNvPr>
-          <p:cNvPicPr>
-            <a:picLocks noChangeAspect="1"/>
-          </p:cNvPicPr>
-          <p:nvPr/>
-        </p:nvPicPr>
-        <p:blipFill>
-          <a:blip r:embed="rId2">
-            <a:alphaModFix amt="40000"/>
-          </a:blip>
-          <a:srcRect t="15730"/>
-          <a:stretch/>
-        </p:blipFill>
-        <p:spPr>
-          <a:xfrm>
-            <a:off x="-2" y="15496"/>
-            <a:ext cx="12192001" cy="6858001"/>
-          </a:xfrm>
-          <a:prstGeom prst="rect">
-            <a:avLst/>
-          </a:prstGeom>
-        </p:spPr>
-      </p:pic>
-      <p:sp>
-        <p:nvSpPr>
-          <p:cNvPr id="3" name="TextBox 2">
-            <a:extLst>
-              <a:ext uri="{FF2B5EF4-FFF2-40B4-BE49-F238E27FC236}">
-                <a16:creationId xmlns:a16="http://schemas.microsoft.com/office/drawing/2014/main" id="{50355116-F32A-6007-E5F6-42CFDFF95AE4}"/>
-              </a:ext>
-            </a:extLst>
-          </p:cNvPr>
-          <p:cNvSpPr txBox="1"/>
-          <p:nvPr/>
-        </p:nvSpPr>
-        <p:spPr>
-          <a:xfrm>
-            <a:off x="2138765" y="398630"/>
-            <a:ext cx="8152110" cy="523220"/>
-          </a:xfrm>
-          <a:prstGeom prst="rect">
-            <a:avLst/>
-          </a:prstGeom>
-          <a:noFill/>
-        </p:spPr>
-        <p:txBody>
-          <a:bodyPr wrap="square">
-            <a:spAutoFit/>
-          </a:bodyPr>
-          <a:lstStyle/>
-          <a:p>
-            <a:pPr algn="ctr"/>
-            <a:r>
-              <a:rPr lang="en-US" sz="2800" b="1" dirty="0"/>
-              <a:t>Popular Android Development Frameworks</a:t>
-            </a:r>
-          </a:p>
-        </p:txBody>
-      </p:sp>
-      <p:grpSp>
-        <p:nvGrpSpPr>
-          <p:cNvPr id="14" name="Group 13">
-            <a:extLst>
-              <a:ext uri="{FF2B5EF4-FFF2-40B4-BE49-F238E27FC236}">
-                <a16:creationId xmlns:a16="http://schemas.microsoft.com/office/drawing/2014/main" id="{B9E904E1-D8D1-C0D0-2071-A8BF9CF87C45}"/>
-              </a:ext>
-            </a:extLst>
-          </p:cNvPr>
-          <p:cNvGrpSpPr/>
-          <p:nvPr/>
-        </p:nvGrpSpPr>
-        <p:grpSpPr>
-          <a:xfrm>
-            <a:off x="760188" y="1372138"/>
-            <a:ext cx="3153158" cy="2324051"/>
-            <a:chOff x="760188" y="1372138"/>
-            <a:chExt cx="3153158" cy="2324051"/>
-          </a:xfrm>
-        </p:grpSpPr>
-        <p:sp>
-          <p:nvSpPr>
-            <p:cNvPr id="2" name="TextBox 1">
-              <a:extLst>
-                <a:ext uri="{FF2B5EF4-FFF2-40B4-BE49-F238E27FC236}">
-                  <a16:creationId xmlns:a16="http://schemas.microsoft.com/office/drawing/2014/main" id="{4D5A292A-65CF-F99C-04C9-CE915A61051E}"/>
-                </a:ext>
-              </a:extLst>
-            </p:cNvPr>
-            <p:cNvSpPr txBox="1"/>
-            <p:nvPr/>
-          </p:nvSpPr>
-          <p:spPr>
-            <a:xfrm>
-              <a:off x="760188" y="1372138"/>
-              <a:ext cx="3153158" cy="1077218"/>
-            </a:xfrm>
-            <a:prstGeom prst="rect">
-              <a:avLst/>
-            </a:prstGeom>
-            <a:noFill/>
-          </p:spPr>
-          <p:txBody>
-            <a:bodyPr wrap="square">
-              <a:spAutoFit/>
-            </a:bodyPr>
-            <a:lstStyle/>
-            <a:p>
-              <a:pPr algn="ctr"/>
-              <a:r>
-                <a:rPr lang="de-DE" sz="3200" dirty="0"/>
-                <a:t>React-Native	</a:t>
-              </a:r>
-            </a:p>
-            <a:p>
-              <a:pPr marL="514350" indent="-514350" algn="l">
-                <a:buFont typeface="+mj-lt"/>
-                <a:buAutoNum type="arabicPeriod"/>
-              </a:pPr>
-              <a:endParaRPr lang="en-GB" sz="3200" dirty="0"/>
-            </a:p>
-          </p:txBody>
-        </p:sp>
-        <p:pic>
-          <p:nvPicPr>
-            <p:cNvPr id="9" name="Graphic 8">
-              <a:extLst>
-                <a:ext uri="{FF2B5EF4-FFF2-40B4-BE49-F238E27FC236}">
-                  <a16:creationId xmlns:a16="http://schemas.microsoft.com/office/drawing/2014/main" id="{B58F8070-82E2-36D9-E84D-7A38CBCB577A}"/>
-                </a:ext>
-              </a:extLst>
-            </p:cNvPr>
-            <p:cNvPicPr>
-              <a:picLocks noChangeAspect="1"/>
-            </p:cNvPicPr>
-            <p:nvPr/>
-          </p:nvPicPr>
-          <p:blipFill>
-            <a:blip r:embed="rId3">
-              <a:extLst>
-                <a:ext uri="{96DAC541-7B7A-43D3-8B79-37D633B846F1}">
-                  <asvg:svgBlip xmlns:asvg="http://schemas.microsoft.com/office/drawing/2016/SVG/main" r:embed="rId4"/>
-                </a:ext>
-              </a:extLst>
-            </a:blip>
-            <a:stretch>
-              <a:fillRect/>
-            </a:stretch>
-          </p:blipFill>
-          <p:spPr>
-            <a:xfrm>
-              <a:off x="1220863" y="1956913"/>
-              <a:ext cx="1909794" cy="1739276"/>
-            </a:xfrm>
-            <a:prstGeom prst="rect">
-              <a:avLst/>
-            </a:prstGeom>
-          </p:spPr>
-        </p:pic>
-      </p:grpSp>
-      <p:grpSp>
-        <p:nvGrpSpPr>
-          <p:cNvPr id="13" name="Group 12">
-            <a:extLst>
-              <a:ext uri="{FF2B5EF4-FFF2-40B4-BE49-F238E27FC236}">
-                <a16:creationId xmlns:a16="http://schemas.microsoft.com/office/drawing/2014/main" id="{5FA01564-4286-DA32-4726-6E75905554FE}"/>
-              </a:ext>
-            </a:extLst>
-          </p:cNvPr>
-          <p:cNvGrpSpPr/>
-          <p:nvPr/>
-        </p:nvGrpSpPr>
-        <p:grpSpPr>
-          <a:xfrm>
-            <a:off x="8682243" y="1372138"/>
-            <a:ext cx="2419149" cy="2667185"/>
-            <a:chOff x="754302" y="3515534"/>
-            <a:chExt cx="2419149" cy="2667185"/>
-          </a:xfrm>
-        </p:grpSpPr>
-        <p:pic>
-          <p:nvPicPr>
-            <p:cNvPr id="11" name="Picture 10" descr="A blue and black logo&#10;&#10;AI-generated content may be incorrect.">
-              <a:extLst>
-                <a:ext uri="{FF2B5EF4-FFF2-40B4-BE49-F238E27FC236}">
-                  <a16:creationId xmlns:a16="http://schemas.microsoft.com/office/drawing/2014/main" id="{E9A3113B-984F-36FD-BE59-F972CC97358A}"/>
-                </a:ext>
-              </a:extLst>
-            </p:cNvPr>
-            <p:cNvPicPr>
-              <a:picLocks noChangeAspect="1"/>
-            </p:cNvPicPr>
-            <p:nvPr/>
-          </p:nvPicPr>
-          <p:blipFill>
-            <a:blip r:embed="rId5">
-              <a:extLst>
-                <a:ext uri="{28A0092B-C50C-407E-A947-70E740481C1C}">
-                  <a14:useLocalDpi xmlns:a14="http://schemas.microsoft.com/office/drawing/2010/main" val="0"/>
-                </a:ext>
-                <a:ext uri="{837473B0-CC2E-450A-ABE3-18F120FF3D39}">
-                  <a1611:picAttrSrcUrl xmlns:a1611="http://schemas.microsoft.com/office/drawing/2016/11/main" r:id="rId6"/>
-                </a:ext>
-              </a:extLst>
-            </a:blip>
-            <a:stretch>
-              <a:fillRect/>
-            </a:stretch>
-          </p:blipFill>
-          <p:spPr>
-            <a:xfrm>
-              <a:off x="754302" y="4150256"/>
-              <a:ext cx="2032463" cy="2032463"/>
-            </a:xfrm>
-            <a:prstGeom prst="rect">
-              <a:avLst/>
-            </a:prstGeom>
-          </p:spPr>
-        </p:pic>
-        <p:sp>
-          <p:nvSpPr>
-            <p:cNvPr id="12" name="TextBox 11">
-              <a:extLst>
-                <a:ext uri="{FF2B5EF4-FFF2-40B4-BE49-F238E27FC236}">
-                  <a16:creationId xmlns:a16="http://schemas.microsoft.com/office/drawing/2014/main" id="{9B173CF0-AFB0-E01A-66F4-FE29C3319499}"/>
-                </a:ext>
-              </a:extLst>
-            </p:cNvPr>
-            <p:cNvSpPr txBox="1"/>
-            <p:nvPr/>
-          </p:nvSpPr>
-          <p:spPr>
-            <a:xfrm>
-              <a:off x="1140988" y="3515534"/>
-              <a:ext cx="2032463" cy="584775"/>
-            </a:xfrm>
-            <a:prstGeom prst="rect">
-              <a:avLst/>
-            </a:prstGeom>
-            <a:noFill/>
-          </p:spPr>
-          <p:txBody>
-            <a:bodyPr wrap="square" rtlCol="0">
-              <a:spAutoFit/>
-            </a:bodyPr>
-            <a:lstStyle/>
-            <a:p>
-              <a:pPr algn="ctr"/>
-              <a:r>
-                <a:rPr lang="de-DE" sz="3200" dirty="0"/>
-                <a:t>Flutter</a:t>
-              </a:r>
-              <a:endParaRPr lang="en-GB" sz="3200" dirty="0"/>
-            </a:p>
-          </p:txBody>
-        </p:sp>
-      </p:grpSp>
-      <p:grpSp>
-        <p:nvGrpSpPr>
-          <p:cNvPr id="19" name="Group 18">
-            <a:extLst>
-              <a:ext uri="{FF2B5EF4-FFF2-40B4-BE49-F238E27FC236}">
-                <a16:creationId xmlns:a16="http://schemas.microsoft.com/office/drawing/2014/main" id="{62B12BAF-C3CE-3F02-9E87-C613A34BF7F2}"/>
-              </a:ext>
-            </a:extLst>
-          </p:cNvPr>
-          <p:cNvGrpSpPr/>
-          <p:nvPr/>
-        </p:nvGrpSpPr>
-        <p:grpSpPr>
-          <a:xfrm>
-            <a:off x="4943438" y="2912458"/>
-            <a:ext cx="2540579" cy="3125354"/>
-            <a:chOff x="6979974" y="2653386"/>
-            <a:chExt cx="2540579" cy="3125354"/>
-          </a:xfrm>
-        </p:grpSpPr>
-        <p:pic>
-          <p:nvPicPr>
-            <p:cNvPr id="16" name="Picture 15" descr="A colorful triangle with a black background&#10;&#10;AI-generated content may be incorrect.">
-              <a:extLst>
-                <a:ext uri="{FF2B5EF4-FFF2-40B4-BE49-F238E27FC236}">
-                  <a16:creationId xmlns:a16="http://schemas.microsoft.com/office/drawing/2014/main" id="{37B22496-D545-93D6-7C62-90F62E5186B7}"/>
-                </a:ext>
-              </a:extLst>
-            </p:cNvPr>
-            <p:cNvPicPr>
-              <a:picLocks noChangeAspect="1"/>
-            </p:cNvPicPr>
-            <p:nvPr/>
-          </p:nvPicPr>
-          <p:blipFill>
-            <a:blip r:embed="rId7">
-              <a:extLst>
-                <a:ext uri="{28A0092B-C50C-407E-A947-70E740481C1C}">
-                  <a14:useLocalDpi xmlns:a14="http://schemas.microsoft.com/office/drawing/2010/main" val="0"/>
-                </a:ext>
-                <a:ext uri="{837473B0-CC2E-450A-ABE3-18F120FF3D39}">
-                  <a1611:picAttrSrcUrl xmlns:a1611="http://schemas.microsoft.com/office/drawing/2016/11/main" r:id="rId8"/>
-                </a:ext>
-              </a:extLst>
-            </a:blip>
-            <a:stretch>
-              <a:fillRect/>
-            </a:stretch>
-          </p:blipFill>
-          <p:spPr>
-            <a:xfrm>
-              <a:off x="6979974" y="2653386"/>
-              <a:ext cx="2540579" cy="2540579"/>
-            </a:xfrm>
-            <a:prstGeom prst="rect">
-              <a:avLst/>
-            </a:prstGeom>
-          </p:spPr>
-        </p:pic>
-        <p:sp>
-          <p:nvSpPr>
-            <p:cNvPr id="17" name="TextBox 16">
-              <a:extLst>
-                <a:ext uri="{FF2B5EF4-FFF2-40B4-BE49-F238E27FC236}">
-                  <a16:creationId xmlns:a16="http://schemas.microsoft.com/office/drawing/2014/main" id="{4AEC2034-7FFC-C694-29FA-93FA2ADD45FF}"/>
-                </a:ext>
-              </a:extLst>
-            </p:cNvPr>
-            <p:cNvSpPr txBox="1"/>
-            <p:nvPr/>
-          </p:nvSpPr>
-          <p:spPr>
-            <a:xfrm>
-              <a:off x="6979974" y="5193965"/>
-              <a:ext cx="2540579" cy="584775"/>
-            </a:xfrm>
-            <a:prstGeom prst="rect">
-              <a:avLst/>
-            </a:prstGeom>
-            <a:noFill/>
-          </p:spPr>
-          <p:txBody>
-            <a:bodyPr wrap="square" rtlCol="0">
-              <a:spAutoFit/>
-            </a:bodyPr>
-            <a:lstStyle/>
-            <a:p>
-              <a:pPr algn="ctr"/>
-              <a:r>
-                <a:rPr lang="en-GB" sz="3200" dirty="0"/>
-                <a:t>Kotlin</a:t>
-              </a:r>
-            </a:p>
-          </p:txBody>
-        </p:sp>
-      </p:grpSp>
-      <p:sp>
-        <p:nvSpPr>
-          <p:cNvPr id="20" name="Slide Number Placeholder 19">
-            <a:extLst>
-              <a:ext uri="{FF2B5EF4-FFF2-40B4-BE49-F238E27FC236}">
-                <a16:creationId xmlns:a16="http://schemas.microsoft.com/office/drawing/2014/main" id="{0D88A898-F2E0-55EF-DDDF-65FF8617FDB5}"/>
-              </a:ext>
-            </a:extLst>
-          </p:cNvPr>
-          <p:cNvSpPr>
-            <a:spLocks noGrp="1"/>
-          </p:cNvSpPr>
-          <p:nvPr>
-            <p:ph type="sldNum" sz="quarter" idx="12"/>
-          </p:nvPr>
-        </p:nvSpPr>
-        <p:spPr/>
-        <p:txBody>
-          <a:bodyPr/>
-          <a:lstStyle/>
-          <a:p>
-            <a:fld id="{148CC95F-0247-41B6-91CF-DC97C76A7088}" type="slidenum">
-              <a:rPr lang="en-US" sz="1800" smtClean="0"/>
-              <a:t>9</a:t>
-            </a:fld>
-            <a:endParaRPr lang="en-US" sz="1800" dirty="0"/>
-          </a:p>
-        </p:txBody>
-      </p:sp>
-    </p:spTree>
-    <p:extLst>
-      <p:ext uri="{BB962C8B-B14F-4D97-AF65-F5344CB8AC3E}">
-        <p14:creationId xmlns:p14="http://schemas.microsoft.com/office/powerpoint/2010/main" val="3081173710"/>
       </p:ext>
     </p:extLst>
   </p:cSld>

</xml_diff>